<commit_message>
2016-17 updates for workshops
</commit_message>
<xml_diff>
--- a/PsychoPy-Part1/PsychoPy-part1.pptx
+++ b/PsychoPy-Part1/PsychoPy-part1.pptx
@@ -1670,7 +1670,7 @@
           <a:p>
             <a:fld id="{B4554F2B-4BCF-4197-901F-D7CA0C5C3346}" type="datetimeFigureOut">
               <a:rPr lang="en-US" smtClean="0"/>
-              <a:t>2/5/2016</a:t>
+              <a:t>9/20/2016</a:t>
             </a:fld>
             <a:endParaRPr lang="en-US" dirty="0"/>
           </a:p>
@@ -1927,7 +1927,7 @@
           <a:p>
             <a:fld id="{E28077EF-3DB9-4852-A8C8-9AA18A70A9F8}" type="datetimeFigureOut">
               <a:rPr lang="en-US" smtClean="0"/>
-              <a:t>2/5/2016</a:t>
+              <a:t>9/20/2016</a:t>
             </a:fld>
             <a:endParaRPr lang="en-US" dirty="0"/>
           </a:p>
@@ -2243,7 +2243,7 @@
           <a:p>
             <a:fld id="{E28077EF-3DB9-4852-A8C8-9AA18A70A9F8}" type="datetimeFigureOut">
               <a:rPr lang="en-US" smtClean="0"/>
-              <a:t>2/5/2016</a:t>
+              <a:t>9/20/2016</a:t>
             </a:fld>
             <a:endParaRPr lang="en-US" dirty="0"/>
           </a:p>
@@ -2578,7 +2578,7 @@
           <a:p>
             <a:fld id="{E28077EF-3DB9-4852-A8C8-9AA18A70A9F8}" type="datetimeFigureOut">
               <a:rPr lang="en-US" smtClean="0"/>
-              <a:t>2/5/2016</a:t>
+              <a:t>9/20/2016</a:t>
             </a:fld>
             <a:endParaRPr lang="en-US" dirty="0"/>
           </a:p>
@@ -2894,7 +2894,7 @@
           <a:p>
             <a:fld id="{E28077EF-3DB9-4852-A8C8-9AA18A70A9F8}" type="datetimeFigureOut">
               <a:rPr lang="en-US" smtClean="0"/>
-              <a:t>2/5/2016</a:t>
+              <a:t>9/20/2016</a:t>
             </a:fld>
             <a:endParaRPr lang="en-US" dirty="0"/>
           </a:p>
@@ -3289,7 +3289,7 @@
           <a:p>
             <a:fld id="{E28077EF-3DB9-4852-A8C8-9AA18A70A9F8}" type="datetimeFigureOut">
               <a:rPr lang="en-US" smtClean="0"/>
-              <a:t>2/5/2016</a:t>
+              <a:t>9/20/2016</a:t>
             </a:fld>
             <a:endParaRPr lang="en-US" dirty="0"/>
           </a:p>
@@ -3461,7 +3461,7 @@
           <a:p>
             <a:fld id="{80C08BB0-1F20-4C6B-A56C-896A9F73FB4A}" type="datetimeFigureOut">
               <a:rPr lang="en-US" smtClean="0"/>
-              <a:t>2/5/2016</a:t>
+              <a:t>9/20/2016</a:t>
             </a:fld>
             <a:endParaRPr lang="en-US" dirty="0"/>
           </a:p>
@@ -3642,7 +3642,7 @@
           <a:p>
             <a:fld id="{735C60DA-11B7-472A-AFEF-07FB059A27D8}" type="datetimeFigureOut">
               <a:rPr lang="en-US" smtClean="0"/>
-              <a:t>2/5/2016</a:t>
+              <a:t>9/20/2016</a:t>
             </a:fld>
             <a:endParaRPr lang="en-US" dirty="0"/>
           </a:p>
@@ -4018,7 +4018,7 @@
           <a:p>
             <a:fld id="{2651F21A-8405-4DA5-BEAC-3D4CC71D54EA}" type="datetimeFigureOut">
               <a:rPr lang="en-US" smtClean="0"/>
-              <a:t>2/5/2016</a:t>
+              <a:t>9/20/2016</a:t>
             </a:fld>
             <a:endParaRPr lang="en-US" dirty="0"/>
           </a:p>
@@ -4266,7 +4266,7 @@
           <a:p>
             <a:fld id="{78685F84-9683-4B1B-940C-516296C3B9E2}" type="datetimeFigureOut">
               <a:rPr lang="en-US" smtClean="0"/>
-              <a:t>2/5/2016</a:t>
+              <a:t>9/20/2016</a:t>
             </a:fld>
             <a:endParaRPr lang="en-US" dirty="0"/>
           </a:p>
@@ -4569,7 +4569,7 @@
           <a:p>
             <a:fld id="{0657B2AD-074C-4247-B20E-4BA1D1B80702}" type="datetimeFigureOut">
               <a:rPr lang="en-US" smtClean="0"/>
-              <a:t>2/5/2016</a:t>
+              <a:t>9/20/2016</a:t>
             </a:fld>
             <a:endParaRPr lang="en-US" dirty="0"/>
           </a:p>
@@ -4949,7 +4949,7 @@
           <a:p>
             <a:fld id="{8DCC26FB-39E8-4A97-A330-257F2E3058A9}" type="datetimeFigureOut">
               <a:rPr lang="en-US" smtClean="0"/>
-              <a:t>2/5/2016</a:t>
+              <a:t>9/20/2016</a:t>
             </a:fld>
             <a:endParaRPr lang="en-US" dirty="0"/>
           </a:p>
@@ -5073,7 +5073,7 @@
           <a:p>
             <a:fld id="{3EE6405D-5078-464B-95D5-AD1D787A29C3}" type="datetimeFigureOut">
               <a:rPr lang="en-US" smtClean="0"/>
-              <a:t>2/5/2016</a:t>
+              <a:t>9/20/2016</a:t>
             </a:fld>
             <a:endParaRPr lang="en-US" dirty="0"/>
           </a:p>
@@ -5168,7 +5168,7 @@
           <a:p>
             <a:fld id="{8CB55EF8-B59A-48DF-A116-AFDAD4B003AB}" type="datetimeFigureOut">
               <a:rPr lang="en-US" smtClean="0"/>
-              <a:t>2/5/2016</a:t>
+              <a:t>9/20/2016</a:t>
             </a:fld>
             <a:endParaRPr lang="en-US" dirty="0"/>
           </a:p>
@@ -5423,7 +5423,7 @@
           <a:p>
             <a:fld id="{EC94AEE7-DB1F-4DD1-9290-70ECE3C49600}" type="datetimeFigureOut">
               <a:rPr lang="en-US" smtClean="0"/>
-              <a:t>2/5/2016</a:t>
+              <a:t>9/20/2016</a:t>
             </a:fld>
             <a:endParaRPr lang="en-US" dirty="0"/>
           </a:p>
@@ -5687,7 +5687,7 @@
           <a:p>
             <a:fld id="{581F845D-AA64-4C6F-B170-8AA45DD4B329}" type="datetimeFigureOut">
               <a:rPr lang="en-US" smtClean="0"/>
-              <a:t>2/5/2016</a:t>
+              <a:t>9/20/2016</a:t>
             </a:fld>
             <a:endParaRPr lang="en-US" dirty="0"/>
           </a:p>
@@ -6503,7 +6503,7 @@
           <a:p>
             <a:fld id="{E28077EF-3DB9-4852-A8C8-9AA18A70A9F8}" type="datetimeFigureOut">
               <a:rPr lang="en-US" smtClean="0"/>
-              <a:t>2/5/2016</a:t>
+              <a:t>9/20/2016</a:t>
             </a:fld>
             <a:endParaRPr lang="en-US" dirty="0"/>
           </a:p>
@@ -7385,7 +7385,7 @@
               <a:buChar char="§"/>
             </a:pPr>
             <a:r>
-              <a:rPr lang="en-US" dirty="0">
+              <a:rPr lang="en-US" dirty="0" smtClean="0">
                 <a:latin typeface="Courier New"/>
                 <a:ea typeface="Courier New"/>
                 <a:cs typeface="Courier New"/>
@@ -7394,17 +7394,25 @@
               <a:t>x</a:t>
             </a:r>
             <a:r>
-              <a:rPr lang="en" dirty="0">
+              <a:rPr lang="en" dirty="0" smtClean="0">
                 <a:latin typeface="Courier New"/>
                 <a:ea typeface="Courier New"/>
                 <a:cs typeface="Courier New"/>
                 <a:sym typeface="Courier New"/>
               </a:rPr>
-              <a:t>lsx- </a:t>
+              <a:t>lsx - </a:t>
+            </a:r>
+            <a:r>
+              <a:rPr lang="en" dirty="0" smtClean="0"/>
+              <a:t>slightly simplified </a:t>
             </a:r>
             <a:r>
               <a:rPr lang="en" dirty="0"/>
-              <a:t>compacted version of the csv file</a:t>
+              <a:t>version of the csv </a:t>
+            </a:r>
+            <a:r>
+              <a:rPr lang="en" dirty="0" smtClean="0"/>
+              <a:t>file</a:t>
             </a:r>
           </a:p>
           <a:p>
@@ -7419,7 +7427,7 @@
               <a:buChar char="§"/>
             </a:pPr>
             <a:r>
-              <a:rPr lang="en-US" dirty="0">
+              <a:rPr lang="en-US" dirty="0" smtClean="0">
                 <a:latin typeface="Courier New"/>
                 <a:ea typeface="Courier New"/>
                 <a:cs typeface="Courier New"/>
@@ -7428,7 +7436,7 @@
               <a:t>p</a:t>
             </a:r>
             <a:r>
-              <a:rPr lang="en" dirty="0">
+              <a:rPr lang="en" dirty="0" smtClean="0">
                 <a:latin typeface="Courier New"/>
                 <a:ea typeface="Courier New"/>
                 <a:cs typeface="Courier New"/>
@@ -7437,7 +7445,7 @@
               <a:t>sydat - </a:t>
             </a:r>
             <a:r>
-              <a:rPr lang="en" dirty="0"/>
+              <a:rPr lang="en" dirty="0" smtClean="0"/>
               <a:t>complex - but useful for batch processing of results files. Possibly of interest if you are familiar with matplotlib</a:t>
             </a:r>
           </a:p>
@@ -7453,7 +7461,7 @@
               <a:buChar char="§"/>
             </a:pPr>
             <a:r>
-              <a:rPr lang="en-US" dirty="0">
+              <a:rPr lang="en-US" dirty="0" smtClean="0">
                 <a:latin typeface="Courier New"/>
                 <a:ea typeface="Courier New"/>
                 <a:cs typeface="Courier New"/>
@@ -7596,27 +7604,7 @@
                   </a:schemeClr>
                 </a:solidFill>
               </a:rPr>
-              <a:t>An overview </a:t>
-            </a:r>
-            <a:r>
-              <a:rPr lang="en-GB" dirty="0" smtClean="0">
-                <a:solidFill>
-                  <a:schemeClr val="accent1">
-                    <a:lumMod val="75000"/>
-                  </a:schemeClr>
-                </a:solidFill>
-              </a:rPr>
-              <a:t>of the </a:t>
-            </a:r>
-            <a:r>
-              <a:rPr lang="en-GB" dirty="0" smtClean="0">
-                <a:solidFill>
-                  <a:schemeClr val="accent1">
-                    <a:lumMod val="75000"/>
-                  </a:schemeClr>
-                </a:solidFill>
-              </a:rPr>
-              <a:t>interface</a:t>
+              <a:t>An overview of the interface</a:t>
             </a:r>
             <a:endParaRPr lang="en-US" dirty="0"/>
           </a:p>
@@ -7648,15 +7636,7 @@
             </a:r>
             <a:r>
               <a:rPr lang="en-GB" dirty="0" smtClean="0"/>
-              <a:t> </a:t>
-            </a:r>
-            <a:r>
-              <a:rPr lang="en-GB" dirty="0" smtClean="0"/>
-              <a:t>(key items</a:t>
-            </a:r>
-            <a:r>
-              <a:rPr lang="en-GB" dirty="0" smtClean="0"/>
-              <a:t>)</a:t>
+              <a:t> (key items)</a:t>
             </a:r>
           </a:p>
           <a:p>
@@ -8356,11 +8336,7 @@
             </a:pPr>
             <a:r>
               <a:rPr lang="en-GB" b="1" dirty="0" smtClean="0"/>
-              <a:t>Experiment </a:t>
-            </a:r>
-            <a:r>
-              <a:rPr lang="en-GB" b="1" dirty="0" smtClean="0"/>
-              <a:t>flow</a:t>
+              <a:t>Experiment flow</a:t>
             </a:r>
           </a:p>
           <a:p>
@@ -8408,11 +8384,7 @@
             </a:pPr>
             <a:r>
               <a:rPr lang="en-GB" b="1" dirty="0" smtClean="0"/>
-              <a:t>Routine </a:t>
-            </a:r>
-            <a:r>
-              <a:rPr lang="en-GB" b="1" dirty="0" smtClean="0"/>
-              <a:t>timelines</a:t>
+              <a:t>Routine timelines</a:t>
             </a:r>
           </a:p>
           <a:p>
@@ -8490,7 +8462,6 @@
               <a:rPr lang="en-GB" b="1" dirty="0" smtClean="0"/>
               <a:t>Components</a:t>
             </a:r>
-            <a:endParaRPr lang="en-GB" b="1" dirty="0" smtClean="0"/>
           </a:p>
           <a:p>
             <a:pPr lvl="1">
@@ -9188,19 +9159,11 @@
           <a:p>
             <a:r>
               <a:rPr lang="en-GB" b="1" dirty="0" smtClean="0"/>
-              <a:t>Text </a:t>
-            </a:r>
-            <a:r>
-              <a:rPr lang="en-GB" b="1" dirty="0" smtClean="0"/>
-              <a:t>box </a:t>
+              <a:t>Text box </a:t>
             </a:r>
             <a:r>
               <a:rPr lang="en-GB" dirty="0" smtClean="0"/>
-              <a:t>(display component</a:t>
-            </a:r>
-            <a:r>
-              <a:rPr lang="en-GB" dirty="0" smtClean="0"/>
-              <a:t>)</a:t>
+              <a:t>(display component)</a:t>
             </a:r>
           </a:p>
           <a:p>
@@ -9216,11 +9179,7 @@
             </a:r>
             <a:r>
               <a:rPr lang="en-GB" dirty="0" smtClean="0"/>
-              <a:t> </a:t>
-            </a:r>
-            <a:r>
-              <a:rPr lang="en-GB" dirty="0" smtClean="0"/>
-              <a:t>(response component)</a:t>
+              <a:t> (response component)</a:t>
             </a:r>
           </a:p>
           <a:p>
@@ -9315,15 +9274,7 @@
                   <a:srgbClr val="7030A0"/>
                 </a:solidFill>
               </a:rPr>
-              <a:t>When </a:t>
-            </a:r>
-            <a:r>
-              <a:rPr lang="en-GB" sz="1800" b="1" dirty="0" smtClean="0">
-                <a:solidFill>
-                  <a:srgbClr val="7030A0"/>
-                </a:solidFill>
-              </a:rPr>
-              <a:t>you add a component, you must give it a sensible name</a:t>
+              <a:t>When you add a component, you must give it a sensible name</a:t>
             </a:r>
           </a:p>
           <a:p>
@@ -9360,11 +9311,7 @@
             </a:pPr>
             <a:r>
               <a:rPr lang="en-GB" sz="1800" dirty="0" smtClean="0"/>
-              <a:t>These allow us to make them do different things</a:t>
-            </a:r>
-            <a:r>
-              <a:rPr lang="en-GB" sz="1800" dirty="0" smtClean="0"/>
-              <a:t>.</a:t>
+              <a:t>These allow us to make them do different things.</a:t>
             </a:r>
             <a:endParaRPr lang="en-GB" dirty="0" smtClean="0"/>
           </a:p>
@@ -9399,7 +9346,7 @@
         </p:blipFill>
         <p:spPr>
           <a:xfrm>
-            <a:off x="3995935" y="1916832"/>
+            <a:off x="4061902" y="1785291"/>
             <a:ext cx="444132" cy="429806"/>
           </a:xfrm>
           <a:prstGeom prst="rect">
@@ -9429,7 +9376,7 @@
         </p:blipFill>
         <p:spPr>
           <a:xfrm>
-            <a:off x="5861098" y="2492896"/>
+            <a:off x="5940152" y="2494018"/>
             <a:ext cx="422760" cy="429806"/>
           </a:xfrm>
           <a:prstGeom prst="rect">
@@ -9459,7 +9406,7 @@
         </p:blipFill>
         <p:spPr>
           <a:xfrm>
-            <a:off x="5854052" y="2994710"/>
+            <a:off x="5940152" y="3068961"/>
             <a:ext cx="429806" cy="429806"/>
           </a:xfrm>
           <a:prstGeom prst="rect">
@@ -9623,17 +9570,7 @@
                   </a:schemeClr>
                 </a:solidFill>
               </a:rPr>
-              <a:t>Key </a:t>
-            </a:r>
-            <a:r>
-              <a:rPr lang="en-GB" dirty="0" smtClean="0">
-                <a:solidFill>
-                  <a:schemeClr val="accent1">
-                    <a:lumMod val="75000"/>
-                  </a:schemeClr>
-                </a:solidFill>
-              </a:rPr>
-              <a:t>component properties</a:t>
+              <a:t>Key component properties</a:t>
             </a:r>
             <a:endParaRPr lang="en-US" dirty="0">
               <a:solidFill>
@@ -9667,7 +9604,6 @@
               <a:rPr lang="en-GB" dirty="0" smtClean="0"/>
               <a:t>When adding a new component or double clicking a pre-existing one to edit on your timeline, you’re presented with a properties box.</a:t>
             </a:r>
-            <a:endParaRPr lang="en-GB" dirty="0" smtClean="0"/>
           </a:p>
           <a:p>
             <a:pPr marL="0" indent="0">
@@ -9696,7 +9632,6 @@
               <a:rPr lang="en-GB" dirty="0" smtClean="0"/>
               <a:t>Position</a:t>
             </a:r>
-            <a:endParaRPr lang="en-GB" dirty="0" smtClean="0"/>
           </a:p>
           <a:p>
             <a:r>
@@ -9728,31 +9663,26 @@
               <a:rPr lang="en-GB" dirty="0" smtClean="0"/>
               <a:t>….</a:t>
             </a:r>
+          </a:p>
+          <a:p>
             <a:endParaRPr lang="en-GB" dirty="0" smtClean="0"/>
           </a:p>
           <a:p>
+            <a:endParaRPr lang="en-GB" dirty="0"/>
+          </a:p>
+          <a:p>
+            <a:pPr marL="0" indent="0">
+              <a:buNone/>
+            </a:pPr>
             <a:endParaRPr lang="en-GB" dirty="0" smtClean="0"/>
           </a:p>
           <a:p>
-            <a:endParaRPr lang="en-GB" dirty="0"/>
-          </a:p>
-          <a:p>
             <a:pPr marL="0" indent="0">
               <a:buNone/>
             </a:pPr>
-            <a:endParaRPr lang="en-GB" dirty="0" smtClean="0"/>
-          </a:p>
-          <a:p>
-            <a:pPr marL="0" indent="0">
-              <a:buNone/>
-            </a:pPr>
             <a:r>
               <a:rPr lang="en-GB" dirty="0" smtClean="0"/>
-              <a:t>…. And so on</a:t>
-            </a:r>
-            <a:r>
-              <a:rPr lang="en-GB" dirty="0" smtClean="0"/>
-              <a:t>.  Depending on the type of component.</a:t>
+              <a:t>…. And so on.  Depending on the type of component.</a:t>
             </a:r>
           </a:p>
           <a:p>
@@ -9955,11 +9885,7 @@
             </a:r>
             <a:r>
               <a:rPr lang="en-GB" b="1" dirty="0" smtClean="0"/>
-              <a:t> we want to present stimuli or </a:t>
-            </a:r>
-            <a:r>
-              <a:rPr lang="en-GB" b="1" dirty="0" smtClean="0"/>
-              <a:t>trials</a:t>
+              <a:t> we want to present stimuli or trials</a:t>
             </a:r>
           </a:p>
           <a:p>
@@ -9975,11 +9901,7 @@
             </a:pPr>
             <a:r>
               <a:rPr lang="en-GB" dirty="0" smtClean="0"/>
-              <a:t>Often routines are repeated using a </a:t>
-            </a:r>
-            <a:r>
-              <a:rPr lang="en-GB" dirty="0" smtClean="0"/>
-              <a:t>Loop</a:t>
+              <a:t>Often routines are repeated using a Loop</a:t>
             </a:r>
           </a:p>
           <a:p>
@@ -9995,7 +9917,6 @@
               <a:rPr lang="en-GB" b="1" dirty="0" smtClean="0"/>
               <a:t>trials</a:t>
             </a:r>
-            <a:endParaRPr lang="en-GB" b="1" dirty="0" smtClean="0"/>
           </a:p>
           <a:p>
             <a:pPr>
@@ -10004,23 +9925,7 @@
             </a:pPr>
             <a:r>
               <a:rPr lang="en-GB" dirty="0" smtClean="0"/>
-              <a:t>Text, Image or other </a:t>
-            </a:r>
-            <a:r>
-              <a:rPr lang="en-GB" dirty="0" smtClean="0"/>
-              <a:t>components are </a:t>
-            </a:r>
-            <a:r>
-              <a:rPr lang="en-GB" dirty="0" smtClean="0"/>
-              <a:t>repeated </a:t>
-            </a:r>
-            <a:r>
-              <a:rPr lang="en-GB" dirty="0" smtClean="0"/>
-              <a:t>within our </a:t>
-            </a:r>
-            <a:r>
-              <a:rPr lang="en-GB" dirty="0" smtClean="0"/>
-              <a:t>routine/s</a:t>
+              <a:t>Text, Image or other components are repeated within our routine/s</a:t>
             </a:r>
           </a:p>
           <a:p>
@@ -10032,7 +9937,6 @@
               <a:rPr lang="en-GB" dirty="0" smtClean="0"/>
               <a:t>Including their timelines and settings.</a:t>
             </a:r>
-            <a:endParaRPr lang="en-GB" dirty="0" smtClean="0"/>
           </a:p>
           <a:p>
             <a:pPr>
@@ -10041,19 +9945,7 @@
             </a:pPr>
             <a:r>
               <a:rPr lang="en-GB" dirty="0" smtClean="0"/>
-              <a:t>But the actual text/image </a:t>
-            </a:r>
-            <a:r>
-              <a:rPr lang="en-GB" dirty="0" smtClean="0"/>
-              <a:t>may need </a:t>
-            </a:r>
-            <a:r>
-              <a:rPr lang="en-GB" dirty="0" smtClean="0"/>
-              <a:t>to change each </a:t>
-            </a:r>
-            <a:r>
-              <a:rPr lang="en-GB" dirty="0" smtClean="0"/>
-              <a:t>time</a:t>
+              <a:t>But the actual text/image may need to change each time</a:t>
             </a:r>
             <a:r>
               <a:rPr lang="en-GB" dirty="0"/>
@@ -10063,7 +9955,6 @@
               <a:rPr lang="en-GB" dirty="0" smtClean="0"/>
               <a:t>to represent trial stimuli.</a:t>
             </a:r>
-            <a:endParaRPr lang="en-GB" dirty="0" smtClean="0"/>
           </a:p>
           <a:p>
             <a:pPr marL="457200" lvl="1" indent="0">
@@ -10087,11 +9978,6 @@
               </a:rPr>
               <a:t>But how?...</a:t>
             </a:r>
-            <a:endParaRPr lang="en-GB" sz="2800" dirty="0" smtClean="0">
-              <a:solidFill>
-                <a:srgbClr val="FF0000"/>
-              </a:solidFill>
-            </a:endParaRPr>
           </a:p>
         </p:txBody>
       </p:sp>
@@ -10191,15 +10077,7 @@
             </a:pPr>
             <a:r>
               <a:rPr lang="en-GB" b="1" dirty="0" smtClean="0"/>
-              <a:t>Created </a:t>
-            </a:r>
-            <a:r>
-              <a:rPr lang="en-GB" b="1" dirty="0" smtClean="0"/>
-              <a:t>in </a:t>
-            </a:r>
-            <a:r>
-              <a:rPr lang="en-GB" b="1" dirty="0" smtClean="0"/>
-              <a:t>Excel or package that can create CSV files</a:t>
+              <a:t>Created in Excel or package that can create CSV files</a:t>
             </a:r>
             <a:endParaRPr lang="en-GB" b="1" dirty="0"/>
           </a:p>
@@ -10223,15 +10101,7 @@
             </a:pPr>
             <a:r>
               <a:rPr lang="en-GB" dirty="0" smtClean="0"/>
-              <a:t>Headings </a:t>
-            </a:r>
-            <a:r>
-              <a:rPr lang="en-GB" dirty="0" smtClean="0"/>
-              <a:t>refer to “attributes” that are created for us that we can use as our trial </a:t>
-            </a:r>
-            <a:r>
-              <a:rPr lang="en-GB" dirty="0" smtClean="0"/>
-              <a:t>data</a:t>
+              <a:t>Headings refer to “attributes” that are created for us that we can use as our trial data</a:t>
             </a:r>
           </a:p>
           <a:p>
@@ -10608,7 +10478,15 @@
             </a:r>
             <a:r>
               <a:rPr lang="en-GB" sz="1100" dirty="0" smtClean="0"/>
-              <a:t>” routine and the components within.</a:t>
+              <a:t>” routine and the </a:t>
+            </a:r>
+            <a:r>
+              <a:rPr lang="en-GB" sz="1100" b="1" dirty="0" smtClean="0"/>
+              <a:t>components</a:t>
+            </a:r>
+            <a:r>
+              <a:rPr lang="en-GB" sz="1100" dirty="0" smtClean="0"/>
+              <a:t> within.</a:t>
             </a:r>
             <a:endParaRPr lang="en-US" sz="1100" dirty="0"/>
           </a:p>
@@ -11049,15 +10927,21 @@
           <p:nvPr/>
         </p:nvPicPr>
         <p:blipFill>
-          <a:blip r:embed="rId4"/>
+          <a:blip r:embed="rId4">
+            <a:extLst>
+              <a:ext uri="{28A0092B-C50C-407E-A947-70E740481C1C}">
+                <a14:useLocalDpi xmlns:a14="http://schemas.microsoft.com/office/drawing/2010/main" val="0"/>
+              </a:ext>
+            </a:extLst>
+          </a:blip>
           <a:stretch>
             <a:fillRect/>
           </a:stretch>
         </p:blipFill>
         <p:spPr>
           <a:xfrm>
-            <a:off x="4860032" y="1772816"/>
-            <a:ext cx="3748769" cy="3521571"/>
+            <a:off x="4860032" y="1773392"/>
+            <a:ext cx="3748769" cy="3520418"/>
           </a:xfrm>
           <a:prstGeom prst="rect">
             <a:avLst/>
@@ -11207,7 +11091,23 @@
             <a:pPr algn="ctr"/>
             <a:r>
               <a:rPr lang="en-GB" sz="1600" dirty="0" smtClean="0"/>
-              <a:t>Crucially, we MUST change the update method from “Constant” to “Set every repeat”.</a:t>
+              <a:t>Crucially, we MUST change the update method from “</a:t>
+            </a:r>
+            <a:r>
+              <a:rPr lang="en-GB" sz="1600" b="1" dirty="0" smtClean="0"/>
+              <a:t>Constant</a:t>
+            </a:r>
+            <a:r>
+              <a:rPr lang="en-GB" sz="1600" dirty="0" smtClean="0"/>
+              <a:t>” to “</a:t>
+            </a:r>
+            <a:r>
+              <a:rPr lang="en-GB" sz="1600" b="1" dirty="0" smtClean="0"/>
+              <a:t>Set every repeat</a:t>
+            </a:r>
+            <a:r>
+              <a:rPr lang="en-GB" sz="1600" dirty="0" smtClean="0"/>
+              <a:t>”.</a:t>
             </a:r>
           </a:p>
           <a:p>
@@ -12097,15 +11997,22 @@
           </p:cNvPicPr>
           <p:nvPr/>
         </p:nvPicPr>
-        <p:blipFill rotWithShape="1">
-          <a:blip r:embed="rId4"/>
-          <a:srcRect t="42581" r="22596" b="12304"/>
-          <a:stretch/>
+        <p:blipFill>
+          <a:blip r:embed="rId4">
+            <a:extLst>
+              <a:ext uri="{28A0092B-C50C-407E-A947-70E740481C1C}">
+                <a14:useLocalDpi xmlns:a14="http://schemas.microsoft.com/office/drawing/2010/main" val="0"/>
+              </a:ext>
+            </a:extLst>
+          </a:blip>
+          <a:stretch>
+            <a:fillRect/>
+          </a:stretch>
         </p:blipFill>
         <p:spPr>
           <a:xfrm>
-            <a:off x="5949421" y="2190876"/>
-            <a:ext cx="2901718" cy="1584176"/>
+            <a:off x="5949709" y="2190876"/>
+            <a:ext cx="2901141" cy="1584176"/>
           </a:xfrm>
           <a:prstGeom prst="rect">
             <a:avLst/>
@@ -12730,7 +12637,15 @@
                   <a:schemeClr val="tx1"/>
                 </a:solidFill>
               </a:rPr>
-              <a:t>=(update </a:t>
+              <a:t>= (</a:t>
+            </a:r>
+            <a:r>
+              <a:rPr lang="en-GB" sz="1800" dirty="0" smtClean="0">
+                <a:solidFill>
+                  <a:schemeClr val="tx1"/>
+                </a:solidFill>
+              </a:rPr>
+              <a:t>update </a:t>
             </a:r>
             <a:r>
               <a:rPr lang="en-GB" sz="1800" dirty="0">
@@ -12777,62 +12692,30 @@
                   <a:schemeClr val="tx1"/>
                 </a:solidFill>
               </a:rPr>
-              <a:t>“Set </a:t>
-            </a:r>
+              <a:t>“Set every frame” option updates </a:t>
+            </a:r>
+            <a:r>
+              <a:rPr lang="en-GB" sz="1400" dirty="0" smtClean="0">
+                <a:solidFill>
+                  <a:schemeClr val="tx1"/>
+                </a:solidFill>
+              </a:rPr>
+              <a:t>component at every single screen refresh</a:t>
+            </a:r>
+          </a:p>
+          <a:p>
+            <a:pPr marL="0" lvl="1" indent="0">
+              <a:buNone/>
+            </a:pPr>
             <a:r>
               <a:rPr lang="en-GB" sz="1400" b="1" dirty="0" smtClean="0">
                 <a:solidFill>
                   <a:schemeClr val="tx1"/>
                 </a:solidFill>
               </a:rPr>
-              <a:t>every </a:t>
-            </a:r>
-            <a:r>
-              <a:rPr lang="en-GB" sz="1400" b="1" dirty="0" smtClean="0">
-                <a:solidFill>
-                  <a:schemeClr val="tx1"/>
-                </a:solidFill>
-              </a:rPr>
-              <a:t>frame” option updates </a:t>
-            </a:r>
-            <a:r>
-              <a:rPr lang="en-GB" sz="1400" dirty="0" smtClean="0">
-                <a:solidFill>
-                  <a:schemeClr val="tx1"/>
-                </a:solidFill>
-              </a:rPr>
-              <a:t>component </a:t>
-            </a:r>
-            <a:r>
-              <a:rPr lang="en-GB" sz="1400" dirty="0" smtClean="0">
-                <a:solidFill>
-                  <a:schemeClr val="tx1"/>
-                </a:solidFill>
-              </a:rPr>
-              <a:t>at every single screen </a:t>
-            </a:r>
-            <a:r>
-              <a:rPr lang="en-GB" sz="1400" dirty="0" smtClean="0">
-                <a:solidFill>
-                  <a:schemeClr val="tx1"/>
-                </a:solidFill>
-              </a:rPr>
-              <a:t>refresh</a:t>
-            </a:r>
-          </a:p>
-          <a:p>
-            <a:pPr marL="0" lvl="1" indent="0">
-              <a:buNone/>
-            </a:pPr>
-            <a:r>
-              <a:rPr lang="en-GB" sz="1400" dirty="0" smtClean="0">
-                <a:solidFill>
-                  <a:schemeClr val="tx1"/>
-                </a:solidFill>
-              </a:rPr>
               <a:t>= Overkill!</a:t>
             </a:r>
-            <a:endParaRPr lang="en-GB" sz="1800" dirty="0" smtClean="0">
+            <a:endParaRPr lang="en-GB" sz="1800" b="1" dirty="0" smtClean="0">
               <a:solidFill>
                 <a:schemeClr val="tx1"/>
               </a:solidFill>
@@ -12894,11 +12777,6 @@
               </a:rPr>
               <a:t> new columns)</a:t>
             </a:r>
-            <a:endParaRPr lang="en-GB" sz="2000" dirty="0" smtClean="0">
-              <a:solidFill>
-                <a:schemeClr val="tx1"/>
-              </a:solidFill>
-            </a:endParaRPr>
           </a:p>
           <a:p>
             <a:pPr marL="457200" lvl="1" indent="0">
@@ -13339,7 +13217,23 @@
             </a:pPr>
             <a:r>
               <a:rPr lang="en-GB" dirty="0" smtClean="0"/>
-              <a:t>Change the intro text and the first line “OK. Ready for the real thing?” to “Instructions”</a:t>
+              <a:t>Change the intro text and the first line “</a:t>
+            </a:r>
+            <a:r>
+              <a:rPr lang="en-GB" b="1" dirty="0" smtClean="0"/>
+              <a:t>OK. Ready for the real thing?</a:t>
+            </a:r>
+            <a:r>
+              <a:rPr lang="en-GB" dirty="0" smtClean="0"/>
+              <a:t>” to “</a:t>
+            </a:r>
+            <a:r>
+              <a:rPr lang="en-GB" b="1" dirty="0" smtClean="0"/>
+              <a:t>Instructions</a:t>
+            </a:r>
+            <a:r>
+              <a:rPr lang="en-GB" dirty="0" smtClean="0"/>
+              <a:t>”</a:t>
             </a:r>
           </a:p>
           <a:p>
@@ -13349,7 +13243,19 @@
             </a:pPr>
             <a:r>
               <a:rPr lang="en-GB" dirty="0" smtClean="0"/>
-              <a:t>Update keyboard input from “left”, “down”, “right” to “a”, “s”, “d”</a:t>
+              <a:t>Update keyboard input from </a:t>
+            </a:r>
+            <a:r>
+              <a:rPr lang="en-GB" b="1" dirty="0" smtClean="0"/>
+              <a:t>“left”, “down”, “right” </a:t>
+            </a:r>
+            <a:r>
+              <a:rPr lang="en-GB" dirty="0" smtClean="0"/>
+              <a:t>to </a:t>
+            </a:r>
+            <a:r>
+              <a:rPr lang="en-GB" b="1" dirty="0" smtClean="0"/>
+              <a:t>“a”, “s”, “d”</a:t>
             </a:r>
           </a:p>
           <a:p>
@@ -13938,11 +13844,7 @@
           <a:p>
             <a:r>
               <a:rPr lang="en-GB" dirty="0" smtClean="0"/>
-              <a:t>By </a:t>
-            </a:r>
-            <a:r>
-              <a:rPr lang="en-GB" dirty="0" smtClean="0"/>
-              <a:t>default, when running an experiment you can press ESC</a:t>
+              <a:t>By default, when running an experiment you can press ESC</a:t>
             </a:r>
           </a:p>
           <a:p>
@@ -14219,8 +14121,29 @@
             </a:pPr>
             <a:r>
               <a:rPr lang="en-GB" dirty="0" smtClean="0"/>
-              <a:t>You will need to store a path to each image for each of the 5</a:t>
-            </a:r>
+              <a:t>You will need to </a:t>
+            </a:r>
+            <a:r>
+              <a:rPr lang="en-GB" dirty="0" smtClean="0"/>
+              <a:t>enter a </a:t>
+            </a:r>
+            <a:r>
+              <a:rPr lang="en-GB" b="1" dirty="0" smtClean="0"/>
+              <a:t>“relative” </a:t>
+            </a:r>
+            <a:r>
+              <a:rPr lang="en-GB" dirty="0" smtClean="0"/>
+              <a:t>path for </a:t>
+            </a:r>
+            <a:r>
+              <a:rPr lang="en-GB" dirty="0" smtClean="0"/>
+              <a:t>each </a:t>
+            </a:r>
+            <a:r>
+              <a:rPr lang="en-GB" dirty="0" smtClean="0"/>
+              <a:t>image</a:t>
+            </a:r>
+            <a:endParaRPr lang="en-GB" dirty="0" smtClean="0"/>
           </a:p>
           <a:p>
             <a:pPr lvl="2">
@@ -14240,8 +14163,35 @@
             </a:r>
             <a:r>
               <a:rPr lang="en-GB" dirty="0" smtClean="0"/>
-              <a:t>”  (without the quotes)</a:t>
-            </a:r>
+              <a:t>”  (without the quotes</a:t>
+            </a:r>
+            <a:r>
+              <a:rPr lang="en-GB" dirty="0" smtClean="0"/>
+              <a:t>)</a:t>
+            </a:r>
+          </a:p>
+          <a:p>
+            <a:pPr lvl="2">
+              <a:buFont typeface="Wingdings" panose="05000000000000000000" pitchFamily="2" charset="2"/>
+              <a:buChar char="§"/>
+            </a:pPr>
+            <a:r>
+              <a:rPr lang="en-GB" b="1" dirty="0" smtClean="0"/>
+              <a:t>Hint</a:t>
+            </a:r>
+            <a:r>
+              <a:rPr lang="en-GB" dirty="0" smtClean="0"/>
+              <a:t> - Create a new attribute called “</a:t>
+            </a:r>
+            <a:r>
+              <a:rPr lang="en-GB" dirty="0" err="1" smtClean="0"/>
+              <a:t>image_path</a:t>
+            </a:r>
+            <a:r>
+              <a:rPr lang="en-GB" dirty="0" smtClean="0"/>
+              <a:t>”</a:t>
+            </a:r>
+            <a:endParaRPr lang="en-GB" dirty="0" smtClean="0"/>
           </a:p>
           <a:p>
             <a:pPr lvl="1">
@@ -14250,7 +14200,19 @@
             </a:pPr>
             <a:r>
               <a:rPr lang="en-GB" dirty="0" smtClean="0"/>
-              <a:t>That path then needs to be passed to an image component</a:t>
+              <a:t>That path then needs to be passed to an </a:t>
+            </a:r>
+            <a:r>
+              <a:rPr lang="en-GB" b="1" dirty="0" smtClean="0"/>
+              <a:t>image</a:t>
+            </a:r>
+            <a:r>
+              <a:rPr lang="en-GB" dirty="0" smtClean="0"/>
+              <a:t> </a:t>
+            </a:r>
+            <a:r>
+              <a:rPr lang="en-GB" b="1" dirty="0" smtClean="0"/>
+              <a:t>component</a:t>
             </a:r>
           </a:p>
           <a:p>
@@ -14259,8 +14221,12 @@
               <a:buChar char="§"/>
             </a:pPr>
             <a:r>
+              <a:rPr lang="en-GB" b="1" dirty="0" smtClean="0"/>
+              <a:t>Remember: </a:t>
+            </a:r>
+            <a:r>
               <a:rPr lang="en-GB" dirty="0" smtClean="0"/>
-              <a:t>Remember: when trial data is updated, Excel link needs refreshing.</a:t>
+              <a:t>when trial data is updated, Excel link needs refreshing.</a:t>
             </a:r>
           </a:p>
           <a:p>
@@ -14270,9 +14236,21 @@
             </a:pPr>
             <a:r>
               <a:rPr lang="en-GB" dirty="0" smtClean="0"/>
-              <a:t>Attributes are accessed with $ and name of excel header</a:t>
-            </a:r>
-            <a:endParaRPr lang="en-GB" dirty="0"/>
+              <a:t>Attributes are accessed with </a:t>
+            </a:r>
+            <a:r>
+              <a:rPr lang="en-GB" b="1" dirty="0" smtClean="0"/>
+              <a:t>$</a:t>
+            </a:r>
+            <a:r>
+              <a:rPr lang="en-GB" dirty="0" smtClean="0"/>
+              <a:t> and </a:t>
+            </a:r>
+            <a:r>
+              <a:rPr lang="en-GB" b="1" dirty="0" smtClean="0"/>
+              <a:t>name of excel header</a:t>
+            </a:r>
+            <a:endParaRPr lang="en-GB" b="1" dirty="0"/>
           </a:p>
           <a:p>
             <a:pPr marL="0" indent="0">
@@ -14672,11 +14650,6 @@
                         </a:rPr>
                         <a:t> recently.</a:t>
                       </a:r>
-                      <a:endParaRPr lang="en-GB" sz="1400" b="1" i="1" baseline="0" dirty="0" smtClean="0">
-                        <a:solidFill>
-                          <a:srgbClr val="7030A0"/>
-                        </a:solidFill>
-                      </a:endParaRPr>
                     </a:p>
                   </a:txBody>
                   <a:tcPr/>
@@ -15310,7 +15283,7 @@
                 <a:cs typeface="Courier New"/>
                 <a:sym typeface="Courier New"/>
               </a:rPr>
-              <a:t>2015/16</a:t>
+              <a:t>2016/17</a:t>
             </a:r>
             <a:r>
               <a:rPr lang="en" sz="1400" dirty="0" smtClean="0">
@@ -15321,7 +15294,18 @@
                 <a:cs typeface="Courier New"/>
                 <a:sym typeface="Courier New"/>
               </a:rPr>
-              <a:t> we are using </a:t>
+              <a:t> </a:t>
+            </a:r>
+            <a:r>
+              <a:rPr lang="en" sz="1400" dirty="0" smtClean="0">
+                <a:solidFill>
+                  <a:schemeClr val="tx1"/>
+                </a:solidFill>
+                <a:ea typeface="Courier New"/>
+                <a:cs typeface="Courier New"/>
+                <a:sym typeface="Courier New"/>
+              </a:rPr>
+              <a:t>we are using </a:t>
             </a:r>
             <a:r>
               <a:rPr lang="en" sz="1400" dirty="0" smtClean="0">
@@ -15332,7 +15316,7 @@
                 <a:cs typeface="Courier New"/>
                 <a:sym typeface="Courier New"/>
               </a:rPr>
-              <a:t>v1.82.01</a:t>
+              <a:t>v1.83.04</a:t>
             </a:r>
             <a:r>
               <a:rPr lang="en" sz="1400" dirty="0" smtClean="0">
@@ -15343,7 +15327,18 @@
                 <a:cs typeface="Courier New"/>
                 <a:sym typeface="Courier New"/>
               </a:rPr>
-              <a:t> of PsychoPy</a:t>
+              <a:t> </a:t>
+            </a:r>
+            <a:r>
+              <a:rPr lang="en" sz="1400" dirty="0" smtClean="0">
+                <a:solidFill>
+                  <a:schemeClr val="tx1"/>
+                </a:solidFill>
+                <a:ea typeface="Courier New"/>
+                <a:cs typeface="Courier New"/>
+                <a:sym typeface="Courier New"/>
+              </a:rPr>
+              <a:t>of PsychoPy</a:t>
             </a:r>
           </a:p>
           <a:p>
@@ -15598,7 +15593,7 @@
                 <a:cs typeface="Courier New"/>
                 <a:sym typeface="Courier New"/>
               </a:rPr>
-              <a:t>Student/staff PC’s (like you are on now), should already have it installed via the location you’ve used</a:t>
+              <a:t>Student/staff PC’s (like you are on now), should already have it installed </a:t>
             </a:r>
             <a:r>
               <a:rPr lang="en" sz="1400" dirty="0" smtClean="0">
@@ -15609,16 +15604,19 @@
                 <a:cs typeface="Courier New"/>
                 <a:sym typeface="Courier New"/>
               </a:rPr>
-              <a:t>.  We show how to load it a few slides on…</a:t>
-            </a:r>
-            <a:endParaRPr lang="en" sz="1400" dirty="0" smtClean="0">
-              <a:solidFill>
-                <a:schemeClr val="tx1"/>
-              </a:solidFill>
-              <a:ea typeface="Courier New"/>
-              <a:cs typeface="Courier New"/>
-              <a:sym typeface="Courier New"/>
-            </a:endParaRPr>
+              <a:t>on the PC you are on.  </a:t>
+            </a:r>
+            <a:r>
+              <a:rPr lang="en" sz="1400" dirty="0" smtClean="0">
+                <a:solidFill>
+                  <a:schemeClr val="tx1"/>
+                </a:solidFill>
+                <a:ea typeface="Courier New"/>
+                <a:cs typeface="Courier New"/>
+                <a:sym typeface="Courier New"/>
+              </a:rPr>
+              <a:t>We show how to load it a few slides on…</a:t>
+            </a:r>
           </a:p>
           <a:p>
             <a:pPr marL="76200" indent="0">
@@ -16329,29 +16327,52 @@
               <a:buChar char="§"/>
             </a:pPr>
             <a:r>
+              <a:rPr lang="en" sz="2000" dirty="0" smtClean="0">
+                <a:latin typeface="Trebuchet MS" panose="020B0603020202020204" pitchFamily="34" charset="0"/>
+                <a:ea typeface="Courier New"/>
+                <a:cs typeface="Courier New"/>
+                <a:sym typeface="Courier New"/>
+              </a:rPr>
+              <a:t>Student PC’s (N1.04)</a:t>
+            </a:r>
+          </a:p>
+          <a:p>
+            <a:pPr marL="1314450" lvl="2" indent="-381000">
+              <a:buClr>
+                <a:schemeClr val="accent1">
+                  <a:lumMod val="75000"/>
+                </a:schemeClr>
+              </a:buClr>
+              <a:buFont typeface="Wingdings" panose="05000000000000000000" pitchFamily="2" charset="2"/>
+              <a:buChar char="§"/>
+            </a:pPr>
+            <a:r>
+              <a:rPr lang="en" sz="2000" dirty="0" smtClean="0">
+                <a:latin typeface="Courier New"/>
+                <a:ea typeface="Courier New"/>
+                <a:cs typeface="Courier New"/>
+                <a:sym typeface="Courier New"/>
+              </a:rPr>
+              <a:t>START </a:t>
+            </a:r>
+            <a:r>
               <a:rPr lang="en" sz="2000" dirty="0">
                 <a:latin typeface="Courier New"/>
                 <a:ea typeface="Courier New"/>
                 <a:cs typeface="Courier New"/>
                 <a:sym typeface="Courier New"/>
               </a:rPr>
-              <a:t>START | Programs | Departmental Software |</a:t>
-            </a:r>
-          </a:p>
-          <a:p>
-            <a:pPr marL="914400" lvl="1" indent="-381000" rtl="0">
-              <a:spcBef>
-                <a:spcPts val="0"/>
-              </a:spcBef>
-              <a:buClr>
-                <a:schemeClr val="accent1">
-                  <a:lumMod val="75000"/>
-                </a:schemeClr>
-              </a:buClr>
-              <a:buSzPct val="80000"/>
-              <a:buFont typeface="Wingdings" panose="05000000000000000000" pitchFamily="2" charset="2"/>
-              <a:buChar char="§"/>
-            </a:pPr>
+              <a:t>| Programs | Departmental Software </a:t>
+            </a:r>
+            <a:r>
+              <a:rPr lang="en" sz="2000" dirty="0" smtClean="0">
+                <a:latin typeface="Courier New"/>
+                <a:ea typeface="Courier New"/>
+                <a:cs typeface="Courier New"/>
+                <a:sym typeface="Courier New"/>
+              </a:rPr>
+              <a:t>| School </a:t>
+            </a:r>
             <a:r>
               <a:rPr lang="en" sz="2000" dirty="0">
                 <a:latin typeface="Courier New"/>
@@ -16359,7 +16380,7 @@
                 <a:cs typeface="Courier New"/>
                 <a:sym typeface="Courier New"/>
               </a:rPr>
-              <a:t>.. School of Psychology | </a:t>
+              <a:t>of Psychology | </a:t>
             </a:r>
             <a:r>
               <a:rPr lang="en" sz="2000" dirty="0" smtClean="0">
@@ -16372,18 +16393,70 @@
             </a:r>
           </a:p>
           <a:p>
-            <a:pPr marL="533400" lvl="1" indent="0" rtl="0">
-              <a:spcBef>
-                <a:spcPts val="0"/>
-              </a:spcBef>
+            <a:pPr marL="914400" lvl="1" indent="-381000">
               <a:buClr>
                 <a:schemeClr val="accent1">
                   <a:lumMod val="75000"/>
                 </a:schemeClr>
               </a:buClr>
-              <a:buSzPct val="80000"/>
-              <a:buNone/>
-            </a:pPr>
+              <a:buFont typeface="Wingdings" panose="05000000000000000000" pitchFamily="2" charset="2"/>
+              <a:buChar char="§"/>
+            </a:pPr>
+            <a:r>
+              <a:rPr lang="en" sz="2400" dirty="0" smtClean="0">
+                <a:latin typeface="Trebuchet MS" panose="020B0603020202020204" pitchFamily="34" charset="0"/>
+                <a:ea typeface="Courier New"/>
+                <a:cs typeface="Courier New"/>
+                <a:sym typeface="Courier New"/>
+              </a:rPr>
+              <a:t>Lab / Staff PC’s</a:t>
+            </a:r>
+            <a:endParaRPr lang="en" sz="2400" dirty="0">
+              <a:latin typeface="Trebuchet MS" panose="020B0603020202020204" pitchFamily="34" charset="0"/>
+              <a:ea typeface="Courier New"/>
+              <a:cs typeface="Courier New"/>
+              <a:sym typeface="Courier New"/>
+            </a:endParaRPr>
+          </a:p>
+          <a:p>
+            <a:pPr marL="1314450" lvl="2" indent="-381000">
+              <a:buClr>
+                <a:schemeClr val="accent1">
+                  <a:lumMod val="75000"/>
+                </a:schemeClr>
+              </a:buClr>
+              <a:buFont typeface="Wingdings" panose="05000000000000000000" pitchFamily="2" charset="2"/>
+              <a:buChar char="§"/>
+            </a:pPr>
+            <a:r>
+              <a:rPr lang="en" sz="2000" dirty="0" smtClean="0">
+                <a:latin typeface="Courier New"/>
+                <a:ea typeface="Courier New"/>
+                <a:cs typeface="Courier New"/>
+                <a:sym typeface="Courier New"/>
+              </a:rPr>
+              <a:t>START | PsychoPy</a:t>
+            </a:r>
+          </a:p>
+          <a:p>
+            <a:pPr marL="1314450" lvl="2" indent="-381000">
+              <a:buClr>
+                <a:schemeClr val="accent1">
+                  <a:lumMod val="75000"/>
+                </a:schemeClr>
+              </a:buClr>
+              <a:buFont typeface="Wingdings" panose="05000000000000000000" pitchFamily="2" charset="2"/>
+              <a:buChar char="§"/>
+            </a:pPr>
+            <a:r>
+              <a:rPr lang="en" sz="2000" dirty="0" smtClean="0">
+                <a:latin typeface="Courier New"/>
+                <a:ea typeface="Courier New"/>
+                <a:cs typeface="Courier New"/>
+                <a:sym typeface="Courier New"/>
+              </a:rPr>
+              <a:t>If not present, please contact psychsupport@kent.ac.uk</a:t>
+            </a:r>
             <a:endParaRPr lang="en" sz="2000" dirty="0">
               <a:latin typeface="Courier New"/>
               <a:ea typeface="Courier New"/>
@@ -16869,13 +16942,33 @@
             </a:r>
             <a:r>
               <a:rPr lang="en-GB" dirty="0" smtClean="0"/>
-              <a:t> from within your directory</a:t>
-            </a:r>
-          </a:p>
-          <a:p>
+              <a:t> from within your </a:t>
+            </a:r>
+            <a:r>
+              <a:rPr lang="en-GB" dirty="0" smtClean="0">
+                <a:latin typeface="Courier New" panose="02070309020205020404" pitchFamily="49" charset="0"/>
+                <a:cs typeface="Courier New" panose="02070309020205020404" pitchFamily="49" charset="0"/>
+              </a:rPr>
+              <a:t>C:/work </a:t>
+            </a:r>
             <a:r>
               <a:rPr lang="en-GB" dirty="0" smtClean="0"/>
-              <a:t>Don’t worry what everything is just yet, we’ll cover it later!</a:t>
+              <a:t>directory</a:t>
+            </a:r>
+            <a:endParaRPr lang="en-GB" dirty="0" smtClean="0"/>
+          </a:p>
+          <a:p>
+            <a:r>
+              <a:rPr lang="en-GB" dirty="0" smtClean="0"/>
+              <a:t>Don’t worry what everything is just yet, we’ll cover it </a:t>
+            </a:r>
+            <a:r>
+              <a:rPr lang="en-GB" dirty="0" smtClean="0"/>
+              <a:t>later</a:t>
+            </a:r>
+            <a:r>
+              <a:rPr lang="en-GB" dirty="0" smtClean="0"/>
+              <a:t>!</a:t>
             </a:r>
           </a:p>
           <a:p>

</xml_diff>

<commit_message>
Updated for new year
</commit_message>
<xml_diff>
--- a/PsychoPy-Part1/PsychoPy-part1.pptx
+++ b/PsychoPy-Part1/PsychoPy-part1.pptx
@@ -1670,7 +1670,7 @@
           <a:p>
             <a:fld id="{B4554F2B-4BCF-4197-901F-D7CA0C5C3346}" type="datetimeFigureOut">
               <a:rPr lang="en-US" smtClean="0"/>
-              <a:t>9/20/2016</a:t>
+              <a:t>10/3/2017</a:t>
             </a:fld>
             <a:endParaRPr lang="en-US" dirty="0"/>
           </a:p>
@@ -1927,7 +1927,7 @@
           <a:p>
             <a:fld id="{E28077EF-3DB9-4852-A8C8-9AA18A70A9F8}" type="datetimeFigureOut">
               <a:rPr lang="en-US" smtClean="0"/>
-              <a:t>9/20/2016</a:t>
+              <a:t>10/3/2017</a:t>
             </a:fld>
             <a:endParaRPr lang="en-US" dirty="0"/>
           </a:p>
@@ -2243,7 +2243,7 @@
           <a:p>
             <a:fld id="{E28077EF-3DB9-4852-A8C8-9AA18A70A9F8}" type="datetimeFigureOut">
               <a:rPr lang="en-US" smtClean="0"/>
-              <a:t>9/20/2016</a:t>
+              <a:t>10/3/2017</a:t>
             </a:fld>
             <a:endParaRPr lang="en-US" dirty="0"/>
           </a:p>
@@ -2578,7 +2578,7 @@
           <a:p>
             <a:fld id="{E28077EF-3DB9-4852-A8C8-9AA18A70A9F8}" type="datetimeFigureOut">
               <a:rPr lang="en-US" smtClean="0"/>
-              <a:t>9/20/2016</a:t>
+              <a:t>10/3/2017</a:t>
             </a:fld>
             <a:endParaRPr lang="en-US" dirty="0"/>
           </a:p>
@@ -2894,7 +2894,7 @@
           <a:p>
             <a:fld id="{E28077EF-3DB9-4852-A8C8-9AA18A70A9F8}" type="datetimeFigureOut">
               <a:rPr lang="en-US" smtClean="0"/>
-              <a:t>9/20/2016</a:t>
+              <a:t>10/3/2017</a:t>
             </a:fld>
             <a:endParaRPr lang="en-US" dirty="0"/>
           </a:p>
@@ -3289,7 +3289,7 @@
           <a:p>
             <a:fld id="{E28077EF-3DB9-4852-A8C8-9AA18A70A9F8}" type="datetimeFigureOut">
               <a:rPr lang="en-US" smtClean="0"/>
-              <a:t>9/20/2016</a:t>
+              <a:t>10/3/2017</a:t>
             </a:fld>
             <a:endParaRPr lang="en-US" dirty="0"/>
           </a:p>
@@ -3461,7 +3461,7 @@
           <a:p>
             <a:fld id="{80C08BB0-1F20-4C6B-A56C-896A9F73FB4A}" type="datetimeFigureOut">
               <a:rPr lang="en-US" smtClean="0"/>
-              <a:t>9/20/2016</a:t>
+              <a:t>10/3/2017</a:t>
             </a:fld>
             <a:endParaRPr lang="en-US" dirty="0"/>
           </a:p>
@@ -3642,7 +3642,7 @@
           <a:p>
             <a:fld id="{735C60DA-11B7-472A-AFEF-07FB059A27D8}" type="datetimeFigureOut">
               <a:rPr lang="en-US" smtClean="0"/>
-              <a:t>9/20/2016</a:t>
+              <a:t>10/3/2017</a:t>
             </a:fld>
             <a:endParaRPr lang="en-US" dirty="0"/>
           </a:p>
@@ -4018,7 +4018,7 @@
           <a:p>
             <a:fld id="{2651F21A-8405-4DA5-BEAC-3D4CC71D54EA}" type="datetimeFigureOut">
               <a:rPr lang="en-US" smtClean="0"/>
-              <a:t>9/20/2016</a:t>
+              <a:t>10/3/2017</a:t>
             </a:fld>
             <a:endParaRPr lang="en-US" dirty="0"/>
           </a:p>
@@ -4266,7 +4266,7 @@
           <a:p>
             <a:fld id="{78685F84-9683-4B1B-940C-516296C3B9E2}" type="datetimeFigureOut">
               <a:rPr lang="en-US" smtClean="0"/>
-              <a:t>9/20/2016</a:t>
+              <a:t>10/3/2017</a:t>
             </a:fld>
             <a:endParaRPr lang="en-US" dirty="0"/>
           </a:p>
@@ -4569,7 +4569,7 @@
           <a:p>
             <a:fld id="{0657B2AD-074C-4247-B20E-4BA1D1B80702}" type="datetimeFigureOut">
               <a:rPr lang="en-US" smtClean="0"/>
-              <a:t>9/20/2016</a:t>
+              <a:t>10/3/2017</a:t>
             </a:fld>
             <a:endParaRPr lang="en-US" dirty="0"/>
           </a:p>
@@ -4949,7 +4949,7 @@
           <a:p>
             <a:fld id="{8DCC26FB-39E8-4A97-A330-257F2E3058A9}" type="datetimeFigureOut">
               <a:rPr lang="en-US" smtClean="0"/>
-              <a:t>9/20/2016</a:t>
+              <a:t>10/3/2017</a:t>
             </a:fld>
             <a:endParaRPr lang="en-US" dirty="0"/>
           </a:p>
@@ -5073,7 +5073,7 @@
           <a:p>
             <a:fld id="{3EE6405D-5078-464B-95D5-AD1D787A29C3}" type="datetimeFigureOut">
               <a:rPr lang="en-US" smtClean="0"/>
-              <a:t>9/20/2016</a:t>
+              <a:t>10/3/2017</a:t>
             </a:fld>
             <a:endParaRPr lang="en-US" dirty="0"/>
           </a:p>
@@ -5168,7 +5168,7 @@
           <a:p>
             <a:fld id="{8CB55EF8-B59A-48DF-A116-AFDAD4B003AB}" type="datetimeFigureOut">
               <a:rPr lang="en-US" smtClean="0"/>
-              <a:t>9/20/2016</a:t>
+              <a:t>10/3/2017</a:t>
             </a:fld>
             <a:endParaRPr lang="en-US" dirty="0"/>
           </a:p>
@@ -5423,7 +5423,7 @@
           <a:p>
             <a:fld id="{EC94AEE7-DB1F-4DD1-9290-70ECE3C49600}" type="datetimeFigureOut">
               <a:rPr lang="en-US" smtClean="0"/>
-              <a:t>9/20/2016</a:t>
+              <a:t>10/3/2017</a:t>
             </a:fld>
             <a:endParaRPr lang="en-US" dirty="0"/>
           </a:p>
@@ -5687,7 +5687,7 @@
           <a:p>
             <a:fld id="{581F845D-AA64-4C6F-B170-8AA45DD4B329}" type="datetimeFigureOut">
               <a:rPr lang="en-US" smtClean="0"/>
-              <a:t>9/20/2016</a:t>
+              <a:t>10/3/2017</a:t>
             </a:fld>
             <a:endParaRPr lang="en-US" dirty="0"/>
           </a:p>
@@ -6503,7 +6503,7 @@
           <a:p>
             <a:fld id="{E28077EF-3DB9-4852-A8C8-9AA18A70A9F8}" type="datetimeFigureOut">
               <a:rPr lang="en-US" smtClean="0"/>
-              <a:t>9/20/2016</a:t>
+              <a:t>10/3/2017</a:t>
             </a:fld>
             <a:endParaRPr lang="en-US" dirty="0"/>
           </a:p>
@@ -12637,15 +12637,7 @@
                   <a:schemeClr val="tx1"/>
                 </a:solidFill>
               </a:rPr>
-              <a:t>= (</a:t>
-            </a:r>
-            <a:r>
-              <a:rPr lang="en-GB" sz="1800" dirty="0" smtClean="0">
-                <a:solidFill>
-                  <a:schemeClr val="tx1"/>
-                </a:solidFill>
-              </a:rPr>
-              <a:t>update </a:t>
+              <a:t>= (update </a:t>
             </a:r>
             <a:r>
               <a:rPr lang="en-GB" sz="1800" dirty="0">
@@ -14121,11 +14113,7 @@
             </a:pPr>
             <a:r>
               <a:rPr lang="en-GB" dirty="0" smtClean="0"/>
-              <a:t>You will need to </a:t>
-            </a:r>
-            <a:r>
-              <a:rPr lang="en-GB" dirty="0" smtClean="0"/>
-              <a:t>enter a </a:t>
+              <a:t>You will need to enter a </a:t>
             </a:r>
             <a:r>
               <a:rPr lang="en-GB" b="1" dirty="0" smtClean="0"/>
@@ -14133,17 +14121,8 @@
             </a:r>
             <a:r>
               <a:rPr lang="en-GB" dirty="0" smtClean="0"/>
-              <a:t>path for </a:t>
-            </a:r>
-            <a:r>
-              <a:rPr lang="en-GB" dirty="0" smtClean="0"/>
-              <a:t>each </a:t>
-            </a:r>
-            <a:r>
-              <a:rPr lang="en-GB" dirty="0" smtClean="0"/>
-              <a:t>image</a:t>
-            </a:r>
-            <a:endParaRPr lang="en-GB" dirty="0" smtClean="0"/>
+              <a:t>path for each image</a:t>
+            </a:r>
           </a:p>
           <a:p>
             <a:pPr lvl="2">
@@ -14163,11 +14142,7 @@
             </a:r>
             <a:r>
               <a:rPr lang="en-GB" dirty="0" smtClean="0"/>
-              <a:t>”  (without the quotes</a:t>
-            </a:r>
-            <a:r>
-              <a:rPr lang="en-GB" dirty="0" smtClean="0"/>
-              <a:t>)</a:t>
+              <a:t>”  (without the quotes)</a:t>
             </a:r>
           </a:p>
           <a:p>
@@ -14191,7 +14166,6 @@
               <a:rPr lang="en-GB" dirty="0" smtClean="0"/>
               <a:t>”</a:t>
             </a:r>
-            <a:endParaRPr lang="en-GB" dirty="0" smtClean="0"/>
           </a:p>
           <a:p>
             <a:pPr lvl="1">
@@ -15283,7 +15257,7 @@
                 <a:cs typeface="Courier New"/>
                 <a:sym typeface="Courier New"/>
               </a:rPr>
-              <a:t>2016/17</a:t>
+              <a:t>2017/18</a:t>
             </a:r>
             <a:r>
               <a:rPr lang="en" sz="1400" dirty="0" smtClean="0">
@@ -15316,7 +15290,7 @@
                 <a:cs typeface="Courier New"/>
                 <a:sym typeface="Courier New"/>
               </a:rPr>
-              <a:t>v1.83.04</a:t>
+              <a:t>v1.85.03</a:t>
             </a:r>
             <a:r>
               <a:rPr lang="en" sz="1400" dirty="0" smtClean="0">
@@ -15593,29 +15567,7 @@
                 <a:cs typeface="Courier New"/>
                 <a:sym typeface="Courier New"/>
               </a:rPr>
-              <a:t>Student/staff PC’s (like you are on now), should already have it installed </a:t>
-            </a:r>
-            <a:r>
-              <a:rPr lang="en" sz="1400" dirty="0" smtClean="0">
-                <a:solidFill>
-                  <a:schemeClr val="tx1"/>
-                </a:solidFill>
-                <a:ea typeface="Courier New"/>
-                <a:cs typeface="Courier New"/>
-                <a:sym typeface="Courier New"/>
-              </a:rPr>
-              <a:t>on the PC you are on.  </a:t>
-            </a:r>
-            <a:r>
-              <a:rPr lang="en" sz="1400" dirty="0" smtClean="0">
-                <a:solidFill>
-                  <a:schemeClr val="tx1"/>
-                </a:solidFill>
-                <a:ea typeface="Courier New"/>
-                <a:cs typeface="Courier New"/>
-                <a:sym typeface="Courier New"/>
-              </a:rPr>
-              <a:t>We show how to load it a few slides on…</a:t>
+              <a:t>Student/staff PC’s (like you are on now), should already have it installed on the PC you are on.  We show how to load it a few slides on…</a:t>
             </a:r>
           </a:p>
           <a:p>
@@ -16362,7 +16314,7 @@
                 <a:cs typeface="Courier New"/>
                 <a:sym typeface="Courier New"/>
               </a:rPr>
-              <a:t>| Programs | Departmental Software </a:t>
+              <a:t>| </a:t>
             </a:r>
             <a:r>
               <a:rPr lang="en" sz="2000" dirty="0" smtClean="0">
@@ -16371,26 +16323,14 @@
                 <a:cs typeface="Courier New"/>
                 <a:sym typeface="Courier New"/>
               </a:rPr>
-              <a:t>| School </a:t>
-            </a:r>
-            <a:r>
-              <a:rPr lang="en" sz="2000" dirty="0">
-                <a:latin typeface="Courier New"/>
-                <a:ea typeface="Courier New"/>
-                <a:cs typeface="Courier New"/>
-                <a:sym typeface="Courier New"/>
-              </a:rPr>
-              <a:t>of Psychology | </a:t>
-            </a:r>
-            <a:r>
-              <a:rPr lang="en" sz="2000" dirty="0" smtClean="0">
-                <a:latin typeface="Courier New"/>
-                <a:ea typeface="Courier New"/>
-                <a:cs typeface="Courier New"/>
-                <a:sym typeface="Courier New"/>
-              </a:rPr>
-              <a:t>PsychoPy</a:t>
-            </a:r>
+              <a:t>Search for PsychoPy</a:t>
+            </a:r>
+            <a:endParaRPr lang="en" sz="2000" dirty="0" smtClean="0">
+              <a:latin typeface="Courier New"/>
+              <a:ea typeface="Courier New"/>
+              <a:cs typeface="Courier New"/>
+              <a:sym typeface="Courier New"/>
+            </a:endParaRPr>
           </a:p>
           <a:p>
             <a:pPr marL="914400" lvl="1" indent="-381000">
@@ -16455,7 +16395,16 @@
                 <a:cs typeface="Courier New"/>
                 <a:sym typeface="Courier New"/>
               </a:rPr>
-              <a:t>If not present, please contact psychsupport@kent.ac.uk</a:t>
+              <a:t>If not present, please contact </a:t>
+            </a:r>
+            <a:r>
+              <a:rPr lang="en" sz="2000" dirty="0" smtClean="0">
+                <a:latin typeface="Courier New"/>
+                <a:ea typeface="Courier New"/>
+                <a:cs typeface="Courier New"/>
+                <a:sym typeface="Courier New"/>
+              </a:rPr>
+              <a:t>psychsupport@kent.ac.uk</a:t>
             </a:r>
             <a:endParaRPr lang="en" sz="2000" dirty="0">
               <a:latin typeface="Courier New"/>
@@ -16463,50 +16412,6 @@
               <a:cs typeface="Courier New"/>
               <a:sym typeface="Courier New"/>
             </a:endParaRPr>
-          </a:p>
-          <a:p>
-            <a:pPr marL="381000">
-              <a:buClr>
-                <a:schemeClr val="accent1">
-                  <a:lumMod val="75000"/>
-                </a:schemeClr>
-              </a:buClr>
-              <a:buSzPct val="125000"/>
-            </a:pPr>
-            <a:r>
-              <a:rPr lang="en" sz="2400" dirty="0"/>
-              <a:t>PsychoPy has 2 modes, so if it starts in Coder view, you can switch mode using:</a:t>
-            </a:r>
-          </a:p>
-          <a:p>
-            <a:pPr marL="990600" lvl="1" indent="-457200">
-              <a:buClr>
-                <a:schemeClr val="accent1">
-                  <a:lumMod val="75000"/>
-                </a:schemeClr>
-              </a:buClr>
-              <a:buSzPct val="100000"/>
-              <a:buFont typeface="Wingdings" panose="05000000000000000000" pitchFamily="2" charset="2"/>
-              <a:buChar char="§"/>
-            </a:pPr>
-            <a:r>
-              <a:rPr lang="en" sz="2000" dirty="0">
-                <a:latin typeface="Courier New"/>
-                <a:ea typeface="Courier New"/>
-                <a:cs typeface="Courier New"/>
-                <a:sym typeface="Courier New"/>
-              </a:rPr>
-              <a:t>View | Go to Builder </a:t>
-            </a:r>
-            <a:r>
-              <a:rPr lang="en" sz="2000" dirty="0" smtClean="0">
-                <a:latin typeface="Courier New"/>
-                <a:ea typeface="Courier New"/>
-                <a:cs typeface="Courier New"/>
-                <a:sym typeface="Courier New"/>
-              </a:rPr>
-              <a:t>View</a:t>
-            </a:r>
           </a:p>
         </p:txBody>
       </p:sp>
@@ -16955,20 +16860,11 @@
               <a:rPr lang="en-GB" dirty="0" smtClean="0"/>
               <a:t>directory</a:t>
             </a:r>
-            <a:endParaRPr lang="en-GB" dirty="0" smtClean="0"/>
           </a:p>
           <a:p>
             <a:r>
               <a:rPr lang="en-GB" dirty="0" smtClean="0"/>
-              <a:t>Don’t worry what everything is just yet, we’ll cover it </a:t>
-            </a:r>
-            <a:r>
-              <a:rPr lang="en-GB" dirty="0" smtClean="0"/>
-              <a:t>later</a:t>
-            </a:r>
-            <a:r>
-              <a:rPr lang="en-GB" dirty="0" smtClean="0"/>
-              <a:t>!</a:t>
+              <a:t>Don’t worry what everything is just yet, we’ll cover it later!</a:t>
             </a:r>
           </a:p>
           <a:p>

</xml_diff>

<commit_message>
Updated slides for 201920
</commit_message>
<xml_diff>
--- a/PsychoPy-Part1/PsychoPy-part1.pptx
+++ b/PsychoPy-Part1/PsychoPy-part1.pptx
@@ -5,7 +5,7 @@
     <p:sldMasterId id="2147483829" r:id="rId1"/>
   </p:sldMasterIdLst>
   <p:notesMasterIdLst>
-    <p:notesMasterId r:id="rId27"/>
+    <p:notesMasterId r:id="rId28"/>
   </p:notesMasterIdLst>
   <p:sldIdLst>
     <p:sldId id="256" r:id="rId2"/>
@@ -19,20 +19,21 @@
     <p:sldId id="296" r:id="rId10"/>
     <p:sldId id="297" r:id="rId11"/>
     <p:sldId id="310" r:id="rId12"/>
-    <p:sldId id="291" r:id="rId13"/>
-    <p:sldId id="311" r:id="rId14"/>
-    <p:sldId id="292" r:id="rId15"/>
-    <p:sldId id="299" r:id="rId16"/>
-    <p:sldId id="301" r:id="rId17"/>
-    <p:sldId id="312" r:id="rId18"/>
-    <p:sldId id="315" r:id="rId19"/>
-    <p:sldId id="307" r:id="rId20"/>
-    <p:sldId id="314" r:id="rId21"/>
-    <p:sldId id="300" r:id="rId22"/>
-    <p:sldId id="302" r:id="rId23"/>
-    <p:sldId id="308" r:id="rId24"/>
-    <p:sldId id="309" r:id="rId25"/>
-    <p:sldId id="304" r:id="rId26"/>
+    <p:sldId id="317" r:id="rId13"/>
+    <p:sldId id="291" r:id="rId14"/>
+    <p:sldId id="311" r:id="rId15"/>
+    <p:sldId id="292" r:id="rId16"/>
+    <p:sldId id="299" r:id="rId17"/>
+    <p:sldId id="301" r:id="rId18"/>
+    <p:sldId id="312" r:id="rId19"/>
+    <p:sldId id="315" r:id="rId20"/>
+    <p:sldId id="307" r:id="rId21"/>
+    <p:sldId id="314" r:id="rId22"/>
+    <p:sldId id="300" r:id="rId23"/>
+    <p:sldId id="302" r:id="rId24"/>
+    <p:sldId id="308" r:id="rId25"/>
+    <p:sldId id="309" r:id="rId26"/>
+    <p:sldId id="304" r:id="rId27"/>
   </p:sldIdLst>
   <p:sldSz cx="9144000" cy="6858000" type="screen4x3"/>
   <p:notesSz cx="6797675" cy="9928225"/>
@@ -1671,7 +1672,7 @@
           <a:p>
             <a:fld id="{B4554F2B-4BCF-4197-901F-D7CA0C5C3346}" type="datetimeFigureOut">
               <a:rPr lang="en-US" smtClean="0"/>
-              <a:t>9/27/2018</a:t>
+              <a:t>10/2/2019</a:t>
             </a:fld>
             <a:endParaRPr lang="en-US" dirty="0"/>
           </a:p>
@@ -1928,7 +1929,7 @@
           <a:p>
             <a:fld id="{E28077EF-3DB9-4852-A8C8-9AA18A70A9F8}" type="datetimeFigureOut">
               <a:rPr lang="en-US" smtClean="0"/>
-              <a:t>9/27/2018</a:t>
+              <a:t>10/2/2019</a:t>
             </a:fld>
             <a:endParaRPr lang="en-US" dirty="0"/>
           </a:p>
@@ -2244,7 +2245,7 @@
           <a:p>
             <a:fld id="{E28077EF-3DB9-4852-A8C8-9AA18A70A9F8}" type="datetimeFigureOut">
               <a:rPr lang="en-US" smtClean="0"/>
-              <a:t>9/27/2018</a:t>
+              <a:t>10/2/2019</a:t>
             </a:fld>
             <a:endParaRPr lang="en-US" dirty="0"/>
           </a:p>
@@ -2579,7 +2580,7 @@
           <a:p>
             <a:fld id="{E28077EF-3DB9-4852-A8C8-9AA18A70A9F8}" type="datetimeFigureOut">
               <a:rPr lang="en-US" smtClean="0"/>
-              <a:t>9/27/2018</a:t>
+              <a:t>10/2/2019</a:t>
             </a:fld>
             <a:endParaRPr lang="en-US" dirty="0"/>
           </a:p>
@@ -2895,7 +2896,7 @@
           <a:p>
             <a:fld id="{E28077EF-3DB9-4852-A8C8-9AA18A70A9F8}" type="datetimeFigureOut">
               <a:rPr lang="en-US" smtClean="0"/>
-              <a:t>9/27/2018</a:t>
+              <a:t>10/2/2019</a:t>
             </a:fld>
             <a:endParaRPr lang="en-US" dirty="0"/>
           </a:p>
@@ -3290,7 +3291,7 @@
           <a:p>
             <a:fld id="{E28077EF-3DB9-4852-A8C8-9AA18A70A9F8}" type="datetimeFigureOut">
               <a:rPr lang="en-US" smtClean="0"/>
-              <a:t>9/27/2018</a:t>
+              <a:t>10/2/2019</a:t>
             </a:fld>
             <a:endParaRPr lang="en-US" dirty="0"/>
           </a:p>
@@ -3462,7 +3463,7 @@
           <a:p>
             <a:fld id="{80C08BB0-1F20-4C6B-A56C-896A9F73FB4A}" type="datetimeFigureOut">
               <a:rPr lang="en-US" smtClean="0"/>
-              <a:t>9/27/2018</a:t>
+              <a:t>10/2/2019</a:t>
             </a:fld>
             <a:endParaRPr lang="en-US" dirty="0"/>
           </a:p>
@@ -3643,7 +3644,7 @@
           <a:p>
             <a:fld id="{735C60DA-11B7-472A-AFEF-07FB059A27D8}" type="datetimeFigureOut">
               <a:rPr lang="en-US" smtClean="0"/>
-              <a:t>9/27/2018</a:t>
+              <a:t>10/2/2019</a:t>
             </a:fld>
             <a:endParaRPr lang="en-US" dirty="0"/>
           </a:p>
@@ -4019,7 +4020,7 @@
           <a:p>
             <a:fld id="{2651F21A-8405-4DA5-BEAC-3D4CC71D54EA}" type="datetimeFigureOut">
               <a:rPr lang="en-US" smtClean="0"/>
-              <a:t>9/27/2018</a:t>
+              <a:t>10/2/2019</a:t>
             </a:fld>
             <a:endParaRPr lang="en-US" dirty="0"/>
           </a:p>
@@ -4267,7 +4268,7 @@
           <a:p>
             <a:fld id="{78685F84-9683-4B1B-940C-516296C3B9E2}" type="datetimeFigureOut">
               <a:rPr lang="en-US" smtClean="0"/>
-              <a:t>9/27/2018</a:t>
+              <a:t>10/2/2019</a:t>
             </a:fld>
             <a:endParaRPr lang="en-US" dirty="0"/>
           </a:p>
@@ -4570,7 +4571,7 @@
           <a:p>
             <a:fld id="{0657B2AD-074C-4247-B20E-4BA1D1B80702}" type="datetimeFigureOut">
               <a:rPr lang="en-US" smtClean="0"/>
-              <a:t>9/27/2018</a:t>
+              <a:t>10/2/2019</a:t>
             </a:fld>
             <a:endParaRPr lang="en-US" dirty="0"/>
           </a:p>
@@ -4950,7 +4951,7 @@
           <a:p>
             <a:fld id="{8DCC26FB-39E8-4A97-A330-257F2E3058A9}" type="datetimeFigureOut">
               <a:rPr lang="en-US" smtClean="0"/>
-              <a:t>9/27/2018</a:t>
+              <a:t>10/2/2019</a:t>
             </a:fld>
             <a:endParaRPr lang="en-US" dirty="0"/>
           </a:p>
@@ -5074,7 +5075,7 @@
           <a:p>
             <a:fld id="{3EE6405D-5078-464B-95D5-AD1D787A29C3}" type="datetimeFigureOut">
               <a:rPr lang="en-US" smtClean="0"/>
-              <a:t>9/27/2018</a:t>
+              <a:t>10/2/2019</a:t>
             </a:fld>
             <a:endParaRPr lang="en-US" dirty="0"/>
           </a:p>
@@ -5169,7 +5170,7 @@
           <a:p>
             <a:fld id="{8CB55EF8-B59A-48DF-A116-AFDAD4B003AB}" type="datetimeFigureOut">
               <a:rPr lang="en-US" smtClean="0"/>
-              <a:t>9/27/2018</a:t>
+              <a:t>10/2/2019</a:t>
             </a:fld>
             <a:endParaRPr lang="en-US" dirty="0"/>
           </a:p>
@@ -5424,7 +5425,7 @@
           <a:p>
             <a:fld id="{EC94AEE7-DB1F-4DD1-9290-70ECE3C49600}" type="datetimeFigureOut">
               <a:rPr lang="en-US" smtClean="0"/>
-              <a:t>9/27/2018</a:t>
+              <a:t>10/2/2019</a:t>
             </a:fld>
             <a:endParaRPr lang="en-US" dirty="0"/>
           </a:p>
@@ -5688,7 +5689,7 @@
           <a:p>
             <a:fld id="{581F845D-AA64-4C6F-B170-8AA45DD4B329}" type="datetimeFigureOut">
               <a:rPr lang="en-US" smtClean="0"/>
-              <a:t>9/27/2018</a:t>
+              <a:t>10/2/2019</a:t>
             </a:fld>
             <a:endParaRPr lang="en-US" dirty="0"/>
           </a:p>
@@ -6504,7 +6505,7 @@
           <a:p>
             <a:fld id="{E28077EF-3DB9-4852-A8C8-9AA18A70A9F8}" type="datetimeFigureOut">
               <a:rPr lang="en-US" smtClean="0"/>
-              <a:t>9/27/2018</a:t>
+              <a:t>10/2/2019</a:t>
             </a:fld>
             <a:endParaRPr lang="en-US" dirty="0"/>
           </a:p>
@@ -7176,7 +7177,17 @@
                   </a:schemeClr>
                 </a:solidFill>
               </a:rPr>
-              <a:t>Run a </a:t>
+              <a:t>Run </a:t>
+            </a:r>
+            <a:r>
+              <a:rPr lang="en-GB" sz="3100" dirty="0" smtClean="0">
+                <a:solidFill>
+                  <a:schemeClr val="accent1">
+                    <a:lumMod val="75000"/>
+                  </a:schemeClr>
+                </a:solidFill>
+              </a:rPr>
+              <a:t>the </a:t>
             </a:r>
             <a:r>
               <a:rPr lang="en-GB" sz="3100" dirty="0" err="1" smtClean="0">
@@ -7240,7 +7251,11 @@
           <a:p>
             <a:r>
               <a:rPr lang="en-GB" dirty="0" smtClean="0"/>
-              <a:t>Open up </a:t>
+              <a:t>From the downloaded materials - open </a:t>
+            </a:r>
+            <a:r>
+              <a:rPr lang="en-GB" dirty="0" smtClean="0"/>
+              <a:t>up </a:t>
             </a:r>
             <a:r>
               <a:rPr lang="en-GB" dirty="0" err="1" smtClean="0">
@@ -7277,8 +7292,13 @@
           <a:p>
             <a:r>
               <a:rPr lang="en-GB" dirty="0" smtClean="0"/>
-              <a:t>Click the green icon at the top to run it</a:t>
-            </a:r>
+              <a:t>Click the green icon at the top to run </a:t>
+            </a:r>
+            <a:r>
+              <a:rPr lang="en-GB" dirty="0" smtClean="0"/>
+              <a:t>it for yourself</a:t>
+            </a:r>
+            <a:endParaRPr lang="en-GB" dirty="0" smtClean="0"/>
           </a:p>
           <a:p>
             <a:r>
@@ -7517,21 +7537,8 @@
                   <a:srgbClr val="FF0000"/>
                 </a:solidFill>
               </a:rPr>
-              <a:t>(</a:t>
-            </a:r>
-            <a:r>
-              <a:rPr lang="en" dirty="0" smtClean="0">
-                <a:solidFill>
-                  <a:srgbClr val="FF0000"/>
-                </a:solidFill>
-              </a:rPr>
-              <a:t>Demo of code generated)</a:t>
-            </a:r>
-            <a:endParaRPr lang="en" dirty="0" smtClean="0">
-              <a:solidFill>
-                <a:srgbClr val="FF0000"/>
-              </a:solidFill>
-            </a:endParaRPr>
+              <a:t>(Demo of code generated)</a:t>
+            </a:r>
           </a:p>
           <a:p>
             <a:pPr marL="400050" indent="-285750">
@@ -7832,6 +7839,239 @@
 </file>
 
 <file path=ppt/slides/slide12.xml><?xml version="1.0" encoding="utf-8"?>
+<p:sld xmlns:a="http://schemas.openxmlformats.org/drawingml/2006/main" xmlns:r="http://schemas.openxmlformats.org/officeDocument/2006/relationships" xmlns:p="http://schemas.openxmlformats.org/presentationml/2006/main">
+  <p:cSld>
+    <p:spTree>
+      <p:nvGrpSpPr>
+        <p:cNvPr id="1" name=""/>
+        <p:cNvGrpSpPr/>
+        <p:nvPr/>
+      </p:nvGrpSpPr>
+      <p:grpSpPr>
+        <a:xfrm>
+          <a:off x="0" y="0"/>
+          <a:ext cx="0" cy="0"/>
+          <a:chOff x="0" y="0"/>
+          <a:chExt cx="0" cy="0"/>
+        </a:xfrm>
+      </p:grpSpPr>
+      <p:sp>
+        <p:nvSpPr>
+          <p:cNvPr id="2" name="Title 1"/>
+          <p:cNvSpPr>
+            <a:spLocks noGrp="1"/>
+          </p:cNvSpPr>
+          <p:nvPr>
+            <p:ph type="title"/>
+          </p:nvPr>
+        </p:nvSpPr>
+        <p:spPr/>
+        <p:txBody>
+          <a:bodyPr/>
+          <a:lstStyle/>
+          <a:p>
+            <a:r>
+              <a:rPr lang="en-GB" dirty="0" smtClean="0"/>
+              <a:t>Result </a:t>
+            </a:r>
+            <a:r>
+              <a:rPr lang="en-GB" dirty="0" smtClean="0"/>
+              <a:t>files and adding information</a:t>
+            </a:r>
+            <a:endParaRPr lang="en-US" dirty="0"/>
+          </a:p>
+        </p:txBody>
+      </p:sp>
+      <p:sp>
+        <p:nvSpPr>
+          <p:cNvPr id="3" name="Text Placeholder 2"/>
+          <p:cNvSpPr>
+            <a:spLocks noGrp="1"/>
+          </p:cNvSpPr>
+          <p:nvPr>
+            <p:ph type="body" idx="1"/>
+          </p:nvPr>
+        </p:nvSpPr>
+        <p:spPr/>
+        <p:txBody>
+          <a:bodyPr>
+            <a:normAutofit/>
+          </a:bodyPr>
+          <a:lstStyle/>
+          <a:p>
+            <a:pPr marL="0" indent="0">
+              <a:buNone/>
+            </a:pPr>
+            <a:r>
+              <a:rPr lang="en-GB" sz="2400" dirty="0" smtClean="0"/>
+              <a:t>How do we add extra information to our data output?</a:t>
+            </a:r>
+          </a:p>
+          <a:p>
+            <a:pPr marL="0" indent="0">
+              <a:buNone/>
+            </a:pPr>
+            <a:endParaRPr lang="en-GB" dirty="0" smtClean="0"/>
+          </a:p>
+          <a:p>
+            <a:pPr marL="0" indent="0">
+              <a:buNone/>
+            </a:pPr>
+            <a:r>
+              <a:rPr lang="en-GB" b="1" dirty="0" smtClean="0"/>
+              <a:t>1. Start up parameters</a:t>
+            </a:r>
+          </a:p>
+          <a:p>
+            <a:pPr marL="0" indent="0">
+              <a:buNone/>
+            </a:pPr>
+            <a:endParaRPr lang="en-GB" dirty="0" smtClean="0"/>
+          </a:p>
+          <a:p>
+            <a:r>
+              <a:rPr lang="en-GB" dirty="0" smtClean="0"/>
+              <a:t>By default – prompted at the start for </a:t>
+            </a:r>
+            <a:r>
+              <a:rPr lang="en-GB" b="1" dirty="0" smtClean="0"/>
+              <a:t>Participant</a:t>
+            </a:r>
+            <a:r>
+              <a:rPr lang="en-GB" dirty="0" smtClean="0"/>
+              <a:t> and </a:t>
+            </a:r>
+            <a:r>
+              <a:rPr lang="en-GB" b="1" dirty="0" smtClean="0"/>
+              <a:t>Session ID</a:t>
+            </a:r>
+          </a:p>
+          <a:p>
+            <a:r>
+              <a:rPr lang="en-GB" dirty="0" smtClean="0"/>
+              <a:t>To add your own, click the experiment settings icon</a:t>
+            </a:r>
+          </a:p>
+          <a:p>
+            <a:pPr marL="0" indent="0">
+              <a:buNone/>
+            </a:pPr>
+            <a:endParaRPr lang="en-GB" dirty="0"/>
+          </a:p>
+          <a:p>
+            <a:pPr marL="0" indent="0">
+              <a:buNone/>
+            </a:pPr>
+            <a:r>
+              <a:rPr lang="en-GB" b="1" dirty="0" smtClean="0"/>
+              <a:t>2. Add to Excel data file</a:t>
+            </a:r>
+            <a:endParaRPr lang="en-GB" b="1" dirty="0"/>
+          </a:p>
+          <a:p>
+            <a:pPr marL="0" indent="0">
+              <a:buNone/>
+            </a:pPr>
+            <a:endParaRPr lang="en-GB" dirty="0"/>
+          </a:p>
+          <a:p>
+            <a:r>
+              <a:rPr lang="en-GB" dirty="0" smtClean="0"/>
+              <a:t>You can add a new column in your data file – that is it!</a:t>
+            </a:r>
+          </a:p>
+          <a:p>
+            <a:r>
+              <a:rPr lang="en-GB" dirty="0" smtClean="0"/>
+              <a:t>It will appear in your output files automatically.</a:t>
+            </a:r>
+          </a:p>
+          <a:p>
+            <a:endParaRPr lang="en-GB" dirty="0"/>
+          </a:p>
+          <a:p>
+            <a:pPr marL="0" indent="0">
+              <a:buNone/>
+            </a:pPr>
+            <a:r>
+              <a:rPr lang="en-GB" b="1" dirty="0" smtClean="0"/>
+              <a:t>3. Through embedded Python code</a:t>
+            </a:r>
+            <a:endParaRPr lang="en-GB" b="1" dirty="0"/>
+          </a:p>
+          <a:p>
+            <a:pPr marL="0" indent="0">
+              <a:buNone/>
+            </a:pPr>
+            <a:endParaRPr lang="en-GB" dirty="0"/>
+          </a:p>
+          <a:p>
+            <a:r>
+              <a:rPr lang="en-GB" dirty="0" smtClean="0"/>
+              <a:t>Possible to run complex calculations and store into our data file</a:t>
+            </a:r>
+          </a:p>
+          <a:p>
+            <a:r>
+              <a:rPr lang="en-GB" dirty="0" smtClean="0"/>
+              <a:t>Outside the scope of this session, but it is possible!</a:t>
+            </a:r>
+            <a:endParaRPr lang="en-GB" dirty="0"/>
+          </a:p>
+          <a:p>
+            <a:endParaRPr lang="en-GB" dirty="0" smtClean="0"/>
+          </a:p>
+        </p:txBody>
+      </p:sp>
+      <p:pic>
+        <p:nvPicPr>
+          <p:cNvPr id="4" name="Shape 156"/>
+          <p:cNvPicPr preferRelativeResize="0"/>
+          <p:nvPr/>
+        </p:nvPicPr>
+        <p:blipFill>
+          <a:blip r:embed="rId2">
+            <a:alphaModFix/>
+          </a:blip>
+          <a:stretch>
+            <a:fillRect/>
+          </a:stretch>
+        </p:blipFill>
+        <p:spPr>
+          <a:xfrm>
+            <a:off x="6322112" y="3123158"/>
+            <a:ext cx="489731" cy="377851"/>
+          </a:xfrm>
+          <a:prstGeom prst="rect">
+            <a:avLst/>
+          </a:prstGeom>
+          <a:noFill/>
+          <a:ln>
+            <a:noFill/>
+          </a:ln>
+        </p:spPr>
+      </p:pic>
+    </p:spTree>
+    <p:extLst>
+      <p:ext uri="{BB962C8B-B14F-4D97-AF65-F5344CB8AC3E}">
+        <p14:creationId xmlns:p14="http://schemas.microsoft.com/office/powerpoint/2010/main" val="1336114862"/>
+      </p:ext>
+    </p:extLst>
+  </p:cSld>
+  <p:clrMapOvr>
+    <a:masterClrMapping/>
+  </p:clrMapOvr>
+  <p:timing>
+    <p:tnLst>
+      <p:par>
+        <p:cTn id="1" dur="indefinite" restart="never" nodeType="tmRoot"/>
+      </p:par>
+    </p:tnLst>
+  </p:timing>
+</p:sld>
+</file>
+
+<file path=ppt/slides/slide13.xml><?xml version="1.0" encoding="utf-8"?>
 <p:sld xmlns:a="http://schemas.openxmlformats.org/drawingml/2006/main" xmlns:r="http://schemas.openxmlformats.org/officeDocument/2006/relationships" xmlns:p="http://schemas.openxmlformats.org/presentationml/2006/main">
   <p:cSld>
     <p:spTree>
@@ -8525,7 +8765,7 @@
 </p:sld>
 </file>
 
-<file path=ppt/slides/slide13.xml><?xml version="1.0" encoding="utf-8"?>
+<file path=ppt/slides/slide14.xml><?xml version="1.0" encoding="utf-8"?>
 <p:sld xmlns:a="http://schemas.openxmlformats.org/drawingml/2006/main" xmlns:r="http://schemas.openxmlformats.org/officeDocument/2006/relationships" xmlns:p="http://schemas.openxmlformats.org/presentationml/2006/main">
   <p:cSld>
     <p:spTree>
@@ -9452,7 +9692,7 @@
 </p:sld>
 </file>
 
-<file path=ppt/slides/slide14.xml><?xml version="1.0" encoding="utf-8"?>
+<file path=ppt/slides/slide15.xml><?xml version="1.0" encoding="utf-8"?>
 <p:sld xmlns:a="http://schemas.openxmlformats.org/drawingml/2006/main" xmlns:r="http://schemas.openxmlformats.org/officeDocument/2006/relationships" xmlns:p="http://schemas.openxmlformats.org/presentationml/2006/main">
   <p:cSld>
     <p:spTree>
@@ -9902,7 +10142,7 @@
 </p:sld>
 </file>
 
-<file path=ppt/slides/slide15.xml><?xml version="1.0" encoding="utf-8"?>
+<file path=ppt/slides/slide16.xml><?xml version="1.0" encoding="utf-8"?>
 <p:sld xmlns:a="http://schemas.openxmlformats.org/drawingml/2006/main" xmlns:r="http://schemas.openxmlformats.org/officeDocument/2006/relationships" xmlns:p="http://schemas.openxmlformats.org/presentationml/2006/main">
   <p:cSld>
     <p:spTree>
@@ -10135,7 +10375,7 @@
 </p:sld>
 </file>
 
-<file path=ppt/slides/slide16.xml><?xml version="1.0" encoding="utf-8"?>
+<file path=ppt/slides/slide17.xml><?xml version="1.0" encoding="utf-8"?>
 <p:sld xmlns:a="http://schemas.openxmlformats.org/drawingml/2006/main" xmlns:r="http://schemas.openxmlformats.org/officeDocument/2006/relationships" xmlns:p="http://schemas.openxmlformats.org/presentationml/2006/main">
   <p:cSld>
     <p:spTree>
@@ -10422,7 +10662,7 @@
 </p:sld>
 </file>
 
-<file path=ppt/slides/slide17.xml><?xml version="1.0" encoding="utf-8"?>
+<file path=ppt/slides/slide18.xml><?xml version="1.0" encoding="utf-8"?>
 <p:sld xmlns:a="http://schemas.openxmlformats.org/drawingml/2006/main" xmlns:r="http://schemas.openxmlformats.org/officeDocument/2006/relationships" xmlns:p="http://schemas.openxmlformats.org/presentationml/2006/main">
   <p:cSld>
     <p:spTree>
@@ -10901,13 +11141,8 @@
             </a:r>
             <a:r>
               <a:rPr lang="en-GB" sz="1100" dirty="0" smtClean="0"/>
-              <a:t>” (or Python Variables).  These are CASE SENSITIVE</a:t>
-            </a:r>
-            <a:r>
-              <a:rPr lang="en-GB" sz="1100" dirty="0" smtClean="0"/>
-              <a:t>.  There should be NO WHITE SPACE!</a:t>
-            </a:r>
-            <a:endParaRPr lang="en-GB" sz="1100" dirty="0" smtClean="0"/>
+              <a:t>” (or Python Variables).  These are CASE SENSITIVE.  There should be NO WHITE SPACE!</a:t>
+            </a:r>
           </a:p>
           <a:p>
             <a:pPr algn="ctr"/>
@@ -11133,7 +11368,7 @@
 </p:sld>
 </file>
 
-<file path=ppt/slides/slide18.xml><?xml version="1.0" encoding="utf-8"?>
+<file path=ppt/slides/slide19.xml><?xml version="1.0" encoding="utf-8"?>
 <p:sld xmlns:a="http://schemas.openxmlformats.org/drawingml/2006/main" xmlns:r="http://schemas.openxmlformats.org/officeDocument/2006/relationships" xmlns:p="http://schemas.openxmlformats.org/presentationml/2006/main">
   <p:cSld>
     <p:spTree>
@@ -11910,7 +12145,183 @@
 </p:sld>
 </file>
 
-<file path=ppt/slides/slide19.xml><?xml version="1.0" encoding="utf-8"?>
+<file path=ppt/slides/slide2.xml><?xml version="1.0" encoding="utf-8"?>
+<p:sld xmlns:a="http://schemas.openxmlformats.org/drawingml/2006/main" xmlns:r="http://schemas.openxmlformats.org/officeDocument/2006/relationships" xmlns:p="http://schemas.openxmlformats.org/presentationml/2006/main">
+  <p:cSld>
+    <p:spTree>
+      <p:nvGrpSpPr>
+        <p:cNvPr id="1" name=""/>
+        <p:cNvGrpSpPr/>
+        <p:nvPr/>
+      </p:nvGrpSpPr>
+      <p:grpSpPr>
+        <a:xfrm>
+          <a:off x="0" y="0"/>
+          <a:ext cx="0" cy="0"/>
+          <a:chOff x="0" y="0"/>
+          <a:chExt cx="0" cy="0"/>
+        </a:xfrm>
+      </p:grpSpPr>
+      <p:sp>
+        <p:nvSpPr>
+          <p:cNvPr id="2" name="Title 1"/>
+          <p:cNvSpPr>
+            <a:spLocks noGrp="1"/>
+          </p:cNvSpPr>
+          <p:nvPr>
+            <p:ph type="title"/>
+          </p:nvPr>
+        </p:nvSpPr>
+        <p:spPr/>
+        <p:txBody>
+          <a:bodyPr/>
+          <a:lstStyle/>
+          <a:p>
+            <a:r>
+              <a:rPr lang="en-GB" dirty="0" smtClean="0"/>
+              <a:t>First of all</a:t>
+            </a:r>
+            <a:endParaRPr lang="en-US" dirty="0"/>
+          </a:p>
+        </p:txBody>
+      </p:sp>
+      <p:sp>
+        <p:nvSpPr>
+          <p:cNvPr id="3" name="Text Placeholder 2"/>
+          <p:cNvSpPr>
+            <a:spLocks noGrp="1"/>
+          </p:cNvSpPr>
+          <p:nvPr>
+            <p:ph type="body" idx="1"/>
+          </p:nvPr>
+        </p:nvSpPr>
+        <p:spPr/>
+        <p:txBody>
+          <a:bodyPr/>
+          <a:lstStyle/>
+          <a:p>
+            <a:pPr marL="0" indent="0">
+              <a:buNone/>
+            </a:pPr>
+            <a:r>
+              <a:rPr lang="en-GB" b="1" dirty="0" smtClean="0"/>
+              <a:t>Download materials for today</a:t>
+            </a:r>
+          </a:p>
+          <a:p>
+            <a:endParaRPr lang="en-GB" dirty="0" smtClean="0"/>
+          </a:p>
+          <a:p>
+            <a:r>
+              <a:rPr lang="en-GB" dirty="0" smtClean="0"/>
+              <a:t>Download the materials from SP850 (zip file)</a:t>
+            </a:r>
+          </a:p>
+          <a:p>
+            <a:r>
+              <a:rPr lang="en-GB" dirty="0" smtClean="0"/>
+              <a:t>Or for those not on SP850 from here:</a:t>
+            </a:r>
+          </a:p>
+          <a:p>
+            <a:pPr lvl="1"/>
+            <a:r>
+              <a:rPr lang="en-US" dirty="0">
+                <a:hlinkClick r:id="rId2"/>
+              </a:rPr>
+              <a:t>http://</a:t>
+            </a:r>
+            <a:r>
+              <a:rPr lang="en-US" dirty="0" smtClean="0">
+                <a:hlinkClick r:id="rId2"/>
+              </a:rPr>
+              <a:t>www.kent.ac.uk/school-of-psychology/downloads/part1.zip</a:t>
+            </a:r>
+            <a:endParaRPr lang="en-GB" dirty="0" smtClean="0"/>
+          </a:p>
+          <a:p>
+            <a:pPr marL="57150" indent="0">
+              <a:buNone/>
+            </a:pPr>
+            <a:endParaRPr lang="en-GB" dirty="0" smtClean="0"/>
+          </a:p>
+          <a:p>
+            <a:pPr marL="57150" indent="0">
+              <a:buNone/>
+            </a:pPr>
+            <a:endParaRPr lang="en-GB" dirty="0" smtClean="0"/>
+          </a:p>
+          <a:p>
+            <a:pPr marL="57150" indent="0">
+              <a:buNone/>
+            </a:pPr>
+            <a:endParaRPr lang="en-GB" dirty="0" smtClean="0"/>
+          </a:p>
+          <a:p>
+            <a:pPr marL="57150" indent="0">
+              <a:buNone/>
+            </a:pPr>
+            <a:r>
+              <a:rPr lang="en-GB" sz="3200" dirty="0" smtClean="0">
+                <a:solidFill>
+                  <a:srgbClr val="FF0000"/>
+                </a:solidFill>
+              </a:rPr>
+              <a:t>WARNING!!</a:t>
+            </a:r>
+          </a:p>
+          <a:p>
+            <a:pPr marL="57150" indent="0">
+              <a:buNone/>
+            </a:pPr>
+            <a:endParaRPr lang="en-GB" dirty="0">
+              <a:solidFill>
+                <a:srgbClr val="FF0000"/>
+              </a:solidFill>
+            </a:endParaRPr>
+          </a:p>
+          <a:p>
+            <a:pPr marL="57150" indent="0">
+              <a:buNone/>
+            </a:pPr>
+            <a:r>
+              <a:rPr lang="en-GB" dirty="0" smtClean="0">
+                <a:solidFill>
+                  <a:schemeClr val="tx1"/>
+                </a:solidFill>
+              </a:rPr>
+              <a:t>You must unzip the file first by right clicking </a:t>
+            </a:r>
+          </a:p>
+          <a:p>
+            <a:pPr marL="57150" indent="0">
+              <a:buNone/>
+            </a:pPr>
+            <a:r>
+              <a:rPr lang="en-GB" dirty="0" smtClean="0">
+                <a:solidFill>
+                  <a:schemeClr val="tx1"/>
+                </a:solidFill>
+              </a:rPr>
+              <a:t>and selecting “Extract all”.</a:t>
+            </a:r>
+          </a:p>
+        </p:txBody>
+      </p:sp>
+    </p:spTree>
+    <p:extLst>
+      <p:ext uri="{BB962C8B-B14F-4D97-AF65-F5344CB8AC3E}">
+        <p14:creationId xmlns:p14="http://schemas.microsoft.com/office/powerpoint/2010/main" val="1081166787"/>
+      </p:ext>
+    </p:extLst>
+  </p:cSld>
+  <p:clrMapOvr>
+    <a:masterClrMapping/>
+  </p:clrMapOvr>
+</p:sld>
+</file>
+
+<file path=ppt/slides/slide20.xml><?xml version="1.0" encoding="utf-8"?>
 <p:sld xmlns:a="http://schemas.openxmlformats.org/drawingml/2006/main" xmlns:r="http://schemas.openxmlformats.org/officeDocument/2006/relationships" xmlns:p="http://schemas.openxmlformats.org/presentationml/2006/main">
   <p:cSld>
     <p:spTree>
@@ -12957,597 +13368,6 @@
 </p:sld>
 </file>
 
-<file path=ppt/slides/slide2.xml><?xml version="1.0" encoding="utf-8"?>
-<p:sld xmlns:a="http://schemas.openxmlformats.org/drawingml/2006/main" xmlns:r="http://schemas.openxmlformats.org/officeDocument/2006/relationships" xmlns:p="http://schemas.openxmlformats.org/presentationml/2006/main">
-  <p:cSld>
-    <p:spTree>
-      <p:nvGrpSpPr>
-        <p:cNvPr id="1" name=""/>
-        <p:cNvGrpSpPr/>
-        <p:nvPr/>
-      </p:nvGrpSpPr>
-      <p:grpSpPr>
-        <a:xfrm>
-          <a:off x="0" y="0"/>
-          <a:ext cx="0" cy="0"/>
-          <a:chOff x="0" y="0"/>
-          <a:chExt cx="0" cy="0"/>
-        </a:xfrm>
-      </p:grpSpPr>
-      <p:sp>
-        <p:nvSpPr>
-          <p:cNvPr id="2" name="Title 1"/>
-          <p:cNvSpPr>
-            <a:spLocks noGrp="1"/>
-          </p:cNvSpPr>
-          <p:nvPr>
-            <p:ph type="title"/>
-          </p:nvPr>
-        </p:nvSpPr>
-        <p:spPr/>
-        <p:txBody>
-          <a:bodyPr/>
-          <a:lstStyle/>
-          <a:p>
-            <a:r>
-              <a:rPr lang="en-GB" dirty="0" smtClean="0"/>
-              <a:t>First of all</a:t>
-            </a:r>
-            <a:endParaRPr lang="en-US" dirty="0"/>
-          </a:p>
-        </p:txBody>
-      </p:sp>
-      <p:sp>
-        <p:nvSpPr>
-          <p:cNvPr id="3" name="Text Placeholder 2"/>
-          <p:cNvSpPr>
-            <a:spLocks noGrp="1"/>
-          </p:cNvSpPr>
-          <p:nvPr>
-            <p:ph type="body" idx="1"/>
-          </p:nvPr>
-        </p:nvSpPr>
-        <p:spPr/>
-        <p:txBody>
-          <a:bodyPr/>
-          <a:lstStyle/>
-          <a:p>
-            <a:pPr marL="0" indent="0">
-              <a:buNone/>
-            </a:pPr>
-            <a:r>
-              <a:rPr lang="en-GB" b="1" dirty="0" smtClean="0"/>
-              <a:t>Download materials for today</a:t>
-            </a:r>
-          </a:p>
-          <a:p>
-            <a:endParaRPr lang="en-GB" dirty="0" smtClean="0"/>
-          </a:p>
-          <a:p>
-            <a:r>
-              <a:rPr lang="en-GB" dirty="0" smtClean="0"/>
-              <a:t>Download the materials from SP850 (zip file)</a:t>
-            </a:r>
-          </a:p>
-          <a:p>
-            <a:r>
-              <a:rPr lang="en-GB" dirty="0" smtClean="0"/>
-              <a:t>Or for those not on SP850 from here:</a:t>
-            </a:r>
-          </a:p>
-          <a:p>
-            <a:pPr lvl="1"/>
-            <a:r>
-              <a:rPr lang="en-US" dirty="0">
-                <a:hlinkClick r:id="rId2"/>
-              </a:rPr>
-              <a:t>http://</a:t>
-            </a:r>
-            <a:r>
-              <a:rPr lang="en-US" dirty="0" smtClean="0">
-                <a:hlinkClick r:id="rId2"/>
-              </a:rPr>
-              <a:t>www.kent.ac.uk/psychology/technical/part1.zip</a:t>
-            </a:r>
-            <a:endParaRPr lang="en-GB" dirty="0" smtClean="0"/>
-          </a:p>
-          <a:p>
-            <a:pPr marL="57150" indent="0">
-              <a:buNone/>
-            </a:pPr>
-            <a:endParaRPr lang="en-GB" dirty="0" smtClean="0"/>
-          </a:p>
-          <a:p>
-            <a:pPr marL="57150" indent="0">
-              <a:buNone/>
-            </a:pPr>
-            <a:endParaRPr lang="en-GB" dirty="0" smtClean="0"/>
-          </a:p>
-          <a:p>
-            <a:pPr marL="57150" indent="0">
-              <a:buNone/>
-            </a:pPr>
-            <a:endParaRPr lang="en-GB" dirty="0" smtClean="0"/>
-          </a:p>
-          <a:p>
-            <a:pPr marL="57150" indent="0">
-              <a:buNone/>
-            </a:pPr>
-            <a:r>
-              <a:rPr lang="en-GB" sz="3200" dirty="0" smtClean="0">
-                <a:solidFill>
-                  <a:srgbClr val="FF0000"/>
-                </a:solidFill>
-              </a:rPr>
-              <a:t>WARNING!!</a:t>
-            </a:r>
-          </a:p>
-          <a:p>
-            <a:pPr marL="57150" indent="0">
-              <a:buNone/>
-            </a:pPr>
-            <a:endParaRPr lang="en-GB" dirty="0">
-              <a:solidFill>
-                <a:srgbClr val="FF0000"/>
-              </a:solidFill>
-            </a:endParaRPr>
-          </a:p>
-          <a:p>
-            <a:pPr marL="57150" indent="0">
-              <a:buNone/>
-            </a:pPr>
-            <a:r>
-              <a:rPr lang="en-GB" dirty="0" smtClean="0">
-                <a:solidFill>
-                  <a:schemeClr val="tx1"/>
-                </a:solidFill>
-              </a:rPr>
-              <a:t>You must unzip the file first </a:t>
-            </a:r>
-            <a:r>
-              <a:rPr lang="en-GB" dirty="0" smtClean="0">
-                <a:solidFill>
-                  <a:schemeClr val="tx1"/>
-                </a:solidFill>
-              </a:rPr>
-              <a:t>by right clicking </a:t>
-            </a:r>
-            <a:endParaRPr lang="en-GB" dirty="0" smtClean="0">
-              <a:solidFill>
-                <a:schemeClr val="tx1"/>
-              </a:solidFill>
-            </a:endParaRPr>
-          </a:p>
-          <a:p>
-            <a:pPr marL="57150" indent="0">
-              <a:buNone/>
-            </a:pPr>
-            <a:r>
-              <a:rPr lang="en-GB" dirty="0" smtClean="0">
-                <a:solidFill>
-                  <a:schemeClr val="tx1"/>
-                </a:solidFill>
-              </a:rPr>
-              <a:t>and </a:t>
-            </a:r>
-            <a:r>
-              <a:rPr lang="en-GB" dirty="0" smtClean="0">
-                <a:solidFill>
-                  <a:schemeClr val="tx1"/>
-                </a:solidFill>
-              </a:rPr>
-              <a:t>selecting “Extract all</a:t>
-            </a:r>
-            <a:r>
-              <a:rPr lang="en-GB" dirty="0" smtClean="0">
-                <a:solidFill>
-                  <a:schemeClr val="tx1"/>
-                </a:solidFill>
-              </a:rPr>
-              <a:t>”.</a:t>
-            </a:r>
-          </a:p>
-        </p:txBody>
-      </p:sp>
-    </p:spTree>
-    <p:extLst>
-      <p:ext uri="{BB962C8B-B14F-4D97-AF65-F5344CB8AC3E}">
-        <p14:creationId xmlns:p14="http://schemas.microsoft.com/office/powerpoint/2010/main" val="1081166787"/>
-      </p:ext>
-    </p:extLst>
-  </p:cSld>
-  <p:clrMapOvr>
-    <a:masterClrMapping/>
-  </p:clrMapOvr>
-</p:sld>
-</file>
-
-<file path=ppt/slides/slide20.xml><?xml version="1.0" encoding="utf-8"?>
-<p:sld xmlns:a="http://schemas.openxmlformats.org/drawingml/2006/main" xmlns:r="http://schemas.openxmlformats.org/officeDocument/2006/relationships" xmlns:p="http://schemas.openxmlformats.org/presentationml/2006/main">
-  <p:cSld>
-    <p:spTree>
-      <p:nvGrpSpPr>
-        <p:cNvPr id="1" name=""/>
-        <p:cNvGrpSpPr/>
-        <p:nvPr/>
-      </p:nvGrpSpPr>
-      <p:grpSpPr>
-        <a:xfrm>
-          <a:off x="0" y="0"/>
-          <a:ext cx="0" cy="0"/>
-          <a:chOff x="0" y="0"/>
-          <a:chExt cx="0" cy="0"/>
-        </a:xfrm>
-      </p:grpSpPr>
-      <p:sp>
-        <p:nvSpPr>
-          <p:cNvPr id="2" name="Title 1"/>
-          <p:cNvSpPr>
-            <a:spLocks noGrp="1"/>
-          </p:cNvSpPr>
-          <p:nvPr>
-            <p:ph type="title"/>
-          </p:nvPr>
-        </p:nvSpPr>
-        <p:spPr/>
-        <p:txBody>
-          <a:bodyPr/>
-          <a:lstStyle/>
-          <a:p>
-            <a:r>
-              <a:rPr lang="en-GB" dirty="0" smtClean="0"/>
-              <a:t>Some “</a:t>
-            </a:r>
-            <a:r>
-              <a:rPr lang="en-GB" dirty="0" err="1" smtClean="0"/>
-              <a:t>Gotchas</a:t>
-            </a:r>
-            <a:r>
-              <a:rPr lang="en-GB" dirty="0" smtClean="0"/>
-              <a:t>”</a:t>
-            </a:r>
-            <a:endParaRPr lang="en-US" dirty="0"/>
-          </a:p>
-        </p:txBody>
-      </p:sp>
-      <p:sp>
-        <p:nvSpPr>
-          <p:cNvPr id="3" name="Text Placeholder 2"/>
-          <p:cNvSpPr>
-            <a:spLocks noGrp="1"/>
-          </p:cNvSpPr>
-          <p:nvPr>
-            <p:ph type="body" idx="1"/>
-          </p:nvPr>
-        </p:nvSpPr>
-        <p:spPr/>
-        <p:txBody>
-          <a:bodyPr/>
-          <a:lstStyle/>
-          <a:p>
-            <a:pPr marL="0" lvl="1" indent="0">
-              <a:buNone/>
-            </a:pPr>
-            <a:r>
-              <a:rPr lang="en-GB" sz="2000" b="1" dirty="0" smtClean="0">
-                <a:solidFill>
-                  <a:schemeClr val="tx1"/>
-                </a:solidFill>
-              </a:rPr>
-              <a:t>1) Update properties</a:t>
-            </a:r>
-          </a:p>
-          <a:p>
-            <a:pPr marL="0" lvl="1" indent="0">
-              <a:buNone/>
-            </a:pPr>
-            <a:endParaRPr lang="en-GB" sz="1800" dirty="0" smtClean="0">
-              <a:solidFill>
-                <a:schemeClr val="tx1"/>
-              </a:solidFill>
-            </a:endParaRPr>
-          </a:p>
-          <a:p>
-            <a:pPr marL="0" lvl="1" indent="0">
-              <a:buNone/>
-            </a:pPr>
-            <a:r>
-              <a:rPr lang="en-GB" sz="1800" dirty="0" smtClean="0">
-                <a:solidFill>
-                  <a:schemeClr val="tx1"/>
-                </a:solidFill>
-              </a:rPr>
-              <a:t>It is key to set the properties where you have an attribute coming in from </a:t>
-            </a:r>
-            <a:r>
-              <a:rPr lang="en-GB" sz="1800" b="1" dirty="0" smtClean="0">
-                <a:solidFill>
-                  <a:schemeClr val="tx1"/>
-                </a:solidFill>
-              </a:rPr>
-              <a:t>“Constant” </a:t>
-            </a:r>
-            <a:r>
-              <a:rPr lang="en-GB" sz="1800" dirty="0" smtClean="0">
-                <a:solidFill>
-                  <a:schemeClr val="tx1"/>
-                </a:solidFill>
-              </a:rPr>
-              <a:t>(never changes) to </a:t>
-            </a:r>
-            <a:r>
-              <a:rPr lang="en-GB" sz="1800" b="1" dirty="0">
-                <a:solidFill>
-                  <a:schemeClr val="tx1"/>
-                </a:solidFill>
-              </a:rPr>
-              <a:t>“Set every repeat” </a:t>
-            </a:r>
-            <a:r>
-              <a:rPr lang="en-GB" sz="1800" dirty="0" smtClean="0">
-                <a:solidFill>
-                  <a:schemeClr val="tx1"/>
-                </a:solidFill>
-              </a:rPr>
-              <a:t>= (update </a:t>
-            </a:r>
-            <a:r>
-              <a:rPr lang="en-GB" sz="1800" dirty="0">
-                <a:solidFill>
-                  <a:schemeClr val="tx1"/>
-                </a:solidFill>
-              </a:rPr>
-              <a:t>and change on every </a:t>
-            </a:r>
-            <a:r>
-              <a:rPr lang="en-GB" sz="1800" dirty="0" smtClean="0">
-                <a:solidFill>
-                  <a:schemeClr val="tx1"/>
-                </a:solidFill>
-              </a:rPr>
-              <a:t>repetition/trial/loop).  Keeping as Constant will cause an error!</a:t>
-            </a:r>
-          </a:p>
-          <a:p>
-            <a:pPr marL="0" lvl="1" indent="0">
-              <a:buNone/>
-            </a:pPr>
-            <a:endParaRPr lang="en-GB" sz="1800" dirty="0">
-              <a:solidFill>
-                <a:schemeClr val="tx1"/>
-              </a:solidFill>
-            </a:endParaRPr>
-          </a:p>
-          <a:p>
-            <a:pPr marL="0" lvl="1" indent="0">
-              <a:buNone/>
-            </a:pPr>
-            <a:r>
-              <a:rPr lang="en-GB" sz="1400" dirty="0" smtClean="0">
-                <a:solidFill>
-                  <a:srgbClr val="FF0000"/>
-                </a:solidFill>
-              </a:rPr>
-              <a:t>NOTE: </a:t>
-            </a:r>
-            <a:r>
-              <a:rPr lang="en-GB" sz="1400" dirty="0" smtClean="0">
-                <a:solidFill>
-                  <a:schemeClr val="tx1"/>
-                </a:solidFill>
-              </a:rPr>
-              <a:t>The </a:t>
-            </a:r>
-            <a:r>
-              <a:rPr lang="en-GB" sz="1400" b="1" dirty="0" smtClean="0">
-                <a:solidFill>
-                  <a:schemeClr val="tx1"/>
-                </a:solidFill>
-              </a:rPr>
-              <a:t>“Set every frame” option updates </a:t>
-            </a:r>
-            <a:r>
-              <a:rPr lang="en-GB" sz="1400" dirty="0" smtClean="0">
-                <a:solidFill>
-                  <a:schemeClr val="tx1"/>
-                </a:solidFill>
-              </a:rPr>
-              <a:t>component at every single screen refresh</a:t>
-            </a:r>
-          </a:p>
-          <a:p>
-            <a:pPr marL="0" lvl="1" indent="0">
-              <a:buNone/>
-            </a:pPr>
-            <a:r>
-              <a:rPr lang="en-GB" sz="1400" b="1" dirty="0" smtClean="0">
-                <a:solidFill>
-                  <a:schemeClr val="tx1"/>
-                </a:solidFill>
-              </a:rPr>
-              <a:t>= Overkill!</a:t>
-            </a:r>
-            <a:endParaRPr lang="en-GB" sz="1800" b="1" dirty="0" smtClean="0">
-              <a:solidFill>
-                <a:schemeClr val="tx1"/>
-              </a:solidFill>
-            </a:endParaRPr>
-          </a:p>
-          <a:p>
-            <a:pPr marL="0" indent="0">
-              <a:buNone/>
-            </a:pPr>
-            <a:endParaRPr lang="en-GB" dirty="0">
-              <a:solidFill>
-                <a:schemeClr val="tx1"/>
-              </a:solidFill>
-            </a:endParaRPr>
-          </a:p>
-          <a:p>
-            <a:pPr marL="0" indent="0">
-              <a:buNone/>
-            </a:pPr>
-            <a:r>
-              <a:rPr lang="en-GB" sz="2000" b="1" dirty="0" smtClean="0">
-                <a:solidFill>
-                  <a:schemeClr val="tx1"/>
-                </a:solidFill>
-              </a:rPr>
-              <a:t>2) Making updates to the data file </a:t>
-            </a:r>
-            <a:r>
-              <a:rPr lang="en-GB" sz="2000" dirty="0" smtClean="0">
-                <a:solidFill>
-                  <a:schemeClr val="tx1"/>
-                </a:solidFill>
-              </a:rPr>
-              <a:t>(</a:t>
-            </a:r>
-            <a:r>
-              <a:rPr lang="en-GB" sz="2000" dirty="0" err="1" smtClean="0">
-                <a:solidFill>
-                  <a:schemeClr val="tx1"/>
-                </a:solidFill>
-              </a:rPr>
-              <a:t>i.e</a:t>
-            </a:r>
-            <a:r>
-              <a:rPr lang="en-GB" sz="2000" dirty="0" smtClean="0">
-                <a:solidFill>
-                  <a:schemeClr val="tx1"/>
-                </a:solidFill>
-              </a:rPr>
-              <a:t> new columns)</a:t>
-            </a:r>
-          </a:p>
-          <a:p>
-            <a:pPr marL="457200" lvl="1" indent="0">
-              <a:buNone/>
-            </a:pPr>
-            <a:endParaRPr lang="en-GB" sz="1800" b="1" dirty="0">
-              <a:solidFill>
-                <a:srgbClr val="7030A0"/>
-              </a:solidFill>
-            </a:endParaRPr>
-          </a:p>
-          <a:p>
-            <a:pPr marL="0" lvl="0" indent="0">
-              <a:buNone/>
-            </a:pPr>
-            <a:r>
-              <a:rPr lang="en-GB" dirty="0"/>
-              <a:t>When a trial list is updated with new columns, you </a:t>
-            </a:r>
-            <a:r>
-              <a:rPr lang="en-GB" dirty="0" smtClean="0"/>
-              <a:t>should </a:t>
-            </a:r>
-            <a:r>
-              <a:rPr lang="en-GB" b="1" dirty="0"/>
-              <a:t>re-attach the CSV file.   </a:t>
-            </a:r>
-            <a:r>
-              <a:rPr lang="en-GB" dirty="0"/>
-              <a:t>This </a:t>
-            </a:r>
-            <a:r>
-              <a:rPr lang="en-GB" dirty="0" smtClean="0"/>
-              <a:t>is to make sure </a:t>
-            </a:r>
-            <a:r>
-              <a:rPr lang="en-GB" dirty="0" err="1" smtClean="0"/>
-              <a:t>PsychoPy</a:t>
-            </a:r>
-            <a:r>
-              <a:rPr lang="en-GB" dirty="0" smtClean="0"/>
-              <a:t> picks </a:t>
-            </a:r>
-            <a:r>
-              <a:rPr lang="en-GB" dirty="0"/>
-              <a:t>up the new attributes you add</a:t>
-            </a:r>
-            <a:r>
-              <a:rPr lang="en-GB" dirty="0" smtClean="0"/>
-              <a:t>!</a:t>
-            </a:r>
-          </a:p>
-          <a:p>
-            <a:pPr marL="0" lvl="0" indent="0">
-              <a:buNone/>
-            </a:pPr>
-            <a:endParaRPr lang="en-GB" dirty="0"/>
-          </a:p>
-          <a:p>
-            <a:pPr marL="0" lvl="0" indent="0">
-              <a:buNone/>
-            </a:pPr>
-            <a:r>
-              <a:rPr lang="en-GB" sz="2000" b="1" dirty="0" smtClean="0">
-                <a:solidFill>
-                  <a:schemeClr val="tx1"/>
-                </a:solidFill>
-              </a:rPr>
-              <a:t>3) Attributes are “</a:t>
-            </a:r>
-            <a:r>
-              <a:rPr lang="en-GB" sz="2000" b="1" dirty="0" err="1" smtClean="0">
-                <a:solidFill>
-                  <a:schemeClr val="tx1"/>
-                </a:solidFill>
-              </a:rPr>
-              <a:t>CaSe</a:t>
-            </a:r>
-            <a:r>
-              <a:rPr lang="en-GB" sz="2000" b="1" dirty="0" smtClean="0">
-                <a:solidFill>
-                  <a:schemeClr val="tx1"/>
-                </a:solidFill>
-              </a:rPr>
-              <a:t> </a:t>
-            </a:r>
-            <a:r>
-              <a:rPr lang="en-GB" sz="2000" b="1" dirty="0" err="1" smtClean="0">
-                <a:solidFill>
-                  <a:schemeClr val="tx1"/>
-                </a:solidFill>
-              </a:rPr>
-              <a:t>SeNsItIvE</a:t>
-            </a:r>
-            <a:r>
-              <a:rPr lang="en-GB" sz="2000" b="1" dirty="0" smtClean="0">
-                <a:solidFill>
-                  <a:schemeClr val="tx1"/>
-                </a:solidFill>
-              </a:rPr>
-              <a:t>” and must not contain white space!</a:t>
-            </a:r>
-            <a:endParaRPr lang="en-GB" sz="2000" b="1" dirty="0">
-              <a:solidFill>
-                <a:schemeClr val="tx1"/>
-              </a:solidFill>
-            </a:endParaRPr>
-          </a:p>
-          <a:p>
-            <a:pPr marL="0" indent="0">
-              <a:buNone/>
-            </a:pPr>
-            <a:endParaRPr lang="en-US" dirty="0"/>
-          </a:p>
-        </p:txBody>
-      </p:sp>
-    </p:spTree>
-    <p:extLst>
-      <p:ext uri="{BB962C8B-B14F-4D97-AF65-F5344CB8AC3E}">
-        <p14:creationId xmlns:p14="http://schemas.microsoft.com/office/powerpoint/2010/main" val="3331521809"/>
-      </p:ext>
-    </p:extLst>
-  </p:cSld>
-  <p:clrMapOvr>
-    <a:masterClrMapping/>
-  </p:clrMapOvr>
-</p:sld>
-</file>
-
 <file path=ppt/slides/slide21.xml><?xml version="1.0" encoding="utf-8"?>
 <p:sld xmlns:a="http://schemas.openxmlformats.org/drawingml/2006/main" xmlns:r="http://schemas.openxmlformats.org/officeDocument/2006/relationships" xmlns:p="http://schemas.openxmlformats.org/presentationml/2006/main">
   <p:cSld>
@@ -13577,55 +13397,22 @@
         </p:nvSpPr>
         <p:spPr/>
         <p:txBody>
-          <a:bodyPr>
-            <a:normAutofit fontScale="90000"/>
-          </a:bodyPr>
+          <a:bodyPr/>
           <a:lstStyle/>
           <a:p>
             <a:r>
               <a:rPr lang="en-GB" dirty="0" smtClean="0"/>
-              <a:t>Exercise 2:</a:t>
-            </a:r>
-            <a:br>
+              <a:t>Some “</a:t>
+            </a:r>
+            <a:r>
+              <a:rPr lang="en-GB" dirty="0" err="1" smtClean="0"/>
+              <a:t>Gotchas</a:t>
+            </a:r>
+            <a:r>
               <a:rPr lang="en-GB" dirty="0" smtClean="0"/>
-            </a:br>
-            <a:r>
-              <a:rPr lang="en-GB" dirty="0" smtClean="0">
-                <a:solidFill>
-                  <a:schemeClr val="accent1">
-                    <a:lumMod val="50000"/>
-                  </a:schemeClr>
-                </a:solidFill>
-              </a:rPr>
-              <a:t>Modify the </a:t>
-            </a:r>
-            <a:r>
-              <a:rPr lang="en-GB" dirty="0" err="1" smtClean="0">
-                <a:solidFill>
-                  <a:schemeClr val="accent1">
-                    <a:lumMod val="50000"/>
-                  </a:schemeClr>
-                </a:solidFill>
-              </a:rPr>
-              <a:t>Stroop</a:t>
-            </a:r>
-            <a:r>
-              <a:rPr lang="en-GB" dirty="0" smtClean="0">
-                <a:solidFill>
-                  <a:schemeClr val="accent1">
-                    <a:lumMod val="50000"/>
-                  </a:schemeClr>
-                </a:solidFill>
-              </a:rPr>
-              <a:t> demo</a:t>
-            </a:r>
-            <a:endParaRPr lang="en-US" dirty="0">
-              <a:solidFill>
-                <a:schemeClr val="accent1">
-                  <a:lumMod val="50000"/>
-                </a:schemeClr>
-              </a:solidFill>
-            </a:endParaRPr>
+              <a:t>”</a:t>
+            </a:r>
+            <a:endParaRPr lang="en-US" dirty="0"/>
           </a:p>
         </p:txBody>
       </p:sp>
@@ -13641,245 +13428,329 @@
         </p:nvSpPr>
         <p:spPr/>
         <p:txBody>
-          <a:bodyPr>
-            <a:normAutofit/>
-          </a:bodyPr>
+          <a:bodyPr/>
           <a:lstStyle/>
           <a:p>
-            <a:pPr>
-              <a:buFont typeface="+mj-lt"/>
-              <a:buAutoNum type="arabicPeriod"/>
-            </a:pPr>
-            <a:r>
-              <a:rPr lang="en-GB" sz="2000" dirty="0" smtClean="0"/>
-              <a:t>Open up </a:t>
+            <a:pPr marL="0" lvl="1" indent="0">
+              <a:buNone/>
+            </a:pPr>
+            <a:r>
+              <a:rPr lang="en-GB" sz="2000" b="1" dirty="0" smtClean="0">
+                <a:solidFill>
+                  <a:schemeClr val="tx1"/>
+                </a:solidFill>
+              </a:rPr>
+              <a:t>1) Update properties</a:t>
+            </a:r>
+          </a:p>
+          <a:p>
+            <a:pPr marL="0" lvl="1" indent="0">
+              <a:buNone/>
+            </a:pPr>
+            <a:endParaRPr lang="en-GB" sz="1800" dirty="0" smtClean="0">
+              <a:solidFill>
+                <a:schemeClr val="tx1"/>
+              </a:solidFill>
+            </a:endParaRPr>
+          </a:p>
+          <a:p>
+            <a:pPr marL="0" lvl="1" indent="0">
+              <a:buNone/>
+            </a:pPr>
+            <a:r>
+              <a:rPr lang="en-GB" sz="1800" dirty="0" smtClean="0">
+                <a:solidFill>
+                  <a:schemeClr val="tx1"/>
+                </a:solidFill>
+              </a:rPr>
+              <a:t>It is key to set the properties where you have an attribute coming in from </a:t>
+            </a:r>
+            <a:r>
+              <a:rPr lang="en-GB" sz="1800" b="1" dirty="0" smtClean="0">
+                <a:solidFill>
+                  <a:schemeClr val="tx1"/>
+                </a:solidFill>
+              </a:rPr>
+              <a:t>“Constant” </a:t>
+            </a:r>
+            <a:r>
+              <a:rPr lang="en-GB" sz="1800" dirty="0" smtClean="0">
+                <a:solidFill>
+                  <a:schemeClr val="tx1"/>
+                </a:solidFill>
+              </a:rPr>
+              <a:t>(never changes) to </a:t>
+            </a:r>
+            <a:r>
+              <a:rPr lang="en-GB" sz="1800" b="1" dirty="0">
+                <a:solidFill>
+                  <a:schemeClr val="tx1"/>
+                </a:solidFill>
+              </a:rPr>
+              <a:t>“Set every repeat” </a:t>
+            </a:r>
+            <a:r>
+              <a:rPr lang="en-GB" sz="1800" dirty="0" smtClean="0">
+                <a:solidFill>
+                  <a:schemeClr val="tx1"/>
+                </a:solidFill>
+              </a:rPr>
+              <a:t>= (update </a:t>
+            </a:r>
+            <a:r>
+              <a:rPr lang="en-GB" sz="1800" dirty="0">
+                <a:solidFill>
+                  <a:schemeClr val="tx1"/>
+                </a:solidFill>
+              </a:rPr>
+              <a:t>and change on every </a:t>
+            </a:r>
+            <a:r>
+              <a:rPr lang="en-GB" sz="1800" dirty="0" smtClean="0">
+                <a:solidFill>
+                  <a:schemeClr val="tx1"/>
+                </a:solidFill>
+              </a:rPr>
+              <a:t>repetition/trial/loop).  Keeping as Constant will cause an error!</a:t>
+            </a:r>
+          </a:p>
+          <a:p>
+            <a:pPr marL="0" lvl="1" indent="0">
+              <a:buNone/>
+            </a:pPr>
+            <a:endParaRPr lang="en-GB" sz="1800" dirty="0">
+              <a:solidFill>
+                <a:schemeClr val="tx1"/>
+              </a:solidFill>
+            </a:endParaRPr>
+          </a:p>
+          <a:p>
+            <a:pPr marL="0" lvl="1" indent="0">
+              <a:buNone/>
+            </a:pPr>
+            <a:r>
+              <a:rPr lang="en-GB" sz="1400" dirty="0" smtClean="0">
+                <a:solidFill>
+                  <a:srgbClr val="FF0000"/>
+                </a:solidFill>
+              </a:rPr>
+              <a:t>NOTE: </a:t>
+            </a:r>
+            <a:r>
+              <a:rPr lang="en-GB" sz="1400" dirty="0" smtClean="0">
+                <a:solidFill>
+                  <a:schemeClr val="tx1"/>
+                </a:solidFill>
+              </a:rPr>
+              <a:t>The </a:t>
+            </a:r>
+            <a:r>
+              <a:rPr lang="en-GB" sz="1400" b="1" dirty="0" smtClean="0">
+                <a:solidFill>
+                  <a:schemeClr val="tx1"/>
+                </a:solidFill>
+              </a:rPr>
+              <a:t>“Set every frame” option updates </a:t>
+            </a:r>
+            <a:r>
+              <a:rPr lang="en-GB" sz="1400" dirty="0" smtClean="0">
+                <a:solidFill>
+                  <a:schemeClr val="tx1"/>
+                </a:solidFill>
+              </a:rPr>
+              <a:t>component at every single screen refresh</a:t>
+            </a:r>
+          </a:p>
+          <a:p>
+            <a:pPr marL="0" lvl="1" indent="0">
+              <a:buNone/>
+            </a:pPr>
+            <a:r>
+              <a:rPr lang="en-GB" sz="1400" b="1" dirty="0" smtClean="0">
+                <a:solidFill>
+                  <a:schemeClr val="tx1"/>
+                </a:solidFill>
+              </a:rPr>
+              <a:t>= Overkill!</a:t>
+            </a:r>
+            <a:endParaRPr lang="en-GB" sz="1800" b="1" dirty="0" smtClean="0">
+              <a:solidFill>
+                <a:schemeClr val="tx1"/>
+              </a:solidFill>
+            </a:endParaRPr>
+          </a:p>
+          <a:p>
+            <a:pPr marL="0" indent="0">
+              <a:buNone/>
+            </a:pPr>
+            <a:endParaRPr lang="en-GB" dirty="0">
+              <a:solidFill>
+                <a:schemeClr val="tx1"/>
+              </a:solidFill>
+            </a:endParaRPr>
+          </a:p>
+          <a:p>
+            <a:pPr marL="0" indent="0">
+              <a:buNone/>
+            </a:pPr>
+            <a:r>
+              <a:rPr lang="en-GB" sz="2000" b="1" dirty="0" smtClean="0">
+                <a:solidFill>
+                  <a:schemeClr val="tx1"/>
+                </a:solidFill>
+              </a:rPr>
+              <a:t>2) Making updates to the data file </a:t>
             </a:r>
             <a:r>
               <a:rPr lang="en-GB" sz="2000" dirty="0" smtClean="0">
-                <a:latin typeface="Courier New" panose="02070309020205020404" pitchFamily="49" charset="0"/>
-                <a:cs typeface="Courier New" panose="02070309020205020404" pitchFamily="49" charset="0"/>
+                <a:solidFill>
+                  <a:schemeClr val="tx1"/>
+                </a:solidFill>
               </a:rPr>
-              <a:t>/</a:t>
+              <a:t>(</a:t>
             </a:r>
             <a:r>
               <a:rPr lang="en-GB" sz="2000" dirty="0" err="1" smtClean="0">
-                <a:latin typeface="Courier New" panose="02070309020205020404" pitchFamily="49" charset="0"/>
-                <a:cs typeface="Courier New" panose="02070309020205020404" pitchFamily="49" charset="0"/>
+                <a:solidFill>
+                  <a:schemeClr val="tx1"/>
+                </a:solidFill>
               </a:rPr>
-              <a:t>stroop</a:t>
+              <a:t>i.e</a:t>
             </a:r>
             <a:r>
               <a:rPr lang="en-GB" sz="2000" dirty="0" smtClean="0">
-                <a:latin typeface="Courier New" panose="02070309020205020404" pitchFamily="49" charset="0"/>
-                <a:cs typeface="Courier New" panose="02070309020205020404" pitchFamily="49" charset="0"/>
+                <a:solidFill>
+                  <a:schemeClr val="tx1"/>
+                </a:solidFill>
               </a:rPr>
-              <a:t>/</a:t>
-            </a:r>
-            <a:r>
-              <a:rPr lang="en-GB" sz="2000" dirty="0" err="1" smtClean="0">
-                <a:latin typeface="Courier New" panose="02070309020205020404" pitchFamily="49" charset="0"/>
-                <a:cs typeface="Courier New" panose="02070309020205020404" pitchFamily="49" charset="0"/>
+              <a:t> new columns)</a:t>
+            </a:r>
+          </a:p>
+          <a:p>
+            <a:pPr marL="457200" lvl="1" indent="0">
+              <a:buNone/>
+            </a:pPr>
+            <a:endParaRPr lang="en-GB" sz="1800" b="1" dirty="0">
+              <a:solidFill>
+                <a:srgbClr val="7030A0"/>
+              </a:solidFill>
+            </a:endParaRPr>
+          </a:p>
+          <a:p>
+            <a:pPr marL="0" lvl="0" indent="0">
+              <a:buNone/>
+            </a:pPr>
+            <a:r>
+              <a:rPr lang="en-GB" dirty="0"/>
+              <a:t>When a trial list is updated with new columns, you </a:t>
+            </a:r>
+            <a:r>
+              <a:rPr lang="en-GB" dirty="0" smtClean="0"/>
+              <a:t>should </a:t>
+            </a:r>
+            <a:r>
+              <a:rPr lang="en-GB" b="1" dirty="0"/>
+              <a:t>re-attach the CSV file.   </a:t>
+            </a:r>
+            <a:r>
+              <a:rPr lang="en-GB" dirty="0"/>
+              <a:t>This </a:t>
+            </a:r>
+            <a:r>
+              <a:rPr lang="en-GB" dirty="0" smtClean="0"/>
+              <a:t>is to make sure </a:t>
+            </a:r>
+            <a:r>
+              <a:rPr lang="en-GB" dirty="0" err="1" smtClean="0"/>
+              <a:t>PsychoPy</a:t>
+            </a:r>
+            <a:r>
+              <a:rPr lang="en-GB" dirty="0" smtClean="0"/>
+              <a:t> picks </a:t>
+            </a:r>
+            <a:r>
+              <a:rPr lang="en-GB" dirty="0"/>
+              <a:t>up the new attributes you add</a:t>
+            </a:r>
+            <a:r>
+              <a:rPr lang="en-GB" dirty="0" smtClean="0"/>
+              <a:t>!</a:t>
+            </a:r>
+          </a:p>
+          <a:p>
+            <a:pPr marL="0" lvl="0" indent="0">
+              <a:buNone/>
+            </a:pPr>
+            <a:endParaRPr lang="en-GB" dirty="0"/>
+          </a:p>
+          <a:p>
+            <a:pPr marL="0" lvl="0" indent="0">
+              <a:buNone/>
+            </a:pPr>
+            <a:r>
+              <a:rPr lang="en-GB" sz="2000" b="1" dirty="0" smtClean="0">
+                <a:solidFill>
+                  <a:schemeClr val="tx1"/>
+                </a:solidFill>
               </a:rPr>
-              <a:t>stroop.psyexp</a:t>
-            </a:r>
-            <a:r>
-              <a:rPr lang="en-GB" sz="2000" dirty="0" smtClean="0">
-                <a:latin typeface="Courier New" panose="02070309020205020404" pitchFamily="49" charset="0"/>
-                <a:cs typeface="Courier New" panose="02070309020205020404" pitchFamily="49" charset="0"/>
+              <a:t>3) Attributes are “</a:t>
+            </a:r>
+            <a:r>
+              <a:rPr lang="en-GB" sz="2000" b="1" dirty="0" err="1" smtClean="0">
+                <a:solidFill>
+                  <a:schemeClr val="tx1"/>
+                </a:solidFill>
+              </a:rPr>
+              <a:t>CaSe</a:t>
+            </a:r>
+            <a:r>
+              <a:rPr lang="en-GB" sz="2000" b="1" dirty="0" smtClean="0">
+                <a:solidFill>
+                  <a:schemeClr val="tx1"/>
+                </a:solidFill>
               </a:rPr>
               <a:t> </a:t>
             </a:r>
             <a:r>
-              <a:rPr lang="en-GB" sz="2000" dirty="0" smtClean="0"/>
-              <a:t>from Exercise 1</a:t>
-            </a:r>
-          </a:p>
-          <a:p>
-            <a:pPr>
-              <a:buFont typeface="+mj-lt"/>
-              <a:buAutoNum type="arabicPeriod"/>
-            </a:pPr>
-            <a:r>
-              <a:rPr lang="en-GB" sz="2000" dirty="0" smtClean="0"/>
-              <a:t>Change the intro text and the first line “</a:t>
-            </a:r>
-            <a:r>
-              <a:rPr lang="en-GB" sz="2000" b="1" dirty="0" smtClean="0"/>
-              <a:t>OK. Ready for the real thing?</a:t>
-            </a:r>
-            <a:r>
-              <a:rPr lang="en-GB" sz="2000" dirty="0" smtClean="0"/>
-              <a:t>” to “</a:t>
-            </a:r>
-            <a:r>
-              <a:rPr lang="en-GB" sz="2000" b="1" dirty="0" smtClean="0"/>
-              <a:t>Instructions</a:t>
-            </a:r>
-            <a:r>
-              <a:rPr lang="en-GB" sz="2000" dirty="0" smtClean="0"/>
-              <a:t>”</a:t>
-            </a:r>
-          </a:p>
-          <a:p>
-            <a:pPr>
-              <a:buFont typeface="+mj-lt"/>
-              <a:buAutoNum type="arabicPeriod"/>
-            </a:pPr>
-            <a:r>
-              <a:rPr lang="en-GB" sz="2000" dirty="0" smtClean="0"/>
-              <a:t>Change keys </a:t>
-            </a:r>
-            <a:r>
-              <a:rPr lang="en-GB" sz="2000" dirty="0" smtClean="0"/>
-              <a:t>from </a:t>
-            </a:r>
-            <a:r>
-              <a:rPr lang="en-GB" sz="2000" b="1" dirty="0" smtClean="0"/>
-              <a:t>“left”, “down”, “right” </a:t>
-            </a:r>
-            <a:r>
-              <a:rPr lang="en-GB" sz="2000" dirty="0" smtClean="0"/>
-              <a:t>to </a:t>
-            </a:r>
-            <a:r>
-              <a:rPr lang="en-GB" sz="2000" b="1" dirty="0" smtClean="0"/>
-              <a:t>“a”, “s”, “d”</a:t>
-            </a:r>
-          </a:p>
-          <a:p>
-            <a:pPr lvl="1">
-              <a:buFont typeface="Wingdings" panose="05000000000000000000" pitchFamily="2" charset="2"/>
-              <a:buChar char="§"/>
-            </a:pPr>
-            <a:r>
-              <a:rPr lang="en-GB" sz="2000" dirty="0" smtClean="0"/>
-              <a:t>Ensure you update the instructions</a:t>
-            </a:r>
-          </a:p>
-          <a:p>
-            <a:pPr>
-              <a:buFont typeface="+mj-lt"/>
-              <a:buAutoNum type="arabicPeriod"/>
-            </a:pPr>
-            <a:r>
-              <a:rPr lang="en-GB" sz="2000" dirty="0" smtClean="0"/>
-              <a:t>Add another 5 trials to the </a:t>
-            </a:r>
-            <a:r>
-              <a:rPr lang="en-GB" sz="2000" dirty="0" err="1" smtClean="0"/>
-              <a:t>Stroop</a:t>
-            </a:r>
-            <a:endParaRPr lang="en-GB" sz="2000" dirty="0" smtClean="0"/>
-          </a:p>
-          <a:p>
-            <a:pPr lvl="1">
-              <a:buFont typeface="Wingdings" panose="05000000000000000000" pitchFamily="2" charset="2"/>
-              <a:buChar char="§"/>
-            </a:pPr>
-            <a:r>
-              <a:rPr lang="en-GB" sz="2000" dirty="0" smtClean="0">
-                <a:cs typeface="Courier New" panose="02070309020205020404" pitchFamily="49" charset="0"/>
+              <a:rPr lang="en-GB" sz="2000" b="1" dirty="0" err="1" smtClean="0">
+                <a:solidFill>
+                  <a:schemeClr val="tx1"/>
+                </a:solidFill>
               </a:rPr>
-              <a:t>Edit the </a:t>
-            </a:r>
-            <a:r>
-              <a:rPr lang="en-GB" sz="2000" dirty="0" smtClean="0">
-                <a:latin typeface="Courier New" panose="02070309020205020404" pitchFamily="49" charset="0"/>
-                <a:cs typeface="Courier New" panose="02070309020205020404" pitchFamily="49" charset="0"/>
+              <a:t>SeNsItIvE</a:t>
+            </a:r>
+            <a:r>
+              <a:rPr lang="en-GB" sz="2000" b="1" dirty="0" smtClean="0">
+                <a:solidFill>
+                  <a:schemeClr val="tx1"/>
+                </a:solidFill>
               </a:rPr>
-              <a:t>trialTypes.xlsx </a:t>
-            </a:r>
-            <a:r>
-              <a:rPr lang="en-GB" sz="2000" dirty="0" smtClean="0"/>
-              <a:t>is where the source trial data is!</a:t>
-            </a:r>
-          </a:p>
-          <a:p>
-            <a:pPr>
-              <a:buFont typeface="+mj-lt"/>
-              <a:buAutoNum type="arabicPeriod"/>
-            </a:pPr>
-            <a:r>
-              <a:rPr lang="en-GB" sz="2000" dirty="0" smtClean="0"/>
-              <a:t>Try adding a new routine which will act as a title page for the experiment</a:t>
-            </a:r>
-          </a:p>
-          <a:p>
-            <a:pPr lvl="1">
-              <a:buFont typeface="Wingdings" panose="05000000000000000000" pitchFamily="2" charset="2"/>
-              <a:buChar char="§"/>
-            </a:pPr>
-            <a:r>
-              <a:rPr lang="en-GB" sz="2000" dirty="0" smtClean="0"/>
-              <a:t>HINT: the “instruct” routine should give you some clues</a:t>
-            </a:r>
-          </a:p>
-          <a:p>
-            <a:pPr lvl="1">
-              <a:buFont typeface="Wingdings" panose="05000000000000000000" pitchFamily="2" charset="2"/>
-              <a:buChar char="§"/>
-            </a:pPr>
-            <a:r>
-              <a:rPr lang="en-GB" sz="2000" dirty="0" smtClean="0"/>
-              <a:t>Look at the properties of the </a:t>
-            </a:r>
-            <a:r>
-              <a:rPr lang="en-GB" sz="2000" b="1" dirty="0" smtClean="0"/>
-              <a:t>Text</a:t>
-            </a:r>
-            <a:r>
-              <a:rPr lang="en-GB" sz="2000" dirty="0" smtClean="0"/>
-              <a:t> and </a:t>
-            </a:r>
-            <a:r>
-              <a:rPr lang="en-GB" sz="2000" b="1" dirty="0" smtClean="0"/>
-              <a:t>Keyboard</a:t>
-            </a:r>
-            <a:r>
-              <a:rPr lang="en-GB" sz="2000" dirty="0" smtClean="0"/>
-              <a:t> component and replicate</a:t>
-            </a:r>
-          </a:p>
-          <a:p>
-            <a:pPr>
-              <a:buFont typeface="+mj-lt"/>
-              <a:buAutoNum type="arabicPeriod"/>
-            </a:pPr>
-            <a:r>
-              <a:rPr lang="en-GB" sz="2000" dirty="0" smtClean="0"/>
-              <a:t>Re-Run and see what you get</a:t>
-            </a:r>
-            <a:endParaRPr lang="en-US" sz="2000" dirty="0"/>
-          </a:p>
-          <a:p>
-            <a:pPr lvl="1">
-              <a:buFont typeface="Wingdings" panose="05000000000000000000" pitchFamily="2" charset="2"/>
-              <a:buChar char="§"/>
-            </a:pPr>
-            <a:r>
-              <a:rPr lang="en-GB" sz="2000" dirty="0" smtClean="0"/>
-              <a:t>Look at the result file, has your new data column come over?</a:t>
-            </a:r>
+              <a:t>” and must not contain white space!</a:t>
+            </a:r>
+            <a:endParaRPr lang="en-GB" sz="2000" b="1" dirty="0">
+              <a:solidFill>
+                <a:schemeClr val="tx1"/>
+              </a:solidFill>
+            </a:endParaRPr>
+          </a:p>
+          <a:p>
+            <a:pPr marL="0" indent="0">
+              <a:buNone/>
+            </a:pPr>
+            <a:endParaRPr lang="en-US" dirty="0"/>
           </a:p>
         </p:txBody>
       </p:sp>
     </p:spTree>
     <p:extLst>
       <p:ext uri="{BB962C8B-B14F-4D97-AF65-F5344CB8AC3E}">
-        <p14:creationId xmlns:p14="http://schemas.microsoft.com/office/powerpoint/2010/main" val="1662202215"/>
+        <p14:creationId xmlns:p14="http://schemas.microsoft.com/office/powerpoint/2010/main" val="3331521809"/>
       </p:ext>
     </p:extLst>
   </p:cSld>
   <p:clrMapOvr>
     <a:masterClrMapping/>
   </p:clrMapOvr>
-  <p:timing>
-    <p:tnLst>
-      <p:par>
-        <p:cTn id="1" dur="indefinite" restart="never" nodeType="tmRoot"/>
-      </p:par>
-    </p:tnLst>
-  </p:timing>
 </p:sld>
 </file>
 
@@ -13912,14 +13783,55 @@
         </p:nvSpPr>
         <p:spPr/>
         <p:txBody>
-          <a:bodyPr/>
+          <a:bodyPr>
+            <a:normAutofit fontScale="90000"/>
+          </a:bodyPr>
           <a:lstStyle/>
           <a:p>
             <a:r>
               <a:rPr lang="en-GB" dirty="0" smtClean="0"/>
-              <a:t>Components - Part 2</a:t>
-            </a:r>
-            <a:endParaRPr lang="en-US" dirty="0"/>
+              <a:t>Exercise 2:</a:t>
+            </a:r>
+            <a:br>
+              <a:rPr lang="en-GB" dirty="0" smtClean="0"/>
+            </a:br>
+            <a:r>
+              <a:rPr lang="en-GB" dirty="0" smtClean="0">
+                <a:solidFill>
+                  <a:schemeClr val="accent1">
+                    <a:lumMod val="50000"/>
+                  </a:schemeClr>
+                </a:solidFill>
+              </a:rPr>
+              <a:t>Modify the </a:t>
+            </a:r>
+            <a:r>
+              <a:rPr lang="en-GB" dirty="0" err="1" smtClean="0">
+                <a:solidFill>
+                  <a:schemeClr val="accent1">
+                    <a:lumMod val="50000"/>
+                  </a:schemeClr>
+                </a:solidFill>
+              </a:rPr>
+              <a:t>Stroop</a:t>
+            </a:r>
+            <a:r>
+              <a:rPr lang="en-GB" dirty="0" smtClean="0">
+                <a:solidFill>
+                  <a:schemeClr val="accent1">
+                    <a:lumMod val="50000"/>
+                  </a:schemeClr>
+                </a:solidFill>
+              </a:rPr>
+              <a:t> demo</a:t>
+            </a:r>
+            <a:endParaRPr lang="en-US" dirty="0">
+              <a:solidFill>
+                <a:schemeClr val="accent1">
+                  <a:lumMod val="50000"/>
+                </a:schemeClr>
+              </a:solidFill>
+            </a:endParaRPr>
           </a:p>
         </p:txBody>
       </p:sp>
@@ -13933,255 +13845,230 @@
             <p:ph type="body" idx="1"/>
           </p:nvPr>
         </p:nvSpPr>
-        <p:spPr>
-          <a:xfrm>
-            <a:off x="487328" y="1417936"/>
-            <a:ext cx="8229600" cy="4967700"/>
-          </a:xfrm>
-        </p:spPr>
+        <p:spPr/>
         <p:txBody>
           <a:bodyPr>
-            <a:normAutofit fontScale="92500" lnSpcReduction="20000"/>
+            <a:normAutofit/>
           </a:bodyPr>
           <a:lstStyle/>
           <a:p>
-            <a:pPr marL="0" indent="0">
-              <a:buNone/>
-            </a:pPr>
-            <a:r>
-              <a:rPr lang="en-GB" dirty="0" smtClean="0"/>
-              <a:t>Brief overview of remaining components in brief.</a:t>
-            </a:r>
-          </a:p>
-          <a:p>
-            <a:pPr marL="0" indent="0">
-              <a:buNone/>
-            </a:pPr>
-            <a:endParaRPr lang="en-GB" dirty="0" smtClean="0"/>
-          </a:p>
-          <a:p>
-            <a:pPr marL="0" indent="0">
-              <a:buNone/>
-            </a:pPr>
-            <a:r>
-              <a:rPr lang="en-GB" dirty="0" smtClean="0"/>
-              <a:t>Stimuli:</a:t>
-            </a:r>
-          </a:p>
-          <a:p>
-            <a:r>
-              <a:rPr lang="en-GB" b="1" dirty="0" smtClean="0"/>
-              <a:t>Sound</a:t>
-            </a:r>
-            <a:r>
-              <a:rPr lang="en-GB" dirty="0" smtClean="0"/>
-              <a:t> – Playback of sound</a:t>
-            </a:r>
-          </a:p>
-          <a:p>
-            <a:r>
-              <a:rPr lang="en-GB" b="1" dirty="0" smtClean="0"/>
-              <a:t>Image</a:t>
-            </a:r>
-            <a:r>
-              <a:rPr lang="en-GB" dirty="0" smtClean="0"/>
-              <a:t> – Display of image</a:t>
-            </a:r>
-          </a:p>
-          <a:p>
-            <a:r>
-              <a:rPr lang="en-GB" b="1" dirty="0" smtClean="0"/>
-              <a:t>Aperture</a:t>
-            </a:r>
-            <a:r>
-              <a:rPr lang="en-GB" dirty="0" smtClean="0"/>
-              <a:t> – Add a circular effect onto image component</a:t>
-            </a:r>
-          </a:p>
-          <a:p>
-            <a:r>
-              <a:rPr lang="en-GB" b="1" dirty="0" smtClean="0"/>
-              <a:t>Grating</a:t>
-            </a:r>
-            <a:r>
-              <a:rPr lang="en-GB" dirty="0" smtClean="0"/>
-              <a:t> – Wrapped texture that can be cycled in 2 dimensions</a:t>
-            </a:r>
-          </a:p>
-          <a:p>
-            <a:r>
-              <a:rPr lang="en-GB" b="1" dirty="0" smtClean="0"/>
-              <a:t>Movie</a:t>
-            </a:r>
-            <a:r>
-              <a:rPr lang="en-GB" dirty="0" smtClean="0"/>
-              <a:t> – Playback of movie files</a:t>
-            </a:r>
-          </a:p>
-          <a:p>
-            <a:r>
-              <a:rPr lang="en-GB" b="1" dirty="0" smtClean="0"/>
-              <a:t>Dots</a:t>
-            </a:r>
-            <a:r>
-              <a:rPr lang="en-GB" dirty="0" smtClean="0"/>
-              <a:t> – Presentation of Random Dot </a:t>
-            </a:r>
-            <a:r>
-              <a:rPr lang="en-GB" dirty="0" err="1" smtClean="0"/>
-              <a:t>Kinematogram</a:t>
-            </a:r>
-            <a:r>
-              <a:rPr lang="en-GB" dirty="0" smtClean="0"/>
-              <a:t> to participants</a:t>
-            </a:r>
-          </a:p>
-          <a:p>
-            <a:r>
-              <a:rPr lang="en-GB" b="1" dirty="0" smtClean="0"/>
-              <a:t>Polygon</a:t>
-            </a:r>
-            <a:r>
-              <a:rPr lang="en-GB" dirty="0" smtClean="0"/>
-              <a:t> – Shape presentation of different sides (square, rectangle, octagon)</a:t>
-            </a:r>
-          </a:p>
-          <a:p>
-            <a:endParaRPr lang="en-GB" dirty="0" smtClean="0"/>
-          </a:p>
-          <a:p>
-            <a:pPr marL="0" indent="0">
-              <a:buNone/>
-            </a:pPr>
-            <a:r>
-              <a:rPr lang="en-GB" dirty="0" smtClean="0"/>
-              <a:t>Responses:</a:t>
-            </a:r>
-          </a:p>
-          <a:p>
-            <a:r>
-              <a:rPr lang="en-GB" b="1" dirty="0" smtClean="0"/>
-              <a:t>Mouse</a:t>
-            </a:r>
-            <a:r>
-              <a:rPr lang="en-GB" dirty="0" smtClean="0"/>
-              <a:t> – Take responses from the mouse</a:t>
-            </a:r>
-          </a:p>
-          <a:p>
-            <a:r>
-              <a:rPr lang="en-GB" b="1" dirty="0" smtClean="0"/>
-              <a:t>Mic</a:t>
-            </a:r>
-            <a:r>
-              <a:rPr lang="en-GB" dirty="0" smtClean="0"/>
-              <a:t> – Only records sound, doesn’t register response to sound</a:t>
-            </a:r>
-          </a:p>
-          <a:p>
-            <a:r>
-              <a:rPr lang="en-GB" b="1" dirty="0" smtClean="0"/>
-              <a:t>Scale</a:t>
-            </a:r>
-            <a:r>
-              <a:rPr lang="en-GB" dirty="0" smtClean="0"/>
-              <a:t> – Mouse friendly scale to choose a value</a:t>
-            </a:r>
-          </a:p>
-          <a:p>
-            <a:r>
-              <a:rPr lang="en-GB" b="1" dirty="0" err="1" smtClean="0"/>
-              <a:t>ioBox</a:t>
-            </a:r>
-            <a:r>
-              <a:rPr lang="en-GB" b="1" dirty="0" smtClean="0"/>
-              <a:t>, </a:t>
-            </a:r>
-            <a:r>
-              <a:rPr lang="en-GB" b="1" dirty="0" err="1" smtClean="0"/>
-              <a:t>Cedrus</a:t>
-            </a:r>
-            <a:r>
-              <a:rPr lang="en-GB" b="1" dirty="0"/>
+            <a:pPr>
+              <a:buFont typeface="+mj-lt"/>
+              <a:buAutoNum type="arabicPeriod"/>
+            </a:pPr>
+            <a:r>
+              <a:rPr lang="en-GB" sz="2000" dirty="0" smtClean="0"/>
+              <a:t>Open up </a:t>
+            </a:r>
+            <a:r>
+              <a:rPr lang="en-GB" sz="2000" dirty="0" smtClean="0">
+                <a:latin typeface="Courier New" panose="02070309020205020404" pitchFamily="49" charset="0"/>
+                <a:cs typeface="Courier New" panose="02070309020205020404" pitchFamily="49" charset="0"/>
+              </a:rPr>
+              <a:t>/</a:t>
+            </a:r>
+            <a:r>
+              <a:rPr lang="en-GB" sz="2000" dirty="0" err="1" smtClean="0">
+                <a:latin typeface="Courier New" panose="02070309020205020404" pitchFamily="49" charset="0"/>
+                <a:cs typeface="Courier New" panose="02070309020205020404" pitchFamily="49" charset="0"/>
+              </a:rPr>
+              <a:t>stroop</a:t>
+            </a:r>
+            <a:r>
+              <a:rPr lang="en-GB" sz="2000" dirty="0" smtClean="0">
+                <a:latin typeface="Courier New" panose="02070309020205020404" pitchFamily="49" charset="0"/>
+                <a:cs typeface="Courier New" panose="02070309020205020404" pitchFamily="49" charset="0"/>
+              </a:rPr>
+              <a:t>/</a:t>
+            </a:r>
+            <a:r>
+              <a:rPr lang="en-GB" sz="2000" dirty="0" err="1" smtClean="0">
+                <a:latin typeface="Courier New" panose="02070309020205020404" pitchFamily="49" charset="0"/>
+                <a:cs typeface="Courier New" panose="02070309020205020404" pitchFamily="49" charset="0"/>
+              </a:rPr>
+              <a:t>stroop.psyexp</a:t>
+            </a:r>
+            <a:r>
+              <a:rPr lang="en-GB" sz="2000" dirty="0" smtClean="0">
+                <a:latin typeface="Courier New" panose="02070309020205020404" pitchFamily="49" charset="0"/>
+                <a:cs typeface="Courier New" panose="02070309020205020404" pitchFamily="49" charset="0"/>
+              </a:rPr>
               <a:t> </a:t>
             </a:r>
             <a:r>
-              <a:rPr lang="en-GB" dirty="0" smtClean="0"/>
-              <a:t>– Input options for external hardware devices and button boxes</a:t>
-            </a:r>
-            <a:endParaRPr lang="en-GB" dirty="0"/>
-          </a:p>
-          <a:p>
-            <a:pPr marL="0" indent="0">
-              <a:buNone/>
-            </a:pPr>
-            <a:endParaRPr lang="en-GB" dirty="0" smtClean="0"/>
-          </a:p>
-          <a:p>
-            <a:pPr marL="0" indent="0">
-              <a:buNone/>
-            </a:pPr>
-            <a:r>
-              <a:rPr lang="en-GB" dirty="0" smtClean="0"/>
-              <a:t>Other:</a:t>
-            </a:r>
-          </a:p>
-          <a:p>
-            <a:r>
-              <a:rPr lang="en-GB" b="1" dirty="0" smtClean="0"/>
-              <a:t>Parallel icon </a:t>
-            </a:r>
-            <a:r>
-              <a:rPr lang="en-GB" dirty="0" smtClean="0"/>
-              <a:t>– Send signals down a cable (EEG)</a:t>
-            </a:r>
-          </a:p>
-          <a:p>
-            <a:r>
-              <a:rPr lang="en-GB" b="1" dirty="0" smtClean="0"/>
-              <a:t>Static</a:t>
-            </a:r>
-            <a:r>
-              <a:rPr lang="en-GB" dirty="0" smtClean="0"/>
-              <a:t> – A static period to allow for pre-loading images or other operations</a:t>
-            </a:r>
-          </a:p>
-          <a:p>
-            <a:endParaRPr lang="en-GB" dirty="0"/>
-          </a:p>
-          <a:p>
-            <a:pPr marL="0" indent="0">
-              <a:buNone/>
-            </a:pPr>
-            <a:r>
-              <a:rPr lang="en-GB" dirty="0" smtClean="0"/>
-              <a:t>More details can </a:t>
-            </a:r>
-            <a:r>
-              <a:rPr lang="en-GB" dirty="0"/>
-              <a:t>be found at </a:t>
-            </a:r>
-            <a:r>
-              <a:rPr lang="en-GB" b="1" dirty="0"/>
-              <a:t>http://</a:t>
-            </a:r>
-            <a:r>
-              <a:rPr lang="en-GB" b="1" dirty="0" smtClean="0"/>
-              <a:t>www.psychopy.org/builder/components.html</a:t>
-            </a:r>
-          </a:p>
-          <a:p>
-            <a:pPr marL="0" indent="0">
-              <a:buNone/>
-            </a:pPr>
-            <a:endParaRPr lang="en-US" dirty="0"/>
+              <a:rPr lang="en-GB" sz="2000" dirty="0" smtClean="0"/>
+              <a:t>from Exercise 1</a:t>
+            </a:r>
+          </a:p>
+          <a:p>
+            <a:pPr>
+              <a:buFont typeface="+mj-lt"/>
+              <a:buAutoNum type="arabicPeriod"/>
+            </a:pPr>
+            <a:r>
+              <a:rPr lang="en-GB" sz="2000" dirty="0" smtClean="0"/>
+              <a:t>Change the intro text and the first line “</a:t>
+            </a:r>
+            <a:r>
+              <a:rPr lang="en-GB" sz="2000" b="1" dirty="0" smtClean="0"/>
+              <a:t>OK. Ready for the real thing?</a:t>
+            </a:r>
+            <a:r>
+              <a:rPr lang="en-GB" sz="2000" dirty="0" smtClean="0"/>
+              <a:t>” to “</a:t>
+            </a:r>
+            <a:r>
+              <a:rPr lang="en-GB" sz="2000" b="1" dirty="0" smtClean="0"/>
+              <a:t>Instructions</a:t>
+            </a:r>
+            <a:r>
+              <a:rPr lang="en-GB" sz="2000" dirty="0" smtClean="0"/>
+              <a:t>”</a:t>
+            </a:r>
+          </a:p>
+          <a:p>
+            <a:pPr>
+              <a:buFont typeface="+mj-lt"/>
+              <a:buAutoNum type="arabicPeriod"/>
+            </a:pPr>
+            <a:r>
+              <a:rPr lang="en-GB" sz="2000" dirty="0" smtClean="0"/>
+              <a:t>Change keys from </a:t>
+            </a:r>
+            <a:r>
+              <a:rPr lang="en-GB" sz="2000" b="1" dirty="0" smtClean="0"/>
+              <a:t>“left”, “down”, “right” </a:t>
+            </a:r>
+            <a:r>
+              <a:rPr lang="en-GB" sz="2000" dirty="0" smtClean="0"/>
+              <a:t>to </a:t>
+            </a:r>
+            <a:r>
+              <a:rPr lang="en-GB" sz="2000" b="1" dirty="0" smtClean="0"/>
+              <a:t>“a”, “s”, “d”</a:t>
+            </a:r>
+          </a:p>
+          <a:p>
+            <a:pPr lvl="1">
+              <a:buFont typeface="Wingdings" panose="05000000000000000000" pitchFamily="2" charset="2"/>
+              <a:buChar char="§"/>
+            </a:pPr>
+            <a:r>
+              <a:rPr lang="en-GB" sz="2000" dirty="0" smtClean="0"/>
+              <a:t>Ensure you update the instructions</a:t>
+            </a:r>
+          </a:p>
+          <a:p>
+            <a:pPr>
+              <a:buFont typeface="+mj-lt"/>
+              <a:buAutoNum type="arabicPeriod"/>
+            </a:pPr>
+            <a:r>
+              <a:rPr lang="en-GB" sz="2000" dirty="0" smtClean="0"/>
+              <a:t>Add another 5 trials to the </a:t>
+            </a:r>
+            <a:r>
+              <a:rPr lang="en-GB" sz="2000" dirty="0" err="1" smtClean="0"/>
+              <a:t>Stroop</a:t>
+            </a:r>
+            <a:endParaRPr lang="en-GB" sz="2000" dirty="0" smtClean="0"/>
+          </a:p>
+          <a:p>
+            <a:pPr lvl="1">
+              <a:buFont typeface="Wingdings" panose="05000000000000000000" pitchFamily="2" charset="2"/>
+              <a:buChar char="§"/>
+            </a:pPr>
+            <a:r>
+              <a:rPr lang="en-GB" sz="2000" dirty="0" smtClean="0">
+                <a:cs typeface="Courier New" panose="02070309020205020404" pitchFamily="49" charset="0"/>
+              </a:rPr>
+              <a:t>Edit the </a:t>
+            </a:r>
+            <a:r>
+              <a:rPr lang="en-GB" sz="2000" dirty="0" smtClean="0">
+                <a:latin typeface="Courier New" panose="02070309020205020404" pitchFamily="49" charset="0"/>
+                <a:cs typeface="Courier New" panose="02070309020205020404" pitchFamily="49" charset="0"/>
+              </a:rPr>
+              <a:t>trialTypes.xlsx </a:t>
+            </a:r>
+            <a:r>
+              <a:rPr lang="en-GB" sz="2000" dirty="0" smtClean="0"/>
+              <a:t>is where the source trial data is!</a:t>
+            </a:r>
+          </a:p>
+          <a:p>
+            <a:pPr>
+              <a:buFont typeface="+mj-lt"/>
+              <a:buAutoNum type="arabicPeriod"/>
+            </a:pPr>
+            <a:r>
+              <a:rPr lang="en-GB" sz="2000" dirty="0" smtClean="0"/>
+              <a:t>Try adding a new routine which will act as a title page for the experiment</a:t>
+            </a:r>
+          </a:p>
+          <a:p>
+            <a:pPr lvl="1">
+              <a:buFont typeface="Wingdings" panose="05000000000000000000" pitchFamily="2" charset="2"/>
+              <a:buChar char="§"/>
+            </a:pPr>
+            <a:r>
+              <a:rPr lang="en-GB" sz="2000" dirty="0" smtClean="0"/>
+              <a:t>HINT: the “instruct” routine should give you some clues</a:t>
+            </a:r>
+          </a:p>
+          <a:p>
+            <a:pPr lvl="1">
+              <a:buFont typeface="Wingdings" panose="05000000000000000000" pitchFamily="2" charset="2"/>
+              <a:buChar char="§"/>
+            </a:pPr>
+            <a:r>
+              <a:rPr lang="en-GB" sz="2000" dirty="0" smtClean="0"/>
+              <a:t>Look at the properties of the </a:t>
+            </a:r>
+            <a:r>
+              <a:rPr lang="en-GB" sz="2000" b="1" dirty="0" smtClean="0"/>
+              <a:t>Text</a:t>
+            </a:r>
+            <a:r>
+              <a:rPr lang="en-GB" sz="2000" dirty="0" smtClean="0"/>
+              <a:t> and </a:t>
+            </a:r>
+            <a:r>
+              <a:rPr lang="en-GB" sz="2000" b="1" dirty="0" smtClean="0"/>
+              <a:t>Keyboard</a:t>
+            </a:r>
+            <a:r>
+              <a:rPr lang="en-GB" sz="2000" dirty="0" smtClean="0"/>
+              <a:t> component and replicate</a:t>
+            </a:r>
+          </a:p>
+          <a:p>
+            <a:pPr>
+              <a:buFont typeface="+mj-lt"/>
+              <a:buAutoNum type="arabicPeriod"/>
+            </a:pPr>
+            <a:r>
+              <a:rPr lang="en-GB" sz="2000" dirty="0" smtClean="0"/>
+              <a:t>Re-Run and see what you get</a:t>
+            </a:r>
+            <a:endParaRPr lang="en-US" sz="2000" dirty="0"/>
+          </a:p>
+          <a:p>
+            <a:pPr lvl="1">
+              <a:buFont typeface="Wingdings" panose="05000000000000000000" pitchFamily="2" charset="2"/>
+              <a:buChar char="§"/>
+            </a:pPr>
+            <a:r>
+              <a:rPr lang="en-GB" sz="2000" dirty="0" smtClean="0"/>
+              <a:t>Look at the result file, has your new data column come over?</a:t>
+            </a:r>
           </a:p>
         </p:txBody>
       </p:sp>
     </p:spTree>
     <p:extLst>
       <p:ext uri="{BB962C8B-B14F-4D97-AF65-F5344CB8AC3E}">
-        <p14:creationId xmlns:p14="http://schemas.microsoft.com/office/powerpoint/2010/main" val="1997174920"/>
+        <p14:creationId xmlns:p14="http://schemas.microsoft.com/office/powerpoint/2010/main" val="1662202215"/>
       </p:ext>
     </p:extLst>
   </p:cSld>
@@ -14232,7 +14119,324 @@
           <a:p>
             <a:r>
               <a:rPr lang="en-GB" dirty="0" smtClean="0"/>
-              <a:t>Demo: “</a:t>
+              <a:t>Components - Part 2</a:t>
+            </a:r>
+            <a:endParaRPr lang="en-US" dirty="0"/>
+          </a:p>
+        </p:txBody>
+      </p:sp>
+      <p:sp>
+        <p:nvSpPr>
+          <p:cNvPr id="3" name="Text Placeholder 2"/>
+          <p:cNvSpPr>
+            <a:spLocks noGrp="1"/>
+          </p:cNvSpPr>
+          <p:nvPr>
+            <p:ph type="body" idx="1"/>
+          </p:nvPr>
+        </p:nvSpPr>
+        <p:spPr>
+          <a:xfrm>
+            <a:off x="487328" y="1417936"/>
+            <a:ext cx="8229600" cy="4967700"/>
+          </a:xfrm>
+        </p:spPr>
+        <p:txBody>
+          <a:bodyPr>
+            <a:normAutofit fontScale="92500" lnSpcReduction="20000"/>
+          </a:bodyPr>
+          <a:lstStyle/>
+          <a:p>
+            <a:pPr marL="0" indent="0">
+              <a:buNone/>
+            </a:pPr>
+            <a:r>
+              <a:rPr lang="en-GB" dirty="0" smtClean="0"/>
+              <a:t>Brief overview of remaining components in brief.</a:t>
+            </a:r>
+          </a:p>
+          <a:p>
+            <a:pPr marL="0" indent="0">
+              <a:buNone/>
+            </a:pPr>
+            <a:endParaRPr lang="en-GB" dirty="0" smtClean="0"/>
+          </a:p>
+          <a:p>
+            <a:pPr marL="0" indent="0">
+              <a:buNone/>
+            </a:pPr>
+            <a:r>
+              <a:rPr lang="en-GB" dirty="0" smtClean="0"/>
+              <a:t>Stimuli:</a:t>
+            </a:r>
+          </a:p>
+          <a:p>
+            <a:r>
+              <a:rPr lang="en-GB" b="1" dirty="0" smtClean="0"/>
+              <a:t>Sound</a:t>
+            </a:r>
+            <a:r>
+              <a:rPr lang="en-GB" dirty="0" smtClean="0"/>
+              <a:t> – Playback of sound</a:t>
+            </a:r>
+          </a:p>
+          <a:p>
+            <a:r>
+              <a:rPr lang="en-GB" b="1" dirty="0" smtClean="0"/>
+              <a:t>Image</a:t>
+            </a:r>
+            <a:r>
+              <a:rPr lang="en-GB" dirty="0" smtClean="0"/>
+              <a:t> – Display of image</a:t>
+            </a:r>
+          </a:p>
+          <a:p>
+            <a:r>
+              <a:rPr lang="en-GB" b="1" dirty="0" smtClean="0"/>
+              <a:t>Aperture</a:t>
+            </a:r>
+            <a:r>
+              <a:rPr lang="en-GB" dirty="0" smtClean="0"/>
+              <a:t> – Add a circular effect onto image component</a:t>
+            </a:r>
+          </a:p>
+          <a:p>
+            <a:r>
+              <a:rPr lang="en-GB" b="1" dirty="0" smtClean="0"/>
+              <a:t>Grating</a:t>
+            </a:r>
+            <a:r>
+              <a:rPr lang="en-GB" dirty="0" smtClean="0"/>
+              <a:t> – Wrapped texture that can be cycled in 2 dimensions</a:t>
+            </a:r>
+          </a:p>
+          <a:p>
+            <a:r>
+              <a:rPr lang="en-GB" b="1" dirty="0" smtClean="0"/>
+              <a:t>Movie</a:t>
+            </a:r>
+            <a:r>
+              <a:rPr lang="en-GB" dirty="0" smtClean="0"/>
+              <a:t> – Playback of movie files</a:t>
+            </a:r>
+          </a:p>
+          <a:p>
+            <a:r>
+              <a:rPr lang="en-GB" b="1" dirty="0" smtClean="0"/>
+              <a:t>Dots</a:t>
+            </a:r>
+            <a:r>
+              <a:rPr lang="en-GB" dirty="0" smtClean="0"/>
+              <a:t> – Presentation of Random Dot </a:t>
+            </a:r>
+            <a:r>
+              <a:rPr lang="en-GB" dirty="0" err="1" smtClean="0"/>
+              <a:t>Kinematogram</a:t>
+            </a:r>
+            <a:r>
+              <a:rPr lang="en-GB" dirty="0" smtClean="0"/>
+              <a:t> to participants</a:t>
+            </a:r>
+          </a:p>
+          <a:p>
+            <a:r>
+              <a:rPr lang="en-GB" b="1" dirty="0" smtClean="0"/>
+              <a:t>Polygon</a:t>
+            </a:r>
+            <a:r>
+              <a:rPr lang="en-GB" dirty="0" smtClean="0"/>
+              <a:t> – Shape presentation of different sides (square, rectangle, octagon)</a:t>
+            </a:r>
+          </a:p>
+          <a:p>
+            <a:endParaRPr lang="en-GB" dirty="0" smtClean="0"/>
+          </a:p>
+          <a:p>
+            <a:pPr marL="0" indent="0">
+              <a:buNone/>
+            </a:pPr>
+            <a:r>
+              <a:rPr lang="en-GB" dirty="0" smtClean="0"/>
+              <a:t>Responses:</a:t>
+            </a:r>
+          </a:p>
+          <a:p>
+            <a:r>
+              <a:rPr lang="en-GB" b="1" dirty="0" smtClean="0"/>
+              <a:t>Mouse</a:t>
+            </a:r>
+            <a:r>
+              <a:rPr lang="en-GB" dirty="0" smtClean="0"/>
+              <a:t> – Take responses from the mouse</a:t>
+            </a:r>
+          </a:p>
+          <a:p>
+            <a:r>
+              <a:rPr lang="en-GB" b="1" dirty="0" smtClean="0"/>
+              <a:t>Mic</a:t>
+            </a:r>
+            <a:r>
+              <a:rPr lang="en-GB" dirty="0" smtClean="0"/>
+              <a:t> – Only records sound, doesn’t register response to sound</a:t>
+            </a:r>
+          </a:p>
+          <a:p>
+            <a:r>
+              <a:rPr lang="en-GB" b="1" dirty="0" smtClean="0"/>
+              <a:t>Scale</a:t>
+            </a:r>
+            <a:r>
+              <a:rPr lang="en-GB" dirty="0" smtClean="0"/>
+              <a:t> – Mouse friendly scale to choose a value</a:t>
+            </a:r>
+          </a:p>
+          <a:p>
+            <a:r>
+              <a:rPr lang="en-GB" b="1" dirty="0" err="1" smtClean="0"/>
+              <a:t>ioBox</a:t>
+            </a:r>
+            <a:r>
+              <a:rPr lang="en-GB" b="1" dirty="0" smtClean="0"/>
+              <a:t>, </a:t>
+            </a:r>
+            <a:r>
+              <a:rPr lang="en-GB" b="1" dirty="0" err="1" smtClean="0"/>
+              <a:t>Cedrus</a:t>
+            </a:r>
+            <a:r>
+              <a:rPr lang="en-GB" b="1" dirty="0"/>
+              <a:t> </a:t>
+            </a:r>
+            <a:r>
+              <a:rPr lang="en-GB" dirty="0" smtClean="0"/>
+              <a:t>– Input options for external hardware devices and button boxes</a:t>
+            </a:r>
+            <a:endParaRPr lang="en-GB" dirty="0"/>
+          </a:p>
+          <a:p>
+            <a:pPr marL="0" indent="0">
+              <a:buNone/>
+            </a:pPr>
+            <a:endParaRPr lang="en-GB" dirty="0" smtClean="0"/>
+          </a:p>
+          <a:p>
+            <a:pPr marL="0" indent="0">
+              <a:buNone/>
+            </a:pPr>
+            <a:r>
+              <a:rPr lang="en-GB" dirty="0" smtClean="0"/>
+              <a:t>Other:</a:t>
+            </a:r>
+          </a:p>
+          <a:p>
+            <a:r>
+              <a:rPr lang="en-GB" b="1" dirty="0" smtClean="0"/>
+              <a:t>Parallel icon </a:t>
+            </a:r>
+            <a:r>
+              <a:rPr lang="en-GB" dirty="0" smtClean="0"/>
+              <a:t>– Send signals down a cable (EEG)</a:t>
+            </a:r>
+          </a:p>
+          <a:p>
+            <a:r>
+              <a:rPr lang="en-GB" b="1" dirty="0" smtClean="0"/>
+              <a:t>Static</a:t>
+            </a:r>
+            <a:r>
+              <a:rPr lang="en-GB" dirty="0" smtClean="0"/>
+              <a:t> – A static period to allow for pre-loading images or other operations</a:t>
+            </a:r>
+          </a:p>
+          <a:p>
+            <a:endParaRPr lang="en-GB" dirty="0"/>
+          </a:p>
+          <a:p>
+            <a:pPr marL="0" indent="0">
+              <a:buNone/>
+            </a:pPr>
+            <a:r>
+              <a:rPr lang="en-GB" dirty="0" smtClean="0"/>
+              <a:t>More details can </a:t>
+            </a:r>
+            <a:r>
+              <a:rPr lang="en-GB" dirty="0"/>
+              <a:t>be found at </a:t>
+            </a:r>
+            <a:r>
+              <a:rPr lang="en-GB" b="1" dirty="0"/>
+              <a:t>http://</a:t>
+            </a:r>
+            <a:r>
+              <a:rPr lang="en-GB" b="1" dirty="0" smtClean="0"/>
+              <a:t>www.psychopy.org/builder/components.html</a:t>
+            </a:r>
+          </a:p>
+          <a:p>
+            <a:pPr marL="0" indent="0">
+              <a:buNone/>
+            </a:pPr>
+            <a:endParaRPr lang="en-US" dirty="0"/>
+          </a:p>
+        </p:txBody>
+      </p:sp>
+    </p:spTree>
+    <p:extLst>
+      <p:ext uri="{BB962C8B-B14F-4D97-AF65-F5344CB8AC3E}">
+        <p14:creationId xmlns:p14="http://schemas.microsoft.com/office/powerpoint/2010/main" val="1997174920"/>
+      </p:ext>
+    </p:extLst>
+  </p:cSld>
+  <p:clrMapOvr>
+    <a:masterClrMapping/>
+  </p:clrMapOvr>
+  <p:timing>
+    <p:tnLst>
+      <p:par>
+        <p:cTn id="1" dur="indefinite" restart="never" nodeType="tmRoot"/>
+      </p:par>
+    </p:tnLst>
+  </p:timing>
+</p:sld>
+</file>
+
+<file path=ppt/slides/slide24.xml><?xml version="1.0" encoding="utf-8"?>
+<p:sld xmlns:a="http://schemas.openxmlformats.org/drawingml/2006/main" xmlns:r="http://schemas.openxmlformats.org/officeDocument/2006/relationships" xmlns:p="http://schemas.openxmlformats.org/presentationml/2006/main">
+  <p:cSld>
+    <p:spTree>
+      <p:nvGrpSpPr>
+        <p:cNvPr id="1" name=""/>
+        <p:cNvGrpSpPr/>
+        <p:nvPr/>
+      </p:nvGrpSpPr>
+      <p:grpSpPr>
+        <a:xfrm>
+          <a:off x="0" y="0"/>
+          <a:ext cx="0" cy="0"/>
+          <a:chOff x="0" y="0"/>
+          <a:chExt cx="0" cy="0"/>
+        </a:xfrm>
+      </p:grpSpPr>
+      <p:sp>
+        <p:nvSpPr>
+          <p:cNvPr id="2" name="Title 1"/>
+          <p:cNvSpPr>
+            <a:spLocks noGrp="1"/>
+          </p:cNvSpPr>
+          <p:nvPr>
+            <p:ph type="title"/>
+          </p:nvPr>
+        </p:nvSpPr>
+        <p:spPr/>
+        <p:txBody>
+          <a:bodyPr>
+            <a:normAutofit fontScale="90000"/>
+          </a:bodyPr>
+          <a:lstStyle/>
+          <a:p>
+            <a:r>
+              <a:rPr lang="en-GB" dirty="0" smtClean="0"/>
+              <a:t>Demo: </a:t>
             </a:r>
             <a:r>
               <a:rPr lang="en-GB" dirty="0" err="1" smtClean="0"/>
@@ -14240,7 +14444,14 @@
             </a:r>
             <a:r>
               <a:rPr lang="en-GB" dirty="0" smtClean="0"/>
-              <a:t> preferences”</a:t>
+              <a:t> preferences + </a:t>
+            </a:r>
+            <a:br>
+              <a:rPr lang="en-GB" dirty="0" smtClean="0"/>
+            </a:br>
+            <a:r>
+              <a:rPr lang="en-GB" dirty="0" smtClean="0"/>
+              <a:t>Experiment settings</a:t>
             </a:r>
             <a:endParaRPr lang="en-US" dirty="0"/>
           </a:p>
@@ -14293,7 +14504,7 @@
 </p:sld>
 </file>
 
-<file path=ppt/slides/slide24.xml><?xml version="1.0" encoding="utf-8"?>
+<file path=ppt/slides/slide25.xml><?xml version="1.0" encoding="utf-8"?>
 <p:sld xmlns:a="http://schemas.openxmlformats.org/drawingml/2006/main" xmlns:r="http://schemas.openxmlformats.org/officeDocument/2006/relationships" xmlns:p="http://schemas.openxmlformats.org/presentationml/2006/main">
   <p:cSld>
     <p:spTree>
@@ -14441,7 +14652,7 @@
 </p:sld>
 </file>
 
-<file path=ppt/slides/slide25.xml><?xml version="1.0" encoding="utf-8"?>
+<file path=ppt/slides/slide26.xml><?xml version="1.0" encoding="utf-8"?>
 <p:sld xmlns:a="http://schemas.openxmlformats.org/drawingml/2006/main" xmlns:r="http://schemas.openxmlformats.org/officeDocument/2006/relationships" xmlns:p="http://schemas.openxmlformats.org/presentationml/2006/main">
   <p:cSld>
     <p:spTree>
@@ -14580,11 +14791,7 @@
           <a:p>
             <a:r>
               <a:rPr lang="en-GB" sz="2000" dirty="0" smtClean="0"/>
-              <a:t>Now open </a:t>
-            </a:r>
-            <a:r>
-              <a:rPr lang="en-GB" sz="2000" dirty="0" smtClean="0"/>
-              <a:t>up the picture-</a:t>
+              <a:t>Now open up the picture-</a:t>
             </a:r>
             <a:r>
               <a:rPr lang="en-GB" sz="2000" dirty="0" err="1" smtClean="0"/>
@@ -14592,11 +14799,7 @@
             </a:r>
             <a:r>
               <a:rPr lang="en-GB" sz="2000" dirty="0" smtClean="0"/>
-              <a:t> folder in your </a:t>
-            </a:r>
-            <a:r>
-              <a:rPr lang="en-GB" sz="2000" dirty="0" smtClean="0"/>
-              <a:t>directory</a:t>
+              <a:t> folder in your directory</a:t>
             </a:r>
           </a:p>
           <a:p>
@@ -15445,15 +15648,7 @@
                             <a:srgbClr val="7030A0"/>
                           </a:solidFill>
                         </a:rPr>
-                        <a:t> recently</a:t>
-                      </a:r>
-                      <a:r>
-                        <a:rPr lang="en-GB" sz="1400" b="1" i="1" baseline="0" dirty="0" smtClean="0">
-                          <a:solidFill>
-                            <a:srgbClr val="7030A0"/>
-                          </a:solidFill>
-                        </a:rPr>
-                        <a:t>.</a:t>
+                        <a:t> recently.</a:t>
                       </a:r>
                     </a:p>
                     <a:p>
@@ -15472,11 +15667,6 @@
                         </a:rPr>
                         <a:t>Also web browser based experiment capabilities in Beta stage at the moment.  Not yet fully stable.</a:t>
                       </a:r>
-                      <a:endParaRPr lang="en-GB" sz="1400" b="1" i="1" baseline="0" dirty="0" smtClean="0">
-                        <a:solidFill>
-                          <a:srgbClr val="7030A0"/>
-                        </a:solidFill>
-                      </a:endParaRPr>
                     </a:p>
                   </a:txBody>
                   <a:tcPr/>
@@ -16130,7 +16320,7 @@
                 <a:cs typeface="Courier New"/>
                 <a:sym typeface="Courier New"/>
               </a:rPr>
-              <a:t>2018/19</a:t>
+              <a:t>2019/20</a:t>
             </a:r>
             <a:r>
               <a:rPr lang="en" sz="1400" dirty="0" smtClean="0">
@@ -16209,15 +16399,7 @@
                   <a:schemeClr val="tx1"/>
                 </a:solidFill>
               </a:rPr>
-              <a:t> Fixed for consistency across </a:t>
-            </a:r>
-            <a:r>
-              <a:rPr lang="en" sz="1400" dirty="0" smtClean="0">
-                <a:solidFill>
-                  <a:schemeClr val="tx1"/>
-                </a:solidFill>
-              </a:rPr>
-              <a:t>School</a:t>
+              <a:t> Fixed for consistency across School</a:t>
             </a:r>
           </a:p>
           <a:p>
@@ -16245,11 +16427,6 @@
               </a:rPr>
               <a:t>Sticking on an older version for now due to stability issues with the latest version</a:t>
             </a:r>
-            <a:endParaRPr lang="en" sz="1400" dirty="0" smtClean="0">
-              <a:solidFill>
-                <a:schemeClr val="tx1"/>
-              </a:solidFill>
-            </a:endParaRPr>
           </a:p>
           <a:p>
             <a:pPr marL="247650" indent="-171450">
@@ -16360,15 +16537,7 @@
                   <a:schemeClr val="tx1"/>
                 </a:solidFill>
               </a:rPr>
-              <a:t>MAY not </a:t>
-            </a:r>
-            <a:r>
-              <a:rPr lang="en" sz="1400" dirty="0">
-                <a:solidFill>
-                  <a:schemeClr val="tx1"/>
-                </a:solidFill>
-              </a:rPr>
-              <a:t>run </a:t>
+              <a:t>WILL NOT run </a:t>
             </a:r>
             <a:r>
               <a:rPr lang="en" sz="1400" dirty="0" smtClean="0">
@@ -16488,18 +16657,7 @@
                 <a:cs typeface="Courier New"/>
                 <a:sym typeface="Courier New"/>
               </a:rPr>
-              <a:t>For home use, </a:t>
-            </a:r>
-            <a:r>
-              <a:rPr lang="en" sz="1400" b="1" dirty="0" smtClean="0">
-                <a:solidFill>
-                  <a:schemeClr val="tx1"/>
-                </a:solidFill>
-                <a:ea typeface="Courier New"/>
-                <a:cs typeface="Courier New"/>
-                <a:sym typeface="Courier New"/>
-              </a:rPr>
-              <a:t>download from:</a:t>
+              <a:t>For home use, download from:</a:t>
             </a:r>
           </a:p>
           <a:p>
@@ -16538,14 +16696,6 @@
               </a:rPr>
               <a:t>Windows:</a:t>
             </a:r>
-            <a:endParaRPr lang="en" sz="1400" b="1" dirty="0" smtClean="0">
-              <a:solidFill>
-                <a:schemeClr val="tx1"/>
-              </a:solidFill>
-              <a:ea typeface="Courier New"/>
-              <a:cs typeface="Courier New"/>
-              <a:sym typeface="Courier New"/>
-            </a:endParaRPr>
           </a:p>
           <a:p>
             <a:pPr marL="76200" indent="0">
@@ -17129,23 +17279,8 @@
                 <a:cs typeface="Courier New"/>
                 <a:sym typeface="Courier New"/>
               </a:rPr>
-              <a:t>Student PC’s (</a:t>
-            </a:r>
-            <a:r>
-              <a:rPr lang="en" sz="2000" dirty="0" smtClean="0">
-                <a:latin typeface="Trebuchet MS" panose="020B0603020202020204" pitchFamily="34" charset="0"/>
-                <a:ea typeface="Courier New"/>
-                <a:cs typeface="Courier New"/>
-                <a:sym typeface="Courier New"/>
-              </a:rPr>
-              <a:t>N1.04, Oaks, MSc computing room)</a:t>
-            </a:r>
-            <a:endParaRPr lang="en" sz="2000" dirty="0" smtClean="0">
-              <a:latin typeface="Trebuchet MS" panose="020B0603020202020204" pitchFamily="34" charset="0"/>
-              <a:ea typeface="Courier New"/>
-              <a:cs typeface="Courier New"/>
-              <a:sym typeface="Courier New"/>
-            </a:endParaRPr>
+              <a:t>Student PC’s (N1.04, Oaks, MSc computing room)</a:t>
+            </a:r>
           </a:p>
           <a:p>
             <a:pPr marL="1314450" lvl="2" indent="-381000">
@@ -17202,7 +17337,16 @@
                 <a:cs typeface="Courier New"/>
                 <a:sym typeface="Courier New"/>
               </a:rPr>
-              <a:t>Lab / Staff PC’s</a:t>
+              <a:t>Lab </a:t>
+            </a:r>
+            <a:r>
+              <a:rPr lang="en" sz="2400" dirty="0" smtClean="0">
+                <a:latin typeface="Trebuchet MS" panose="020B0603020202020204" pitchFamily="34" charset="0"/>
+                <a:ea typeface="Courier New"/>
+                <a:cs typeface="Courier New"/>
+                <a:sym typeface="Courier New"/>
+              </a:rPr>
+              <a:t>PC’s</a:t>
             </a:r>
             <a:endParaRPr lang="en" sz="2400" dirty="0">
               <a:latin typeface="Trebuchet MS" panose="020B0603020202020204" pitchFamily="34" charset="0"/>
@@ -17222,13 +17366,31 @@
               <a:buChar char="§"/>
             </a:pPr>
             <a:r>
-              <a:rPr lang="en" sz="2000" dirty="0" smtClean="0">
+              <a:rPr lang="en" sz="1800" dirty="0" smtClean="0">
                 <a:latin typeface="Courier New"/>
                 <a:ea typeface="Courier New"/>
                 <a:cs typeface="Courier New"/>
                 <a:sym typeface="Courier New"/>
               </a:rPr>
-              <a:t>START | PsychoPy</a:t>
+              <a:t>START </a:t>
+            </a:r>
+            <a:r>
+              <a:rPr lang="en" sz="1800" dirty="0" smtClean="0">
+                <a:latin typeface="Courier New"/>
+                <a:ea typeface="Courier New"/>
+                <a:cs typeface="Courier New"/>
+                <a:sym typeface="Courier New"/>
+              </a:rPr>
+              <a:t>| </a:t>
+            </a:r>
+            <a:r>
+              <a:rPr lang="en" sz="1800" dirty="0" smtClean="0">
+                <a:latin typeface="Courier New"/>
+                <a:ea typeface="Courier New"/>
+                <a:cs typeface="Courier New"/>
+                <a:sym typeface="Courier New"/>
+              </a:rPr>
+              <a:t>PsychoPy</a:t>
             </a:r>
           </a:p>
           <a:p>
@@ -17248,9 +17410,112 @@
                 <a:cs typeface="Courier New"/>
                 <a:sym typeface="Courier New"/>
               </a:rPr>
-              <a:t>If not present, please contact psychsupport@kent.ac.uk</a:t>
-            </a:r>
-            <a:endParaRPr lang="en" sz="2000" dirty="0">
+              <a:t>If still </a:t>
+            </a:r>
+            <a:r>
+              <a:rPr lang="en" sz="2000" dirty="0" smtClean="0">
+                <a:latin typeface="Courier New"/>
+                <a:ea typeface="Courier New"/>
+                <a:cs typeface="Courier New"/>
+                <a:sym typeface="Courier New"/>
+              </a:rPr>
+              <a:t>not present, please contact </a:t>
+            </a:r>
+            <a:r>
+              <a:rPr lang="en" sz="2000" dirty="0" smtClean="0">
+                <a:latin typeface="Courier New"/>
+                <a:ea typeface="Courier New"/>
+                <a:cs typeface="Courier New"/>
+                <a:sym typeface="Courier New"/>
+                <a:hlinkClick r:id="rId3"/>
+              </a:rPr>
+              <a:t>psychsupport@kent.ac.uk</a:t>
+            </a:r>
+            <a:endParaRPr lang="en" sz="2000" dirty="0" smtClean="0">
+              <a:latin typeface="Courier New"/>
+              <a:ea typeface="Courier New"/>
+              <a:cs typeface="Courier New"/>
+              <a:sym typeface="Courier New"/>
+            </a:endParaRPr>
+          </a:p>
+          <a:p>
+            <a:pPr marL="914400" lvl="1" indent="-381000">
+              <a:buClr>
+                <a:schemeClr val="accent1">
+                  <a:lumMod val="75000"/>
+                </a:schemeClr>
+              </a:buClr>
+              <a:buFont typeface="Wingdings" panose="05000000000000000000" pitchFamily="2" charset="2"/>
+              <a:buChar char="§"/>
+            </a:pPr>
+            <a:r>
+              <a:rPr lang="en" sz="2400" dirty="0" smtClean="0">
+                <a:latin typeface="Trebuchet MS" panose="020B0603020202020204" pitchFamily="34" charset="0"/>
+                <a:ea typeface="Courier New"/>
+                <a:cs typeface="Courier New"/>
+                <a:sym typeface="Courier New"/>
+              </a:rPr>
+              <a:t>Staff </a:t>
+            </a:r>
+            <a:r>
+              <a:rPr lang="en" sz="2400" dirty="0">
+                <a:latin typeface="Trebuchet MS" panose="020B0603020202020204" pitchFamily="34" charset="0"/>
+                <a:ea typeface="Courier New"/>
+                <a:cs typeface="Courier New"/>
+                <a:sym typeface="Courier New"/>
+              </a:rPr>
+              <a:t>PC’s</a:t>
+            </a:r>
+          </a:p>
+          <a:p>
+            <a:pPr marL="1314450" lvl="2" indent="-381000">
+              <a:buClr>
+                <a:schemeClr val="accent1">
+                  <a:lumMod val="75000"/>
+                </a:schemeClr>
+              </a:buClr>
+              <a:buFont typeface="Wingdings" panose="05000000000000000000" pitchFamily="2" charset="2"/>
+              <a:buChar char="§"/>
+            </a:pPr>
+            <a:r>
+              <a:rPr lang="en" sz="2000" dirty="0">
+                <a:latin typeface="Courier New"/>
+                <a:ea typeface="Courier New"/>
+                <a:cs typeface="Courier New"/>
+                <a:sym typeface="Courier New"/>
+              </a:rPr>
+              <a:t>Install by going to “Software Center”</a:t>
+            </a:r>
+          </a:p>
+          <a:p>
+            <a:pPr marL="1771650" lvl="3" indent="-381000">
+              <a:buClr>
+                <a:schemeClr val="accent1">
+                  <a:lumMod val="75000"/>
+                </a:schemeClr>
+              </a:buClr>
+              <a:buFont typeface="Wingdings" panose="05000000000000000000" pitchFamily="2" charset="2"/>
+              <a:buChar char="§"/>
+            </a:pPr>
+            <a:r>
+              <a:rPr lang="en" sz="1800" dirty="0">
+                <a:latin typeface="Courier New"/>
+                <a:ea typeface="Courier New"/>
+                <a:cs typeface="Courier New"/>
+                <a:sym typeface="Courier New"/>
+              </a:rPr>
+              <a:t>Then … START | </a:t>
+            </a:r>
+            <a:r>
+              <a:rPr lang="en" sz="1800" dirty="0" smtClean="0">
+                <a:latin typeface="Courier New"/>
+                <a:ea typeface="Courier New"/>
+                <a:cs typeface="Courier New"/>
+                <a:sym typeface="Courier New"/>
+              </a:rPr>
+              <a:t>PsychoPy</a:t>
+            </a:r>
+            <a:endParaRPr lang="en" sz="1800" dirty="0">
               <a:latin typeface="Courier New"/>
               <a:ea typeface="Courier New"/>
               <a:cs typeface="Courier New"/>
@@ -17266,7 +17531,7 @@
           <p:nvPr/>
         </p:nvPicPr>
         <p:blipFill>
-          <a:blip r:embed="rId3">
+          <a:blip r:embed="rId4">
             <a:alphaModFix/>
           </a:blip>
           <a:stretch>
@@ -17523,6 +17788,47 @@
             <a:endParaRPr lang="en-US" sz="1800" dirty="0">
               <a:solidFill>
                 <a:srgbClr val="7030A0"/>
+              </a:solidFill>
+              <a:latin typeface="+mn-lt"/>
+            </a:endParaRPr>
+          </a:p>
+        </p:txBody>
+      </p:sp>
+      <p:sp>
+        <p:nvSpPr>
+          <p:cNvPr id="8" name="TextBox 7"/>
+          <p:cNvSpPr txBox="1"/>
+          <p:nvPr/>
+        </p:nvSpPr>
+        <p:spPr>
+          <a:xfrm>
+            <a:off x="2231830" y="6268374"/>
+            <a:ext cx="4968552" cy="369332"/>
+          </a:xfrm>
+          <a:prstGeom prst="rect">
+            <a:avLst/>
+          </a:prstGeom>
+          <a:noFill/>
+        </p:spPr>
+        <p:txBody>
+          <a:bodyPr wrap="square" rtlCol="0">
+            <a:spAutoFit/>
+          </a:bodyPr>
+          <a:lstStyle/>
+          <a:p>
+            <a:pPr algn="ctr"/>
+            <a:r>
+              <a:rPr lang="en-GB" sz="1800" dirty="0" smtClean="0">
+                <a:solidFill>
+                  <a:srgbClr val="FF0000"/>
+                </a:solidFill>
+                <a:latin typeface="+mn-lt"/>
+              </a:rPr>
+              <a:t>Demo – Try for yourself</a:t>
+            </a:r>
+            <a:endParaRPr lang="en-US" sz="1800" dirty="0">
+              <a:solidFill>
+                <a:srgbClr val="FF0000"/>
               </a:solidFill>
               <a:latin typeface="+mn-lt"/>
             </a:endParaRPr>

</xml_diff>

<commit_message>
Updated for this year
</commit_message>
<xml_diff>
--- a/PsychoPy-Part1/PsychoPy-part1.pptx
+++ b/PsychoPy-Part1/PsychoPy-part1.pptx
@@ -1672,7 +1672,7 @@
           <a:p>
             <a:fld id="{B4554F2B-4BCF-4197-901F-D7CA0C5C3346}" type="datetimeFigureOut">
               <a:rPr lang="en-US" smtClean="0"/>
-              <a:t>10/2/2019</a:t>
+              <a:t>10/10/2019</a:t>
             </a:fld>
             <a:endParaRPr lang="en-US" dirty="0"/>
           </a:p>
@@ -1929,7 +1929,7 @@
           <a:p>
             <a:fld id="{E28077EF-3DB9-4852-A8C8-9AA18A70A9F8}" type="datetimeFigureOut">
               <a:rPr lang="en-US" smtClean="0"/>
-              <a:t>10/2/2019</a:t>
+              <a:t>10/10/2019</a:t>
             </a:fld>
             <a:endParaRPr lang="en-US" dirty="0"/>
           </a:p>
@@ -2245,7 +2245,7 @@
           <a:p>
             <a:fld id="{E28077EF-3DB9-4852-A8C8-9AA18A70A9F8}" type="datetimeFigureOut">
               <a:rPr lang="en-US" smtClean="0"/>
-              <a:t>10/2/2019</a:t>
+              <a:t>10/10/2019</a:t>
             </a:fld>
             <a:endParaRPr lang="en-US" dirty="0"/>
           </a:p>
@@ -2580,7 +2580,7 @@
           <a:p>
             <a:fld id="{E28077EF-3DB9-4852-A8C8-9AA18A70A9F8}" type="datetimeFigureOut">
               <a:rPr lang="en-US" smtClean="0"/>
-              <a:t>10/2/2019</a:t>
+              <a:t>10/10/2019</a:t>
             </a:fld>
             <a:endParaRPr lang="en-US" dirty="0"/>
           </a:p>
@@ -2896,7 +2896,7 @@
           <a:p>
             <a:fld id="{E28077EF-3DB9-4852-A8C8-9AA18A70A9F8}" type="datetimeFigureOut">
               <a:rPr lang="en-US" smtClean="0"/>
-              <a:t>10/2/2019</a:t>
+              <a:t>10/10/2019</a:t>
             </a:fld>
             <a:endParaRPr lang="en-US" dirty="0"/>
           </a:p>
@@ -3291,7 +3291,7 @@
           <a:p>
             <a:fld id="{E28077EF-3DB9-4852-A8C8-9AA18A70A9F8}" type="datetimeFigureOut">
               <a:rPr lang="en-US" smtClean="0"/>
-              <a:t>10/2/2019</a:t>
+              <a:t>10/10/2019</a:t>
             </a:fld>
             <a:endParaRPr lang="en-US" dirty="0"/>
           </a:p>
@@ -3463,7 +3463,7 @@
           <a:p>
             <a:fld id="{80C08BB0-1F20-4C6B-A56C-896A9F73FB4A}" type="datetimeFigureOut">
               <a:rPr lang="en-US" smtClean="0"/>
-              <a:t>10/2/2019</a:t>
+              <a:t>10/10/2019</a:t>
             </a:fld>
             <a:endParaRPr lang="en-US" dirty="0"/>
           </a:p>
@@ -3644,7 +3644,7 @@
           <a:p>
             <a:fld id="{735C60DA-11B7-472A-AFEF-07FB059A27D8}" type="datetimeFigureOut">
               <a:rPr lang="en-US" smtClean="0"/>
-              <a:t>10/2/2019</a:t>
+              <a:t>10/10/2019</a:t>
             </a:fld>
             <a:endParaRPr lang="en-US" dirty="0"/>
           </a:p>
@@ -4020,7 +4020,7 @@
           <a:p>
             <a:fld id="{2651F21A-8405-4DA5-BEAC-3D4CC71D54EA}" type="datetimeFigureOut">
               <a:rPr lang="en-US" smtClean="0"/>
-              <a:t>10/2/2019</a:t>
+              <a:t>10/10/2019</a:t>
             </a:fld>
             <a:endParaRPr lang="en-US" dirty="0"/>
           </a:p>
@@ -4268,7 +4268,7 @@
           <a:p>
             <a:fld id="{78685F84-9683-4B1B-940C-516296C3B9E2}" type="datetimeFigureOut">
               <a:rPr lang="en-US" smtClean="0"/>
-              <a:t>10/2/2019</a:t>
+              <a:t>10/10/2019</a:t>
             </a:fld>
             <a:endParaRPr lang="en-US" dirty="0"/>
           </a:p>
@@ -4571,7 +4571,7 @@
           <a:p>
             <a:fld id="{0657B2AD-074C-4247-B20E-4BA1D1B80702}" type="datetimeFigureOut">
               <a:rPr lang="en-US" smtClean="0"/>
-              <a:t>10/2/2019</a:t>
+              <a:t>10/10/2019</a:t>
             </a:fld>
             <a:endParaRPr lang="en-US" dirty="0"/>
           </a:p>
@@ -4951,7 +4951,7 @@
           <a:p>
             <a:fld id="{8DCC26FB-39E8-4A97-A330-257F2E3058A9}" type="datetimeFigureOut">
               <a:rPr lang="en-US" smtClean="0"/>
-              <a:t>10/2/2019</a:t>
+              <a:t>10/10/2019</a:t>
             </a:fld>
             <a:endParaRPr lang="en-US" dirty="0"/>
           </a:p>
@@ -5075,7 +5075,7 @@
           <a:p>
             <a:fld id="{3EE6405D-5078-464B-95D5-AD1D787A29C3}" type="datetimeFigureOut">
               <a:rPr lang="en-US" smtClean="0"/>
-              <a:t>10/2/2019</a:t>
+              <a:t>10/10/2019</a:t>
             </a:fld>
             <a:endParaRPr lang="en-US" dirty="0"/>
           </a:p>
@@ -5170,7 +5170,7 @@
           <a:p>
             <a:fld id="{8CB55EF8-B59A-48DF-A116-AFDAD4B003AB}" type="datetimeFigureOut">
               <a:rPr lang="en-US" smtClean="0"/>
-              <a:t>10/2/2019</a:t>
+              <a:t>10/10/2019</a:t>
             </a:fld>
             <a:endParaRPr lang="en-US" dirty="0"/>
           </a:p>
@@ -5425,7 +5425,7 @@
           <a:p>
             <a:fld id="{EC94AEE7-DB1F-4DD1-9290-70ECE3C49600}" type="datetimeFigureOut">
               <a:rPr lang="en-US" smtClean="0"/>
-              <a:t>10/2/2019</a:t>
+              <a:t>10/10/2019</a:t>
             </a:fld>
             <a:endParaRPr lang="en-US" dirty="0"/>
           </a:p>
@@ -5689,7 +5689,7 @@
           <a:p>
             <a:fld id="{581F845D-AA64-4C6F-B170-8AA45DD4B329}" type="datetimeFigureOut">
               <a:rPr lang="en-US" smtClean="0"/>
-              <a:t>10/2/2019</a:t>
+              <a:t>10/10/2019</a:t>
             </a:fld>
             <a:endParaRPr lang="en-US" dirty="0"/>
           </a:p>
@@ -6505,7 +6505,7 @@
           <a:p>
             <a:fld id="{E28077EF-3DB9-4852-A8C8-9AA18A70A9F8}" type="datetimeFigureOut">
               <a:rPr lang="en-US" smtClean="0"/>
-              <a:t>10/2/2019</a:t>
+              <a:t>10/10/2019</a:t>
             </a:fld>
             <a:endParaRPr lang="en-US" dirty="0"/>
           </a:p>
@@ -7177,17 +7177,7 @@
                   </a:schemeClr>
                 </a:solidFill>
               </a:rPr>
-              <a:t>Run </a:t>
-            </a:r>
-            <a:r>
-              <a:rPr lang="en-GB" sz="3100" dirty="0" smtClean="0">
-                <a:solidFill>
-                  <a:schemeClr val="accent1">
-                    <a:lumMod val="75000"/>
-                  </a:schemeClr>
-                </a:solidFill>
-              </a:rPr>
-              <a:t>the </a:t>
+              <a:t>Run the </a:t>
             </a:r>
             <a:r>
               <a:rPr lang="en-GB" sz="3100" dirty="0" err="1" smtClean="0">
@@ -7251,11 +7241,7 @@
           <a:p>
             <a:r>
               <a:rPr lang="en-GB" dirty="0" smtClean="0"/>
-              <a:t>From the downloaded materials - open </a:t>
-            </a:r>
-            <a:r>
-              <a:rPr lang="en-GB" dirty="0" smtClean="0"/>
-              <a:t>up </a:t>
+              <a:t>From the downloaded materials - open up </a:t>
             </a:r>
             <a:r>
               <a:rPr lang="en-GB" dirty="0" err="1" smtClean="0">
@@ -7292,13 +7278,8 @@
           <a:p>
             <a:r>
               <a:rPr lang="en-GB" dirty="0" smtClean="0"/>
-              <a:t>Click the green icon at the top to run </a:t>
-            </a:r>
-            <a:r>
-              <a:rPr lang="en-GB" dirty="0" smtClean="0"/>
-              <a:t>it for yourself</a:t>
-            </a:r>
-            <a:endParaRPr lang="en-GB" dirty="0" smtClean="0"/>
+              <a:t>Click the green icon at the top to run it for yourself</a:t>
+            </a:r>
           </a:p>
           <a:p>
             <a:r>
@@ -7872,11 +7853,7 @@
           <a:p>
             <a:r>
               <a:rPr lang="en-GB" dirty="0" smtClean="0"/>
-              <a:t>Result </a:t>
-            </a:r>
-            <a:r>
-              <a:rPr lang="en-GB" dirty="0" smtClean="0"/>
-              <a:t>files and adding information</a:t>
+              <a:t>Result files and adding information</a:t>
             </a:r>
             <a:endParaRPr lang="en-US" dirty="0"/>
           </a:p>
@@ -16331,18 +16308,7 @@
                 <a:cs typeface="Courier New"/>
                 <a:sym typeface="Courier New"/>
               </a:rPr>
-              <a:t> </a:t>
-            </a:r>
-            <a:r>
-              <a:rPr lang="en" sz="1400" dirty="0" smtClean="0">
-                <a:solidFill>
-                  <a:schemeClr val="tx1"/>
-                </a:solidFill>
-                <a:ea typeface="Courier New"/>
-                <a:cs typeface="Courier New"/>
-                <a:sym typeface="Courier New"/>
-              </a:rPr>
-              <a:t>we are using </a:t>
+              <a:t> we are using </a:t>
             </a:r>
             <a:r>
               <a:rPr lang="en" sz="1400" dirty="0" smtClean="0">
@@ -16537,15 +16503,7 @@
                   <a:schemeClr val="tx1"/>
                 </a:solidFill>
               </a:rPr>
-              <a:t>WILL NOT run </a:t>
-            </a:r>
-            <a:r>
-              <a:rPr lang="en" sz="1400" dirty="0" smtClean="0">
-                <a:solidFill>
-                  <a:schemeClr val="tx1"/>
-                </a:solidFill>
-              </a:rPr>
-              <a:t>properly on an older version!</a:t>
+              <a:t>WILL NOT run properly on an older version!</a:t>
             </a:r>
           </a:p>
           <a:p>
@@ -17337,16 +17295,7 @@
                 <a:cs typeface="Courier New"/>
                 <a:sym typeface="Courier New"/>
               </a:rPr>
-              <a:t>Lab </a:t>
-            </a:r>
-            <a:r>
-              <a:rPr lang="en" sz="2400" dirty="0" smtClean="0">
-                <a:latin typeface="Trebuchet MS" panose="020B0603020202020204" pitchFamily="34" charset="0"/>
-                <a:ea typeface="Courier New"/>
-                <a:cs typeface="Courier New"/>
-                <a:sym typeface="Courier New"/>
-              </a:rPr>
-              <a:t>PC’s</a:t>
+              <a:t>Lab PC’s</a:t>
             </a:r>
             <a:endParaRPr lang="en" sz="2400" dirty="0">
               <a:latin typeface="Trebuchet MS" panose="020B0603020202020204" pitchFamily="34" charset="0"/>
@@ -17372,25 +17321,7 @@
                 <a:cs typeface="Courier New"/>
                 <a:sym typeface="Courier New"/>
               </a:rPr>
-              <a:t>START </a:t>
-            </a:r>
-            <a:r>
-              <a:rPr lang="en" sz="1800" dirty="0" smtClean="0">
-                <a:latin typeface="Courier New"/>
-                <a:ea typeface="Courier New"/>
-                <a:cs typeface="Courier New"/>
-                <a:sym typeface="Courier New"/>
-              </a:rPr>
-              <a:t>| </a:t>
-            </a:r>
-            <a:r>
-              <a:rPr lang="en" sz="1800" dirty="0" smtClean="0">
-                <a:latin typeface="Courier New"/>
-                <a:ea typeface="Courier New"/>
-                <a:cs typeface="Courier New"/>
-                <a:sym typeface="Courier New"/>
-              </a:rPr>
-              <a:t>PsychoPy</a:t>
+              <a:t>START | PsychoPy</a:t>
             </a:r>
           </a:p>
           <a:p>
@@ -17410,16 +17341,7 @@
                 <a:cs typeface="Courier New"/>
                 <a:sym typeface="Courier New"/>
               </a:rPr>
-              <a:t>If still </a:t>
-            </a:r>
-            <a:r>
-              <a:rPr lang="en" sz="2000" dirty="0" smtClean="0">
-                <a:latin typeface="Courier New"/>
-                <a:ea typeface="Courier New"/>
-                <a:cs typeface="Courier New"/>
-                <a:sym typeface="Courier New"/>
-              </a:rPr>
-              <a:t>not present, please contact </a:t>
+              <a:t>If still not present, please contact </a:t>
             </a:r>
             <a:r>
               <a:rPr lang="en" sz="2000" dirty="0" smtClean="0">

</xml_diff>